<commit_message>
Presentation (Data slides deleted)
</commit_message>
<xml_diff>
--- a/presentation/2015-07-09_Mobile-Web_Gruppe-Modulhandbuch.pptx
+++ b/presentation/2015-07-09_Mobile-Web_Gruppe-Modulhandbuch.pptx
@@ -5,10 +5,10 @@
     <p:sldMasterId id="2147483648" r:id="rId1"/>
   </p:sldMasterIdLst>
   <p:notesMasterIdLst>
-    <p:notesMasterId r:id="rId19"/>
+    <p:notesMasterId r:id="rId16"/>
   </p:notesMasterIdLst>
   <p:handoutMasterIdLst>
-    <p:handoutMasterId r:id="rId20"/>
+    <p:handoutMasterId r:id="rId17"/>
   </p:handoutMasterIdLst>
   <p:sldIdLst>
     <p:sldId id="256" r:id="rId2"/>
@@ -20,14 +20,11 @@
     <p:sldId id="266" r:id="rId8"/>
     <p:sldId id="262" r:id="rId9"/>
     <p:sldId id="273" r:id="rId10"/>
-    <p:sldId id="271" r:id="rId11"/>
-    <p:sldId id="275" r:id="rId12"/>
-    <p:sldId id="264" r:id="rId13"/>
-    <p:sldId id="274" r:id="rId14"/>
-    <p:sldId id="276" r:id="rId15"/>
-    <p:sldId id="277" r:id="rId16"/>
-    <p:sldId id="272" r:id="rId17"/>
-    <p:sldId id="269" r:id="rId18"/>
+    <p:sldId id="264" r:id="rId11"/>
+    <p:sldId id="274" r:id="rId12"/>
+    <p:sldId id="276" r:id="rId13"/>
+    <p:sldId id="277" r:id="rId14"/>
+    <p:sldId id="272" r:id="rId15"/>
   </p:sldIdLst>
   <p:sldSz cx="9144000" cy="6858000" type="screen4x3"/>
   <p:notesSz cx="6662738" cy="9774238"/>
@@ -158,7 +155,7 @@
   </p:defaultTextStyle>
   <p:extLst>
     <p:ext uri="{EFAFB233-063F-42B5-8137-9DF3F51BA10A}">
-      <p15:sldGuideLst xmlns="" xmlns:p15="http://schemas.microsoft.com/office/powerpoint/2012/main">
+      <p15:sldGuideLst xmlns:p15="http://schemas.microsoft.com/office/powerpoint/2012/main" xmlns="">
         <p15:guide id="1" orient="horz" pos="2160">
           <p15:clr>
             <a:srgbClr val="A4A3A4"/>
@@ -217,7 +214,7 @@
       </p15:sldGuideLst>
     </p:ext>
     <p:ext uri="{2D200454-40CA-4A62-9FC3-DE9A4176ACB9}">
-      <p15:notesGuideLst xmlns="" xmlns:p15="http://schemas.microsoft.com/office/powerpoint/2012/main"/>
+      <p15:notesGuideLst xmlns:p15="http://schemas.microsoft.com/office/powerpoint/2012/main" xmlns=""/>
     </p:ext>
   </p:extLst>
 </p:presentation>
@@ -305,7 +302,7 @@
           <a:p>
             <a:fld id="{9937624A-19D6-4B53-87FF-7EC9970FE6DF}" type="datetimeFigureOut">
               <a:rPr lang="de-DE" smtClean="0"/>
-              <a:t>07.07.15</a:t>
+              <a:t>07.07.2015</a:t>
             </a:fld>
             <a:endParaRPr lang="de-DE"/>
           </a:p>
@@ -470,7 +467,7 @@
           <a:p>
             <a:fld id="{880E0E77-1EBE-4DCA-941B-CCC4F080B8D0}" type="datetimeFigureOut">
               <a:rPr lang="de-DE" smtClean="0"/>
-              <a:t>07.07.15</a:t>
+              <a:t>07.07.2015</a:t>
             </a:fld>
             <a:endParaRPr lang="de-DE"/>
           </a:p>
@@ -1017,94 +1014,6 @@
 </p:notes>
 </file>
 
-<file path=ppt/notesSlides/notesSlide4.xml><?xml version="1.0" encoding="utf-8"?>
-<p:notes xmlns:a="http://schemas.openxmlformats.org/drawingml/2006/main" xmlns:r="http://schemas.openxmlformats.org/officeDocument/2006/relationships" xmlns:p="http://schemas.openxmlformats.org/presentationml/2006/main">
-  <p:cSld>
-    <p:spTree>
-      <p:nvGrpSpPr>
-        <p:cNvPr id="1" name=""/>
-        <p:cNvGrpSpPr/>
-        <p:nvPr/>
-      </p:nvGrpSpPr>
-      <p:grpSpPr>
-        <a:xfrm>
-          <a:off x="0" y="0"/>
-          <a:ext cx="0" cy="0"/>
-          <a:chOff x="0" y="0"/>
-          <a:chExt cx="0" cy="0"/>
-        </a:xfrm>
-      </p:grpSpPr>
-      <p:sp>
-        <p:nvSpPr>
-          <p:cNvPr id="2" name="Folienbildplatzhalter 1"/>
-          <p:cNvSpPr>
-            <a:spLocks noGrp="1" noRot="1" noChangeAspect="1"/>
-          </p:cNvSpPr>
-          <p:nvPr>
-            <p:ph type="sldImg"/>
-          </p:nvPr>
-        </p:nvSpPr>
-        <p:spPr/>
-      </p:sp>
-      <p:sp>
-        <p:nvSpPr>
-          <p:cNvPr id="3" name="Notizenplatzhalter 2"/>
-          <p:cNvSpPr>
-            <a:spLocks noGrp="1"/>
-          </p:cNvSpPr>
-          <p:nvPr>
-            <p:ph type="body" idx="1"/>
-          </p:nvPr>
-        </p:nvSpPr>
-        <p:spPr/>
-        <p:txBody>
-          <a:bodyPr/>
-          <a:lstStyle/>
-          <a:p>
-            <a:r>
-              <a:rPr lang="de-DE" dirty="0" smtClean="0"/>
-              <a:t>https://t1.ftcdn.net/jpg/00/22/27/70/500_F_22277076_5uIsqR6Q3h3TkWyPuRXsggyQ1fcS4Se0.jpg</a:t>
-            </a:r>
-            <a:endParaRPr lang="de-DE" dirty="0"/>
-          </a:p>
-        </p:txBody>
-      </p:sp>
-      <p:sp>
-        <p:nvSpPr>
-          <p:cNvPr id="4" name="Foliennummernplatzhalter 3"/>
-          <p:cNvSpPr>
-            <a:spLocks noGrp="1"/>
-          </p:cNvSpPr>
-          <p:nvPr>
-            <p:ph type="sldNum" sz="quarter" idx="10"/>
-          </p:nvPr>
-        </p:nvSpPr>
-        <p:spPr/>
-        <p:txBody>
-          <a:bodyPr/>
-          <a:lstStyle/>
-          <a:p>
-            <a:fld id="{025A0B81-BA31-43A1-964F-AB238F99C503}" type="slidenum">
-              <a:rPr lang="de-DE" smtClean="0"/>
-              <a:t>17</a:t>
-            </a:fld>
-            <a:endParaRPr lang="de-DE"/>
-          </a:p>
-        </p:txBody>
-      </p:sp>
-    </p:spTree>
-    <p:extLst>
-      <p:ext uri="{BB962C8B-B14F-4D97-AF65-F5344CB8AC3E}">
-        <p14:creationId xmlns:p14="http://schemas.microsoft.com/office/powerpoint/2010/main" val="3075437573"/>
-      </p:ext>
-    </p:extLst>
-  </p:cSld>
-  <p:clrMapOvr>
-    <a:masterClrMapping/>
-  </p:clrMapOvr>
-</p:notes>
-</file>
-
 <file path=ppt/slideLayouts/slideLayout1.xml><?xml version="1.0" encoding="utf-8"?>
 <p:sldLayout xmlns:a="http://schemas.openxmlformats.org/drawingml/2006/main" xmlns:r="http://schemas.openxmlformats.org/officeDocument/2006/relationships" xmlns:p="http://schemas.openxmlformats.org/presentationml/2006/main" showMasterSp="0" type="title" preserve="1">
   <p:cSld name="Titelfolie">
@@ -1247,7 +1156,7 @@
           <a:p>
             <a:fld id="{BE52FED1-3B53-4AFD-A771-C7BE27550915}" type="datetime1">
               <a:rPr lang="de-DE" smtClean="0"/>
-              <a:t>07.07.15</a:t>
+              <a:t>07.07.2015</a:t>
             </a:fld>
             <a:endParaRPr lang="de-DE" dirty="0"/>
           </a:p>
@@ -1317,7 +1226,7 @@
           </a:prstGeom>
           <a:noFill/>
           <a:extLst>
-            <a:ext uri="{909E8E84-426E-40dd-AFC4-6F175D3DCCD1}">
+            <a:ext uri="{909E8E84-426E-40DD-AFC4-6F175D3DCCD1}">
               <a14:hiddenFill xmlns:a14="http://schemas.microsoft.com/office/drawing/2010/main">
                 <a:solidFill>
                   <a:srgbClr val="FFFFFF"/>
@@ -1351,14 +1260,14 @@
           </a:ln>
           <a:effectLst/>
           <a:extLst>
-            <a:ext uri="{909E8E84-426E-40dd-AFC4-6F175D3DCCD1}">
+            <a:ext uri="{909E8E84-426E-40DD-AFC4-6F175D3DCCD1}">
               <a14:hiddenFill xmlns:a14="http://schemas.microsoft.com/office/drawing/2010/main">
                 <a:solidFill>
                   <a:schemeClr val="accent1"/>
                 </a:solidFill>
               </a14:hiddenFill>
             </a:ext>
-            <a:ext uri="{91240B29-F687-4f45-9708-019B960494DF}">
+            <a:ext uri="{91240B29-F687-4F45-9708-019B960494DF}">
               <a14:hiddenLine xmlns:a14="http://schemas.microsoft.com/office/drawing/2010/main" w="9525">
                 <a:solidFill>
                   <a:schemeClr val="tx1"/>
@@ -1368,7 +1277,7 @@
                 <a:tailEnd/>
               </a14:hiddenLine>
             </a:ext>
-            <a:ext uri="{AF507438-7753-43e0-B8FC-AC1667EBCBE1}">
+            <a:ext uri="{AF507438-7753-43E0-B8FC-AC1667EBCBE1}">
               <a14:hiddenEffects xmlns:a14="http://schemas.microsoft.com/office/drawing/2010/main">
                 <a:effectLst>
                   <a:outerShdw dist="35921" dir="2700000" algn="ctr" rotWithShape="0">
@@ -1558,7 +1467,7 @@
           <a:p>
             <a:fld id="{36514D55-B040-4CBD-B6B9-F1964C8C5D0D}" type="datetime1">
               <a:rPr lang="de-DE" smtClean="0"/>
-              <a:t>07.07.15</a:t>
+              <a:t>07.07.2015</a:t>
             </a:fld>
             <a:endParaRPr lang="de-DE"/>
           </a:p>
@@ -1588,14 +1497,14 @@
           </a:ln>
           <a:effectLst/>
           <a:extLst>
-            <a:ext uri="{909E8E84-426E-40dd-AFC4-6F175D3DCCD1}">
+            <a:ext uri="{909E8E84-426E-40DD-AFC4-6F175D3DCCD1}">
               <a14:hiddenFill xmlns:a14="http://schemas.microsoft.com/office/drawing/2010/main">
                 <a:solidFill>
                   <a:schemeClr val="accent1"/>
                 </a:solidFill>
               </a14:hiddenFill>
             </a:ext>
-            <a:ext uri="{91240B29-F687-4f45-9708-019B960494DF}">
+            <a:ext uri="{91240B29-F687-4F45-9708-019B960494DF}">
               <a14:hiddenLine xmlns:a14="http://schemas.microsoft.com/office/drawing/2010/main" w="9525">
                 <a:solidFill>
                   <a:schemeClr val="tx1"/>
@@ -1605,7 +1514,7 @@
                 <a:tailEnd/>
               </a14:hiddenLine>
             </a:ext>
-            <a:ext uri="{AF507438-7753-43e0-B8FC-AC1667EBCBE1}">
+            <a:ext uri="{AF507438-7753-43E0-B8FC-AC1667EBCBE1}">
               <a14:hiddenEffects xmlns:a14="http://schemas.microsoft.com/office/drawing/2010/main">
                 <a:effectLst>
                   <a:outerShdw dist="35921" dir="2700000" algn="ctr" rotWithShape="0">
@@ -1817,7 +1726,7 @@
           <a:p>
             <a:fld id="{193105AA-858E-4C99-9190-244091FB0E4C}" type="datetime1">
               <a:rPr lang="de-DE" smtClean="0"/>
-              <a:t>07.07.15</a:t>
+              <a:t>07.07.2015</a:t>
             </a:fld>
             <a:endParaRPr lang="de-DE"/>
           </a:p>
@@ -1847,14 +1756,14 @@
           </a:ln>
           <a:effectLst/>
           <a:extLst>
-            <a:ext uri="{909E8E84-426E-40dd-AFC4-6F175D3DCCD1}">
+            <a:ext uri="{909E8E84-426E-40DD-AFC4-6F175D3DCCD1}">
               <a14:hiddenFill xmlns:a14="http://schemas.microsoft.com/office/drawing/2010/main">
                 <a:solidFill>
                   <a:schemeClr val="accent1"/>
                 </a:solidFill>
               </a14:hiddenFill>
             </a:ext>
-            <a:ext uri="{91240B29-F687-4f45-9708-019B960494DF}">
+            <a:ext uri="{91240B29-F687-4F45-9708-019B960494DF}">
               <a14:hiddenLine xmlns:a14="http://schemas.microsoft.com/office/drawing/2010/main" w="9525">
                 <a:solidFill>
                   <a:schemeClr val="tx1"/>
@@ -1864,7 +1773,7 @@
                 <a:tailEnd/>
               </a14:hiddenLine>
             </a:ext>
-            <a:ext uri="{AF507438-7753-43e0-B8FC-AC1667EBCBE1}">
+            <a:ext uri="{AF507438-7753-43E0-B8FC-AC1667EBCBE1}">
               <a14:hiddenEffects xmlns:a14="http://schemas.microsoft.com/office/drawing/2010/main">
                 <a:effectLst>
                   <a:outerShdw dist="35921" dir="2700000" algn="ctr" rotWithShape="0">
@@ -2176,7 +2085,7 @@
           <a:p>
             <a:fld id="{95DCA378-4D19-49BB-8AAE-45C7E41C1D83}" type="datetime1">
               <a:rPr lang="de-DE" smtClean="0"/>
-              <a:t>07.07.15</a:t>
+              <a:t>07.07.2015</a:t>
             </a:fld>
             <a:endParaRPr lang="de-DE"/>
           </a:p>
@@ -2206,14 +2115,14 @@
           </a:ln>
           <a:effectLst/>
           <a:extLst>
-            <a:ext uri="{909E8E84-426E-40dd-AFC4-6F175D3DCCD1}">
+            <a:ext uri="{909E8E84-426E-40DD-AFC4-6F175D3DCCD1}">
               <a14:hiddenFill xmlns:a14="http://schemas.microsoft.com/office/drawing/2010/main">
                 <a:solidFill>
                   <a:schemeClr val="accent1"/>
                 </a:solidFill>
               </a14:hiddenFill>
             </a:ext>
-            <a:ext uri="{91240B29-F687-4f45-9708-019B960494DF}">
+            <a:ext uri="{91240B29-F687-4F45-9708-019B960494DF}">
               <a14:hiddenLine xmlns:a14="http://schemas.microsoft.com/office/drawing/2010/main" w="9525">
                 <a:solidFill>
                   <a:schemeClr val="tx1"/>
@@ -2223,7 +2132,7 @@
                 <a:tailEnd/>
               </a14:hiddenLine>
             </a:ext>
-            <a:ext uri="{AF507438-7753-43e0-B8FC-AC1667EBCBE1}">
+            <a:ext uri="{AF507438-7753-43E0-B8FC-AC1667EBCBE1}">
               <a14:hiddenEffects xmlns:a14="http://schemas.microsoft.com/office/drawing/2010/main">
                 <a:effectLst>
                   <a:outerShdw dist="35921" dir="2700000" algn="ctr" rotWithShape="0">
@@ -2638,7 +2547,7 @@
           <a:p>
             <a:fld id="{D32B10BE-596A-4E88-9BC8-49B1B53D3333}" type="datetime1">
               <a:rPr lang="de-DE" smtClean="0"/>
-              <a:t>07.07.15</a:t>
+              <a:t>07.07.2015</a:t>
             </a:fld>
             <a:endParaRPr lang="de-DE"/>
           </a:p>
@@ -2700,14 +2609,14 @@
           </a:ln>
           <a:effectLst/>
           <a:extLst>
-            <a:ext uri="{909E8E84-426E-40dd-AFC4-6F175D3DCCD1}">
+            <a:ext uri="{909E8E84-426E-40DD-AFC4-6F175D3DCCD1}">
               <a14:hiddenFill xmlns:a14="http://schemas.microsoft.com/office/drawing/2010/main">
                 <a:solidFill>
                   <a:schemeClr val="accent1"/>
                 </a:solidFill>
               </a14:hiddenFill>
             </a:ext>
-            <a:ext uri="{91240B29-F687-4f45-9708-019B960494DF}">
+            <a:ext uri="{91240B29-F687-4F45-9708-019B960494DF}">
               <a14:hiddenLine xmlns:a14="http://schemas.microsoft.com/office/drawing/2010/main" w="9525">
                 <a:solidFill>
                   <a:schemeClr val="tx1"/>
@@ -2717,7 +2626,7 @@
                 <a:tailEnd/>
               </a14:hiddenLine>
             </a:ext>
-            <a:ext uri="{AF507438-7753-43e0-B8FC-AC1667EBCBE1}">
+            <a:ext uri="{AF507438-7753-43E0-B8FC-AC1667EBCBE1}">
               <a14:hiddenEffects xmlns:a14="http://schemas.microsoft.com/office/drawing/2010/main">
                 <a:effectLst>
                   <a:outerShdw dist="35921" dir="2700000" algn="ctr" rotWithShape="0">
@@ -2855,7 +2764,7 @@
           <a:p>
             <a:fld id="{33003E35-6098-4B69-A0CA-FD39498AB0F4}" type="datetime1">
               <a:rPr lang="de-DE" smtClean="0"/>
-              <a:t>07.07.15</a:t>
+              <a:t>07.07.2015</a:t>
             </a:fld>
             <a:endParaRPr lang="de-DE"/>
           </a:p>
@@ -2885,14 +2794,14 @@
           </a:ln>
           <a:effectLst/>
           <a:extLst>
-            <a:ext uri="{909E8E84-426E-40dd-AFC4-6F175D3DCCD1}">
+            <a:ext uri="{909E8E84-426E-40DD-AFC4-6F175D3DCCD1}">
               <a14:hiddenFill xmlns:a14="http://schemas.microsoft.com/office/drawing/2010/main">
                 <a:solidFill>
                   <a:schemeClr val="accent1"/>
                 </a:solidFill>
               </a14:hiddenFill>
             </a:ext>
-            <a:ext uri="{91240B29-F687-4f45-9708-019B960494DF}">
+            <a:ext uri="{91240B29-F687-4F45-9708-019B960494DF}">
               <a14:hiddenLine xmlns:a14="http://schemas.microsoft.com/office/drawing/2010/main" w="9525">
                 <a:solidFill>
                   <a:schemeClr val="tx1"/>
@@ -2902,7 +2811,7 @@
                 <a:tailEnd/>
               </a14:hiddenLine>
             </a:ext>
-            <a:ext uri="{AF507438-7753-43e0-B8FC-AC1667EBCBE1}">
+            <a:ext uri="{AF507438-7753-43E0-B8FC-AC1667EBCBE1}">
               <a14:hiddenEffects xmlns:a14="http://schemas.microsoft.com/office/drawing/2010/main">
                 <a:effectLst>
                   <a:outerShdw dist="35921" dir="2700000" algn="ctr" rotWithShape="0">
@@ -3017,7 +2926,7 @@
           <a:p>
             <a:fld id="{FFE014C6-8B34-4748-BFFD-43343B8201C8}" type="datetime1">
               <a:rPr lang="de-DE" smtClean="0"/>
-              <a:t>07.07.15</a:t>
+              <a:t>07.07.2015</a:t>
             </a:fld>
             <a:endParaRPr lang="de-DE"/>
           </a:p>
@@ -3047,14 +2956,14 @@
           </a:ln>
           <a:effectLst/>
           <a:extLst>
-            <a:ext uri="{909E8E84-426E-40dd-AFC4-6F175D3DCCD1}">
+            <a:ext uri="{909E8E84-426E-40DD-AFC4-6F175D3DCCD1}">
               <a14:hiddenFill xmlns:a14="http://schemas.microsoft.com/office/drawing/2010/main">
                 <a:solidFill>
                   <a:schemeClr val="accent1"/>
                 </a:solidFill>
               </a14:hiddenFill>
             </a:ext>
-            <a:ext uri="{91240B29-F687-4f45-9708-019B960494DF}">
+            <a:ext uri="{91240B29-F687-4F45-9708-019B960494DF}">
               <a14:hiddenLine xmlns:a14="http://schemas.microsoft.com/office/drawing/2010/main" w="9525">
                 <a:solidFill>
                   <a:schemeClr val="tx1"/>
@@ -3064,7 +2973,7 @@
                 <a:tailEnd/>
               </a14:hiddenLine>
             </a:ext>
-            <a:ext uri="{AF507438-7753-43e0-B8FC-AC1667EBCBE1}">
+            <a:ext uri="{AF507438-7753-43E0-B8FC-AC1667EBCBE1}">
               <a14:hiddenEffects xmlns:a14="http://schemas.microsoft.com/office/drawing/2010/main">
                 <a:effectLst>
                   <a:outerShdw dist="35921" dir="2700000" algn="ctr" rotWithShape="0">
@@ -3361,7 +3270,7 @@
           <a:p>
             <a:fld id="{3721457A-8B30-4567-9F44-DF3C2DA4804D}" type="datetime1">
               <a:rPr lang="de-DE" smtClean="0"/>
-              <a:t>07.07.15</a:t>
+              <a:t>07.07.2015</a:t>
             </a:fld>
             <a:endParaRPr lang="de-DE"/>
           </a:p>
@@ -3391,14 +3300,14 @@
           </a:ln>
           <a:effectLst/>
           <a:extLst>
-            <a:ext uri="{909E8E84-426E-40dd-AFC4-6F175D3DCCD1}">
+            <a:ext uri="{909E8E84-426E-40DD-AFC4-6F175D3DCCD1}">
               <a14:hiddenFill xmlns:a14="http://schemas.microsoft.com/office/drawing/2010/main">
                 <a:solidFill>
                   <a:schemeClr val="accent1"/>
                 </a:solidFill>
               </a14:hiddenFill>
             </a:ext>
-            <a:ext uri="{91240B29-F687-4f45-9708-019B960494DF}">
+            <a:ext uri="{91240B29-F687-4F45-9708-019B960494DF}">
               <a14:hiddenLine xmlns:a14="http://schemas.microsoft.com/office/drawing/2010/main" w="9525">
                 <a:solidFill>
                   <a:schemeClr val="tx1"/>
@@ -3408,7 +3317,7 @@
                 <a:tailEnd/>
               </a14:hiddenLine>
             </a:ext>
-            <a:ext uri="{AF507438-7753-43e0-B8FC-AC1667EBCBE1}">
+            <a:ext uri="{AF507438-7753-43E0-B8FC-AC1667EBCBE1}">
               <a14:hiddenEffects xmlns:a14="http://schemas.microsoft.com/office/drawing/2010/main">
                 <a:effectLst>
                   <a:outerShdw dist="35921" dir="2700000" algn="ctr" rotWithShape="0">
@@ -3685,7 +3594,7 @@
           <a:p>
             <a:fld id="{47982ECF-30EC-40E0-B102-478A97B403CD}" type="datetime1">
               <a:rPr lang="de-DE" smtClean="0"/>
-              <a:t>07.07.15</a:t>
+              <a:t>07.07.2015</a:t>
             </a:fld>
             <a:endParaRPr lang="de-DE"/>
           </a:p>
@@ -3715,14 +3624,14 @@
           </a:ln>
           <a:effectLst/>
           <a:extLst>
-            <a:ext uri="{909E8E84-426E-40dd-AFC4-6F175D3DCCD1}">
+            <a:ext uri="{909E8E84-426E-40DD-AFC4-6F175D3DCCD1}">
               <a14:hiddenFill xmlns:a14="http://schemas.microsoft.com/office/drawing/2010/main">
                 <a:solidFill>
                   <a:schemeClr val="accent1"/>
                 </a:solidFill>
               </a14:hiddenFill>
             </a:ext>
-            <a:ext uri="{91240B29-F687-4f45-9708-019B960494DF}">
+            <a:ext uri="{91240B29-F687-4F45-9708-019B960494DF}">
               <a14:hiddenLine xmlns:a14="http://schemas.microsoft.com/office/drawing/2010/main" w="9525">
                 <a:solidFill>
                   <a:schemeClr val="tx1"/>
@@ -3732,7 +3641,7 @@
                 <a:tailEnd/>
               </a14:hiddenLine>
             </a:ext>
-            <a:ext uri="{AF507438-7753-43e0-B8FC-AC1667EBCBE1}">
+            <a:ext uri="{AF507438-7753-43E0-B8FC-AC1667EBCBE1}">
               <a14:hiddenEffects xmlns:a14="http://schemas.microsoft.com/office/drawing/2010/main">
                 <a:effectLst>
                   <a:outerShdw dist="35921" dir="2700000" algn="ctr" rotWithShape="0">
@@ -3830,14 +3739,14 @@
           </a:ln>
           <a:effectLst/>
           <a:extLst>
-            <a:ext uri="{909E8E84-426E-40dd-AFC4-6F175D3DCCD1}">
+            <a:ext uri="{909E8E84-426E-40DD-AFC4-6F175D3DCCD1}">
               <a14:hiddenFill xmlns:a14="http://schemas.microsoft.com/office/drawing/2010/main">
                 <a:solidFill>
                   <a:schemeClr val="accent1"/>
                 </a:solidFill>
               </a14:hiddenFill>
             </a:ext>
-            <a:ext uri="{91240B29-F687-4f45-9708-019B960494DF}">
+            <a:ext uri="{91240B29-F687-4F45-9708-019B960494DF}">
               <a14:hiddenLine xmlns:a14="http://schemas.microsoft.com/office/drawing/2010/main" w="9525">
                 <a:solidFill>
                   <a:schemeClr val="tx1"/>
@@ -3847,7 +3756,7 @@
                 <a:tailEnd/>
               </a14:hiddenLine>
             </a:ext>
-            <a:ext uri="{AF507438-7753-43e0-B8FC-AC1667EBCBE1}">
+            <a:ext uri="{AF507438-7753-43E0-B8FC-AC1667EBCBE1}">
               <a14:hiddenEffects xmlns:a14="http://schemas.microsoft.com/office/drawing/2010/main">
                 <a:effectLst>
                   <a:outerShdw dist="35921" dir="2700000" algn="ctr" rotWithShape="0">
@@ -3926,14 +3835,14 @@
           </a:ln>
           <a:effectLst/>
           <a:extLst>
-            <a:ext uri="{909E8E84-426E-40dd-AFC4-6F175D3DCCD1}">
+            <a:ext uri="{909E8E84-426E-40DD-AFC4-6F175D3DCCD1}">
               <a14:hiddenFill xmlns:a14="http://schemas.microsoft.com/office/drawing/2010/main">
                 <a:solidFill>
                   <a:schemeClr val="accent1"/>
                 </a:solidFill>
               </a14:hiddenFill>
             </a:ext>
-            <a:ext uri="{91240B29-F687-4f45-9708-019B960494DF}">
+            <a:ext uri="{91240B29-F687-4F45-9708-019B960494DF}">
               <a14:hiddenLine xmlns:a14="http://schemas.microsoft.com/office/drawing/2010/main" w="9525">
                 <a:solidFill>
                   <a:schemeClr val="tx1"/>
@@ -3943,7 +3852,7 @@
                 <a:tailEnd/>
               </a14:hiddenLine>
             </a:ext>
-            <a:ext uri="{AF507438-7753-43e0-B8FC-AC1667EBCBE1}">
+            <a:ext uri="{AF507438-7753-43E0-B8FC-AC1667EBCBE1}">
               <a14:hiddenEffects xmlns:a14="http://schemas.microsoft.com/office/drawing/2010/main">
                 <a:effectLst>
                   <a:outerShdw dist="35921" dir="2700000" algn="ctr" rotWithShape="0">
@@ -3994,14 +3903,14 @@
           </a:ln>
           <a:effectLst/>
           <a:extLst>
-            <a:ext uri="{909E8E84-426E-40dd-AFC4-6F175D3DCCD1}">
+            <a:ext uri="{909E8E84-426E-40DD-AFC4-6F175D3DCCD1}">
               <a14:hiddenFill xmlns:a14="http://schemas.microsoft.com/office/drawing/2010/main">
                 <a:solidFill>
                   <a:schemeClr val="accent1"/>
                 </a:solidFill>
               </a14:hiddenFill>
             </a:ext>
-            <a:ext uri="{91240B29-F687-4f45-9708-019B960494DF}">
+            <a:ext uri="{91240B29-F687-4F45-9708-019B960494DF}">
               <a14:hiddenLine xmlns:a14="http://schemas.microsoft.com/office/drawing/2010/main" w="9525">
                 <a:solidFill>
                   <a:schemeClr val="tx1"/>
@@ -4011,7 +3920,7 @@
                 <a:tailEnd/>
               </a14:hiddenLine>
             </a:ext>
-            <a:ext uri="{AF507438-7753-43e0-B8FC-AC1667EBCBE1}">
+            <a:ext uri="{AF507438-7753-43E0-B8FC-AC1667EBCBE1}">
               <a14:hiddenEffects xmlns:a14="http://schemas.microsoft.com/office/drawing/2010/main">
                 <a:effectLst>
                   <a:outerShdw dist="35921" dir="2700000" algn="ctr" rotWithShape="0">
@@ -4072,14 +3981,14 @@
           </a:ln>
           <a:effectLst/>
           <a:extLst>
-            <a:ext uri="{909E8E84-426E-40dd-AFC4-6F175D3DCCD1}">
+            <a:ext uri="{909E8E84-426E-40DD-AFC4-6F175D3DCCD1}">
               <a14:hiddenFill xmlns:a14="http://schemas.microsoft.com/office/drawing/2010/main">
                 <a:solidFill>
                   <a:schemeClr val="accent1"/>
                 </a:solidFill>
               </a14:hiddenFill>
             </a:ext>
-            <a:ext uri="{91240B29-F687-4f45-9708-019B960494DF}">
+            <a:ext uri="{91240B29-F687-4F45-9708-019B960494DF}">
               <a14:hiddenLine xmlns:a14="http://schemas.microsoft.com/office/drawing/2010/main" w="9525">
                 <a:solidFill>
                   <a:schemeClr val="tx1"/>
@@ -4089,7 +3998,7 @@
                 <a:tailEnd/>
               </a14:hiddenLine>
             </a:ext>
-            <a:ext uri="{AF507438-7753-43e0-B8FC-AC1667EBCBE1}">
+            <a:ext uri="{AF507438-7753-43E0-B8FC-AC1667EBCBE1}">
               <a14:hiddenEffects xmlns:a14="http://schemas.microsoft.com/office/drawing/2010/main">
                 <a:effectLst>
                   <a:outerShdw dist="35921" dir="2700000" algn="ctr" rotWithShape="0">
@@ -4119,7 +4028,7 @@
           <a:p>
             <a:fld id="{598F92F8-949A-4A70-9DDB-CBDAE3E0A114}" type="datetime1">
               <a:rPr lang="de-DE" smtClean="0"/>
-              <a:t>07.07.15</a:t>
+              <a:t>07.07.2015</a:t>
             </a:fld>
             <a:endParaRPr lang="de-DE" dirty="0"/>
           </a:p>
@@ -4149,14 +4058,14 @@
           </a:ln>
           <a:effectLst/>
           <a:extLst>
-            <a:ext uri="{909E8E84-426E-40dd-AFC4-6F175D3DCCD1}">
+            <a:ext uri="{909E8E84-426E-40DD-AFC4-6F175D3DCCD1}">
               <a14:hiddenFill xmlns:a14="http://schemas.microsoft.com/office/drawing/2010/main">
                 <a:solidFill>
                   <a:schemeClr val="accent1"/>
                 </a:solidFill>
               </a14:hiddenFill>
             </a:ext>
-            <a:ext uri="{91240B29-F687-4f45-9708-019B960494DF}">
+            <a:ext uri="{91240B29-F687-4F45-9708-019B960494DF}">
               <a14:hiddenLine xmlns:a14="http://schemas.microsoft.com/office/drawing/2010/main" w="9525">
                 <a:solidFill>
                   <a:schemeClr val="tx1"/>
@@ -4166,7 +4075,7 @@
                 <a:tailEnd/>
               </a14:hiddenLine>
             </a:ext>
-            <a:ext uri="{AF507438-7753-43e0-B8FC-AC1667EBCBE1}">
+            <a:ext uri="{AF507438-7753-43E0-B8FC-AC1667EBCBE1}">
               <a14:hiddenEffects xmlns:a14="http://schemas.microsoft.com/office/drawing/2010/main">
                 <a:effectLst>
                   <a:outerShdw dist="35921" dir="2700000" algn="ctr" rotWithShape="0">
@@ -4266,7 +4175,7 @@
           </a:prstGeom>
           <a:noFill/>
           <a:extLst>
-            <a:ext uri="{909E8E84-426E-40dd-AFC4-6F175D3DCCD1}">
+            <a:ext uri="{909E8E84-426E-40DD-AFC4-6F175D3DCCD1}">
               <a14:hiddenFill xmlns:a14="http://schemas.microsoft.com/office/drawing/2010/main">
                 <a:solidFill>
                   <a:srgbClr val="FFFFFF"/>
@@ -4293,7 +4202,7 @@
   <p:timing>
     <p:tnLst>
       <p:par>
-        <p:cTn xmlns:p14="http://schemas.microsoft.com/office/powerpoint/2010/main" id="1" dur="indefinite" restart="never" nodeType="tmRoot"/>
+        <p:cTn id="1" dur="indefinite" restart="never" nodeType="tmRoot"/>
       </p:par>
     </p:tnLst>
   </p:timing>
@@ -4832,7 +4741,7 @@
             </a:solidFill>
           </a:ln>
           <a:extLst>
-            <a:ext uri="{909E8E84-426E-40dd-AFC4-6F175D3DCCD1}">
+            <a:ext uri="{909E8E84-426E-40DD-AFC4-6F175D3DCCD1}">
               <a14:hiddenFill xmlns:a14="http://schemas.microsoft.com/office/drawing/2010/main">
                 <a:solidFill>
                   <a:srgbClr val="FFFFFF"/>
@@ -4880,7 +4789,7 @@
             </a:solidFill>
           </a:ln>
           <a:extLst>
-            <a:ext uri="{909E8E84-426E-40dd-AFC4-6F175D3DCCD1}">
+            <a:ext uri="{909E8E84-426E-40DD-AFC4-6F175D3DCCD1}">
               <a14:hiddenFill xmlns:a14="http://schemas.microsoft.com/office/drawing/2010/main">
                 <a:solidFill>
                   <a:srgbClr val="FFFFFF"/>
@@ -4931,7 +4840,7 @@
             <a:tailEnd/>
           </a:ln>
           <a:extLst>
-            <a:ext uri="{909E8E84-426E-40dd-AFC4-6F175D3DCCD1}">
+            <a:ext uri="{909E8E84-426E-40DD-AFC4-6F175D3DCCD1}">
               <a14:hiddenFill xmlns:a14="http://schemas.microsoft.com/office/drawing/2010/main">
                 <a:solidFill>
                   <a:schemeClr val="accent1"/>
@@ -5147,7 +5056,7 @@
   <p:timing>
     <p:tnLst>
       <p:par>
-        <p:cTn xmlns:p14="http://schemas.microsoft.com/office/powerpoint/2010/main" id="1" dur="indefinite" restart="never" nodeType="tmRoot"/>
+        <p:cTn id="1" dur="indefinite" restart="never" nodeType="tmRoot"/>
       </p:par>
     </p:tnLst>
   </p:timing>
@@ -5173,53 +5082,36 @@
       </p:grpSpPr>
       <p:sp>
         <p:nvSpPr>
-          <p:cNvPr id="15" name="Rechteck 14"/>
-          <p:cNvSpPr/>
-          <p:nvPr/>
-        </p:nvSpPr>
-        <p:spPr>
-          <a:xfrm>
-            <a:off x="467544" y="1772816"/>
-            <a:ext cx="6624735" cy="4643237"/>
-          </a:xfrm>
-          <a:prstGeom prst="rect">
-            <a:avLst/>
-          </a:prstGeom>
-          <a:solidFill>
-            <a:schemeClr val="bg1">
-              <a:lumMod val="95000"/>
-            </a:schemeClr>
-          </a:solidFill>
-          <a:ln>
-            <a:solidFill>
-              <a:schemeClr val="bg1">
-                <a:lumMod val="50000"/>
-              </a:schemeClr>
-            </a:solidFill>
-          </a:ln>
-        </p:spPr>
-        <p:style>
-          <a:lnRef idx="2">
-            <a:schemeClr val="accent1">
-              <a:shade val="50000"/>
-            </a:schemeClr>
-          </a:lnRef>
-          <a:fillRef idx="1">
-            <a:schemeClr val="accent1"/>
-          </a:fillRef>
-          <a:effectRef idx="0">
-            <a:schemeClr val="accent1"/>
-          </a:effectRef>
-          <a:fontRef idx="minor">
-            <a:schemeClr val="lt1"/>
-          </a:fontRef>
-        </p:style>
-        <p:txBody>
-          <a:bodyPr rtlCol="0" anchor="ctr"/>
+          <p:cNvPr id="2" name="Titel 1"/>
+          <p:cNvSpPr>
+            <a:spLocks noGrp="1"/>
+          </p:cNvSpPr>
+          <p:nvPr>
+            <p:ph type="title"/>
+          </p:nvPr>
+        </p:nvSpPr>
+        <p:spPr/>
+        <p:txBody>
+          <a:bodyPr/>
           <a:lstStyle/>
           <a:p>
-            <a:pPr algn="ctr"/>
-            <a:endParaRPr lang="de-DE"/>
+            <a:r>
+              <a:rPr lang="de-DE" dirty="0"/>
+              <a:t>Prototyp „</a:t>
+            </a:r>
+            <a:r>
+              <a:rPr lang="de-DE" dirty="0" smtClean="0"/>
+              <a:t>d3plus (2)“ </a:t>
+            </a:r>
+            <a:r>
+              <a:rPr lang="de-DE" dirty="0"/>
+              <a:t>– </a:t>
+            </a:r>
+            <a:r>
+              <a:rPr lang="de-DE" dirty="0" smtClean="0"/>
+              <a:t>Fazit</a:t>
+            </a:r>
+            <a:endParaRPr lang="de-DE" dirty="0"/>
           </a:p>
         </p:txBody>
       </p:sp>
@@ -5243,13 +5135,57 @@
             </a:pPr>
             <a:r>
               <a:rPr lang="de-DE" dirty="0"/>
-              <a:t>Auszug </a:t>
-            </a:r>
+              <a:t>Pro:</a:t>
+            </a:r>
+          </a:p>
+          <a:p>
+            <a:r>
+              <a:rPr lang="de-DE" dirty="0"/>
+              <a:t>Hierarchische Struktur</a:t>
+            </a:r>
+          </a:p>
+          <a:p>
+            <a:r>
+              <a:rPr lang="de-DE" dirty="0"/>
+              <a:t>Animierter Ebenen-Wechsel</a:t>
+            </a:r>
+          </a:p>
+          <a:p>
+            <a:r>
+              <a:rPr lang="de-DE" dirty="0"/>
+              <a:t>Feldgrößen in Anlehnung an ECTS-</a:t>
+            </a:r>
+            <a:r>
+              <a:rPr lang="de-DE" dirty="0" err="1"/>
+              <a:t>Credits</a:t>
+            </a:r>
+            <a:endParaRPr lang="de-DE" dirty="0"/>
+          </a:p>
+          <a:p>
+            <a:r>
+              <a:rPr lang="de-DE" dirty="0"/>
+              <a:t>Navigation verbessert</a:t>
+            </a:r>
+          </a:p>
+          <a:p>
             <a:r>
               <a:rPr lang="de-DE" dirty="0" smtClean="0"/>
-              <a:t>„Funktion“</a:t>
-            </a:r>
-            <a:endParaRPr lang="de-DE" dirty="0"/>
+              <a:t>„</a:t>
+            </a:r>
+            <a:r>
+              <a:rPr lang="de-DE" dirty="0" err="1" smtClean="0"/>
+              <a:t>Responsive</a:t>
+            </a:r>
+            <a:r>
+              <a:rPr lang="de-DE" dirty="0" smtClean="0"/>
+              <a:t> Design“ vorhanden</a:t>
+            </a:r>
+          </a:p>
+          <a:p>
+            <a:r>
+              <a:rPr lang="de-DE" dirty="0" smtClean="0"/>
+              <a:t>Farbliche Gruppierung von Modulen</a:t>
+            </a:r>
           </a:p>
           <a:p>
             <a:pPr marL="0" indent="0">
@@ -5257,819 +5193,36 @@
             </a:pPr>
             <a:endParaRPr lang="de-DE" dirty="0"/>
           </a:p>
-        </p:txBody>
-      </p:sp>
-      <p:sp>
-        <p:nvSpPr>
-          <p:cNvPr id="19" name="Rechteck 18"/>
-          <p:cNvSpPr/>
-          <p:nvPr/>
-        </p:nvSpPr>
-        <p:spPr>
-          <a:xfrm>
-            <a:off x="526520" y="2690162"/>
-            <a:ext cx="2173272" cy="306790"/>
-          </a:xfrm>
-          <a:prstGeom prst="rect">
-            <a:avLst/>
-          </a:prstGeom>
-          <a:solidFill>
-            <a:schemeClr val="bg1">
-              <a:lumMod val="85000"/>
-            </a:schemeClr>
-          </a:solidFill>
-          <a:ln>
-            <a:solidFill>
-              <a:schemeClr val="bg1">
-                <a:lumMod val="50000"/>
-              </a:schemeClr>
-            </a:solidFill>
-          </a:ln>
-        </p:spPr>
-        <p:style>
-          <a:lnRef idx="2">
-            <a:schemeClr val="accent1">
-              <a:shade val="50000"/>
-            </a:schemeClr>
-          </a:lnRef>
-          <a:fillRef idx="1">
-            <a:schemeClr val="accent1"/>
-          </a:fillRef>
-          <a:effectRef idx="0">
-            <a:schemeClr val="accent1"/>
-          </a:effectRef>
-          <a:fontRef idx="minor">
-            <a:schemeClr val="lt1"/>
-          </a:fontRef>
-        </p:style>
-        <p:txBody>
-          <a:bodyPr rtlCol="0" anchor="ctr"/>
-          <a:lstStyle/>
-          <a:p>
-            <a:pPr algn="ctr"/>
-            <a:endParaRPr lang="de-DE"/>
-          </a:p>
-        </p:txBody>
-      </p:sp>
-      <p:sp>
-        <p:nvSpPr>
-          <p:cNvPr id="20" name="Rechteck 19"/>
-          <p:cNvSpPr/>
-          <p:nvPr/>
-        </p:nvSpPr>
-        <p:spPr>
-          <a:xfrm>
-            <a:off x="1006325" y="3594920"/>
-            <a:ext cx="1872208" cy="231985"/>
-          </a:xfrm>
-          <a:prstGeom prst="rect">
-            <a:avLst/>
-          </a:prstGeom>
-          <a:solidFill>
-            <a:schemeClr val="bg1">
-              <a:lumMod val="85000"/>
-            </a:schemeClr>
-          </a:solidFill>
-          <a:ln>
-            <a:solidFill>
-              <a:schemeClr val="bg1">
-                <a:lumMod val="50000"/>
-              </a:schemeClr>
-            </a:solidFill>
-          </a:ln>
-        </p:spPr>
-        <p:style>
-          <a:lnRef idx="2">
-            <a:schemeClr val="accent1">
-              <a:shade val="50000"/>
-            </a:schemeClr>
-          </a:lnRef>
-          <a:fillRef idx="1">
-            <a:schemeClr val="accent1"/>
-          </a:fillRef>
-          <a:effectRef idx="0">
-            <a:schemeClr val="accent1"/>
-          </a:effectRef>
-          <a:fontRef idx="minor">
-            <a:schemeClr val="lt1"/>
-          </a:fontRef>
-        </p:style>
-        <p:txBody>
-          <a:bodyPr rtlCol="0" anchor="ctr"/>
-          <a:lstStyle/>
-          <a:p>
-            <a:pPr algn="ctr"/>
-            <a:endParaRPr lang="de-DE"/>
-          </a:p>
-        </p:txBody>
-      </p:sp>
-      <p:sp>
-        <p:nvSpPr>
-          <p:cNvPr id="21" name="Rechteck 20"/>
-          <p:cNvSpPr/>
-          <p:nvPr/>
-        </p:nvSpPr>
-        <p:spPr>
-          <a:xfrm>
-            <a:off x="1008883" y="4432726"/>
-            <a:ext cx="4032448" cy="652458"/>
-          </a:xfrm>
-          <a:prstGeom prst="rect">
-            <a:avLst/>
-          </a:prstGeom>
-          <a:solidFill>
-            <a:schemeClr val="bg1">
-              <a:lumMod val="85000"/>
-            </a:schemeClr>
-          </a:solidFill>
-          <a:ln>
-            <a:solidFill>
-              <a:schemeClr val="bg1">
-                <a:lumMod val="50000"/>
-              </a:schemeClr>
-            </a:solidFill>
-          </a:ln>
-        </p:spPr>
-        <p:style>
-          <a:lnRef idx="2">
-            <a:schemeClr val="accent1">
-              <a:shade val="50000"/>
-            </a:schemeClr>
-          </a:lnRef>
-          <a:fillRef idx="1">
-            <a:schemeClr val="accent1"/>
-          </a:fillRef>
-          <a:effectRef idx="0">
-            <a:schemeClr val="accent1"/>
-          </a:effectRef>
-          <a:fontRef idx="minor">
-            <a:schemeClr val="lt1"/>
-          </a:fontRef>
-        </p:style>
-        <p:txBody>
-          <a:bodyPr rtlCol="0" anchor="ctr"/>
-          <a:lstStyle/>
-          <a:p>
-            <a:pPr algn="ctr"/>
-            <a:endParaRPr lang="de-DE"/>
-          </a:p>
-        </p:txBody>
-      </p:sp>
-      <p:sp>
-        <p:nvSpPr>
-          <p:cNvPr id="6" name="Textfeld 5"/>
-          <p:cNvSpPr txBox="1"/>
-          <p:nvPr/>
-        </p:nvSpPr>
-        <p:spPr>
-          <a:xfrm>
-            <a:off x="467544" y="1844824"/>
-            <a:ext cx="6413935" cy="4616648"/>
-          </a:xfrm>
-          <a:prstGeom prst="rect">
-            <a:avLst/>
-          </a:prstGeom>
-          <a:noFill/>
-        </p:spPr>
-        <p:txBody>
-          <a:bodyPr wrap="none" rtlCol="0">
-            <a:spAutoFit/>
-          </a:bodyPr>
-          <a:lstStyle/>
-          <a:p>
-            <a:r>
-              <a:rPr lang="de-DE" sz="1400" b="1" dirty="0" smtClean="0">
-                <a:latin typeface="Courier New" panose="02070309020205020404" pitchFamily="49" charset="0"/>
-                <a:cs typeface="Courier New" panose="02070309020205020404" pitchFamily="49" charset="0"/>
-              </a:rPr>
-              <a:t>&lt;</a:t>
-            </a:r>
-            <a:r>
-              <a:rPr lang="de-DE" sz="1400" b="1" dirty="0" err="1">
-                <a:latin typeface="Courier New" panose="02070309020205020404" pitchFamily="49" charset="0"/>
-                <a:cs typeface="Courier New" panose="02070309020205020404" pitchFamily="49" charset="0"/>
-              </a:rPr>
-              <a:t>script</a:t>
-            </a:r>
-            <a:r>
-              <a:rPr lang="de-DE" sz="1400" b="1" dirty="0">
-                <a:latin typeface="Courier New" panose="02070309020205020404" pitchFamily="49" charset="0"/>
-                <a:cs typeface="Courier New" panose="02070309020205020404" pitchFamily="49" charset="0"/>
-              </a:rPr>
-              <a:t> </a:t>
-            </a:r>
-            <a:r>
-              <a:rPr lang="de-DE" sz="1400" b="1" dirty="0" err="1">
-                <a:latin typeface="Courier New" panose="02070309020205020404" pitchFamily="49" charset="0"/>
-                <a:cs typeface="Courier New" panose="02070309020205020404" pitchFamily="49" charset="0"/>
-              </a:rPr>
-              <a:t>src</a:t>
-            </a:r>
-            <a:r>
-              <a:rPr lang="de-DE" sz="1400" b="1" dirty="0">
-                <a:latin typeface="Courier New" panose="02070309020205020404" pitchFamily="49" charset="0"/>
-                <a:cs typeface="Courier New" panose="02070309020205020404" pitchFamily="49" charset="0"/>
-              </a:rPr>
-              <a:t>="http://www.d3plus.org/js/d3.js"&gt;&lt;/script&gt;</a:t>
-            </a:r>
-          </a:p>
-          <a:p>
-            <a:r>
-              <a:rPr lang="de-DE" sz="1400" b="1" dirty="0" smtClean="0">
-                <a:latin typeface="Courier New" panose="02070309020205020404" pitchFamily="49" charset="0"/>
-                <a:cs typeface="Courier New" panose="02070309020205020404" pitchFamily="49" charset="0"/>
-              </a:rPr>
-              <a:t>&lt;</a:t>
-            </a:r>
-            <a:r>
-              <a:rPr lang="de-DE" sz="1400" b="1" dirty="0" err="1" smtClean="0">
-                <a:latin typeface="Courier New" panose="02070309020205020404" pitchFamily="49" charset="0"/>
-                <a:cs typeface="Courier New" panose="02070309020205020404" pitchFamily="49" charset="0"/>
-              </a:rPr>
-              <a:t>script</a:t>
-            </a:r>
-            <a:r>
-              <a:rPr lang="de-DE" sz="1400" b="1" dirty="0" smtClean="0">
-                <a:latin typeface="Courier New" panose="02070309020205020404" pitchFamily="49" charset="0"/>
-                <a:cs typeface="Courier New" panose="02070309020205020404" pitchFamily="49" charset="0"/>
-              </a:rPr>
-              <a:t> </a:t>
-            </a:r>
-            <a:r>
-              <a:rPr lang="de-DE" sz="1400" b="1" dirty="0" err="1" smtClean="0">
-                <a:latin typeface="Courier New" panose="02070309020205020404" pitchFamily="49" charset="0"/>
-                <a:cs typeface="Courier New" panose="02070309020205020404" pitchFamily="49" charset="0"/>
-              </a:rPr>
-              <a:t>src</a:t>
-            </a:r>
-            <a:r>
-              <a:rPr lang="de-DE" sz="1400" b="1" dirty="0" smtClean="0">
-                <a:latin typeface="Courier New" panose="02070309020205020404" pitchFamily="49" charset="0"/>
-                <a:cs typeface="Courier New" panose="02070309020205020404" pitchFamily="49" charset="0"/>
-              </a:rPr>
-              <a:t>="http://www.d3plus.org/js/d3.min.js"&gt;&lt;/script&gt;</a:t>
-            </a:r>
-          </a:p>
-          <a:p>
-            <a:r>
-              <a:rPr lang="de-DE" sz="1400" b="1" dirty="0" smtClean="0">
-                <a:latin typeface="Courier New" panose="02070309020205020404" pitchFamily="49" charset="0"/>
-                <a:cs typeface="Courier New" panose="02070309020205020404" pitchFamily="49" charset="0"/>
-              </a:rPr>
-              <a:t>&lt;</a:t>
-            </a:r>
-            <a:r>
-              <a:rPr lang="de-DE" sz="1400" b="1" dirty="0" err="1" smtClean="0">
-                <a:latin typeface="Courier New" panose="02070309020205020404" pitchFamily="49" charset="0"/>
-                <a:cs typeface="Courier New" panose="02070309020205020404" pitchFamily="49" charset="0"/>
-              </a:rPr>
-              <a:t>script</a:t>
-            </a:r>
-            <a:r>
-              <a:rPr lang="de-DE" sz="1400" b="1" dirty="0" smtClean="0">
-                <a:latin typeface="Courier New" panose="02070309020205020404" pitchFamily="49" charset="0"/>
-                <a:cs typeface="Courier New" panose="02070309020205020404" pitchFamily="49" charset="0"/>
-              </a:rPr>
-              <a:t> </a:t>
-            </a:r>
-            <a:r>
-              <a:rPr lang="de-DE" sz="1400" b="1" dirty="0" err="1" smtClean="0">
-                <a:latin typeface="Courier New" panose="02070309020205020404" pitchFamily="49" charset="0"/>
-                <a:cs typeface="Courier New" panose="02070309020205020404" pitchFamily="49" charset="0"/>
-              </a:rPr>
-              <a:t>src</a:t>
-            </a:r>
-            <a:r>
-              <a:rPr lang="de-DE" sz="1400" b="1" dirty="0" smtClean="0">
-                <a:latin typeface="Courier New" panose="02070309020205020404" pitchFamily="49" charset="0"/>
-                <a:cs typeface="Courier New" panose="02070309020205020404" pitchFamily="49" charset="0"/>
-              </a:rPr>
-              <a:t>="http://www.d3plus.org/js/d3plus.js"&gt;&lt;/script&gt;</a:t>
-            </a:r>
-          </a:p>
-          <a:p>
-            <a:endParaRPr lang="de-DE" sz="1400" b="1" dirty="0">
-              <a:latin typeface="Courier New" panose="02070309020205020404" pitchFamily="49" charset="0"/>
-              <a:cs typeface="Courier New" panose="02070309020205020404" pitchFamily="49" charset="0"/>
-            </a:endParaRPr>
-          </a:p>
-          <a:p>
-            <a:r>
-              <a:rPr lang="de-DE" sz="1400" b="1" dirty="0">
-                <a:latin typeface="Courier New" panose="02070309020205020404" pitchFamily="49" charset="0"/>
-                <a:cs typeface="Courier New" panose="02070309020205020404" pitchFamily="49" charset="0"/>
-              </a:rPr>
-              <a:t>&lt;div </a:t>
-            </a:r>
-            <a:r>
-              <a:rPr lang="de-DE" sz="1400" b="1" dirty="0" err="1">
-                <a:latin typeface="Courier New" panose="02070309020205020404" pitchFamily="49" charset="0"/>
-                <a:cs typeface="Courier New" panose="02070309020205020404" pitchFamily="49" charset="0"/>
-              </a:rPr>
-              <a:t>id</a:t>
-            </a:r>
-            <a:r>
-              <a:rPr lang="de-DE" sz="1400" b="1" dirty="0">
-                <a:latin typeface="Courier New" panose="02070309020205020404" pitchFamily="49" charset="0"/>
-                <a:cs typeface="Courier New" panose="02070309020205020404" pitchFamily="49" charset="0"/>
-              </a:rPr>
-              <a:t>="</a:t>
-            </a:r>
-            <a:r>
-              <a:rPr lang="de-DE" sz="1400" b="1" dirty="0" err="1">
-                <a:latin typeface="Courier New" panose="02070309020205020404" pitchFamily="49" charset="0"/>
-                <a:cs typeface="Courier New" panose="02070309020205020404" pitchFamily="49" charset="0"/>
-              </a:rPr>
-              <a:t>viz</a:t>
-            </a:r>
-            <a:r>
-              <a:rPr lang="de-DE" sz="1400" b="1" dirty="0">
-                <a:latin typeface="Courier New" panose="02070309020205020404" pitchFamily="49" charset="0"/>
-                <a:cs typeface="Courier New" panose="02070309020205020404" pitchFamily="49" charset="0"/>
-              </a:rPr>
-              <a:t>"&gt;&lt;/div&gt;</a:t>
-            </a:r>
-          </a:p>
-          <a:p>
-            <a:endParaRPr lang="de-DE" sz="1400" b="1" dirty="0">
-              <a:latin typeface="Courier New" panose="02070309020205020404" pitchFamily="49" charset="0"/>
-              <a:cs typeface="Courier New" panose="02070309020205020404" pitchFamily="49" charset="0"/>
-            </a:endParaRPr>
-          </a:p>
-          <a:p>
-            <a:r>
-              <a:rPr lang="de-DE" sz="1400" b="1" dirty="0">
-                <a:latin typeface="Courier New" panose="02070309020205020404" pitchFamily="49" charset="0"/>
-                <a:cs typeface="Courier New" panose="02070309020205020404" pitchFamily="49" charset="0"/>
-              </a:rPr>
-              <a:t>&lt;</a:t>
-            </a:r>
-            <a:r>
-              <a:rPr lang="de-DE" sz="1400" b="1" dirty="0" err="1">
-                <a:latin typeface="Courier New" panose="02070309020205020404" pitchFamily="49" charset="0"/>
-                <a:cs typeface="Courier New" panose="02070309020205020404" pitchFamily="49" charset="0"/>
-              </a:rPr>
-              <a:t>script</a:t>
-            </a:r>
-            <a:r>
-              <a:rPr lang="de-DE" sz="1400" b="1" dirty="0">
-                <a:latin typeface="Courier New" panose="02070309020205020404" pitchFamily="49" charset="0"/>
-                <a:cs typeface="Courier New" panose="02070309020205020404" pitchFamily="49" charset="0"/>
-              </a:rPr>
-              <a:t>&gt;</a:t>
-            </a:r>
-          </a:p>
-          <a:p>
-            <a:r>
-              <a:rPr lang="de-DE" sz="1400" b="1" dirty="0" err="1" smtClean="0">
-                <a:latin typeface="Courier New" panose="02070309020205020404" pitchFamily="49" charset="0"/>
-                <a:cs typeface="Courier New" panose="02070309020205020404" pitchFamily="49" charset="0"/>
-              </a:rPr>
-              <a:t>var</a:t>
-            </a:r>
-            <a:r>
-              <a:rPr lang="de-DE" sz="1400" b="1" dirty="0" smtClean="0">
-                <a:latin typeface="Courier New" panose="02070309020205020404" pitchFamily="49" charset="0"/>
-                <a:cs typeface="Courier New" panose="02070309020205020404" pitchFamily="49" charset="0"/>
-              </a:rPr>
-              <a:t> </a:t>
-            </a:r>
-            <a:r>
-              <a:rPr lang="de-DE" sz="1400" b="1" dirty="0" err="1">
-                <a:latin typeface="Courier New" panose="02070309020205020404" pitchFamily="49" charset="0"/>
-                <a:cs typeface="Courier New" panose="02070309020205020404" pitchFamily="49" charset="0"/>
-              </a:rPr>
-              <a:t>visualization</a:t>
-            </a:r>
-            <a:r>
-              <a:rPr lang="de-DE" sz="1400" b="1" dirty="0">
-                <a:latin typeface="Courier New" panose="02070309020205020404" pitchFamily="49" charset="0"/>
-                <a:cs typeface="Courier New" panose="02070309020205020404" pitchFamily="49" charset="0"/>
-              </a:rPr>
-              <a:t> = d3plus.viz()</a:t>
-            </a:r>
-          </a:p>
-          <a:p>
-            <a:r>
-              <a:rPr lang="de-DE" sz="1400" b="1" dirty="0">
-                <a:latin typeface="Courier New" panose="02070309020205020404" pitchFamily="49" charset="0"/>
-                <a:cs typeface="Courier New" panose="02070309020205020404" pitchFamily="49" charset="0"/>
-              </a:rPr>
-              <a:t>    .</a:t>
-            </a:r>
-            <a:r>
-              <a:rPr lang="de-DE" sz="1400" b="1" dirty="0" err="1">
-                <a:latin typeface="Courier New" panose="02070309020205020404" pitchFamily="49" charset="0"/>
-                <a:cs typeface="Courier New" panose="02070309020205020404" pitchFamily="49" charset="0"/>
-              </a:rPr>
-              <a:t>container</a:t>
-            </a:r>
-            <a:r>
-              <a:rPr lang="de-DE" sz="1400" b="1" dirty="0">
-                <a:latin typeface="Courier New" panose="02070309020205020404" pitchFamily="49" charset="0"/>
-                <a:cs typeface="Courier New" panose="02070309020205020404" pitchFamily="49" charset="0"/>
-              </a:rPr>
-              <a:t>("#</a:t>
-            </a:r>
-            <a:r>
-              <a:rPr lang="de-DE" sz="1400" b="1" dirty="0" err="1">
-                <a:latin typeface="Courier New" panose="02070309020205020404" pitchFamily="49" charset="0"/>
-                <a:cs typeface="Courier New" panose="02070309020205020404" pitchFamily="49" charset="0"/>
-              </a:rPr>
-              <a:t>viz</a:t>
-            </a:r>
-            <a:r>
-              <a:rPr lang="de-DE" sz="1400" b="1" dirty="0">
-                <a:latin typeface="Courier New" panose="02070309020205020404" pitchFamily="49" charset="0"/>
-                <a:cs typeface="Courier New" panose="02070309020205020404" pitchFamily="49" charset="0"/>
-              </a:rPr>
-              <a:t>")</a:t>
-            </a:r>
-          </a:p>
-          <a:p>
-            <a:r>
-              <a:rPr lang="de-DE" sz="1400" b="1" dirty="0">
-                <a:latin typeface="Courier New" panose="02070309020205020404" pitchFamily="49" charset="0"/>
-                <a:cs typeface="Courier New" panose="02070309020205020404" pitchFamily="49" charset="0"/>
-              </a:rPr>
-              <a:t>    .</a:t>
-            </a:r>
-            <a:r>
-              <a:rPr lang="de-DE" sz="1400" b="1" dirty="0" err="1">
-                <a:latin typeface="Courier New" panose="02070309020205020404" pitchFamily="49" charset="0"/>
-                <a:cs typeface="Courier New" panose="02070309020205020404" pitchFamily="49" charset="0"/>
-              </a:rPr>
-              <a:t>data</a:t>
-            </a:r>
-            <a:r>
-              <a:rPr lang="de-DE" sz="1400" b="1" dirty="0">
-                <a:latin typeface="Courier New" panose="02070309020205020404" pitchFamily="49" charset="0"/>
-                <a:cs typeface="Courier New" panose="02070309020205020404" pitchFamily="49" charset="0"/>
-              </a:rPr>
-              <a:t>("</a:t>
-            </a:r>
-            <a:r>
-              <a:rPr lang="de-DE" sz="1400" b="1" dirty="0" err="1">
-                <a:latin typeface="Courier New" panose="02070309020205020404" pitchFamily="49" charset="0"/>
-                <a:cs typeface="Courier New" panose="02070309020205020404" pitchFamily="49" charset="0"/>
-              </a:rPr>
-              <a:t>data</a:t>
-            </a:r>
-            <a:r>
-              <a:rPr lang="de-DE" sz="1400" b="1" dirty="0">
-                <a:latin typeface="Courier New" panose="02070309020205020404" pitchFamily="49" charset="0"/>
-                <a:cs typeface="Courier New" panose="02070309020205020404" pitchFamily="49" charset="0"/>
-              </a:rPr>
-              <a:t>/</a:t>
-            </a:r>
-            <a:r>
-              <a:rPr lang="de-DE" sz="1400" b="1" dirty="0" err="1">
-                <a:latin typeface="Courier New" panose="02070309020205020404" pitchFamily="49" charset="0"/>
-                <a:cs typeface="Courier New" panose="02070309020205020404" pitchFamily="49" charset="0"/>
-              </a:rPr>
-              <a:t>modulhandbuch.json</a:t>
-            </a:r>
-            <a:r>
-              <a:rPr lang="de-DE" sz="1400" b="1" dirty="0">
-                <a:latin typeface="Courier New" panose="02070309020205020404" pitchFamily="49" charset="0"/>
-                <a:cs typeface="Courier New" panose="02070309020205020404" pitchFamily="49" charset="0"/>
-              </a:rPr>
-              <a:t>")</a:t>
-            </a:r>
-          </a:p>
-          <a:p>
-            <a:r>
-              <a:rPr lang="de-DE" sz="1400" b="1" dirty="0">
-                <a:latin typeface="Courier New" panose="02070309020205020404" pitchFamily="49" charset="0"/>
-                <a:cs typeface="Courier New" panose="02070309020205020404" pitchFamily="49" charset="0"/>
-              </a:rPr>
-              <a:t>    .</a:t>
-            </a:r>
-            <a:r>
-              <a:rPr lang="de-DE" sz="1400" b="1" dirty="0" err="1">
-                <a:latin typeface="Courier New" panose="02070309020205020404" pitchFamily="49" charset="0"/>
-                <a:cs typeface="Courier New" panose="02070309020205020404" pitchFamily="49" charset="0"/>
-              </a:rPr>
-              <a:t>messages</a:t>
-            </a:r>
-            <a:r>
-              <a:rPr lang="de-DE" sz="1400" b="1" dirty="0">
-                <a:latin typeface="Courier New" panose="02070309020205020404" pitchFamily="49" charset="0"/>
-                <a:cs typeface="Courier New" panose="02070309020205020404" pitchFamily="49" charset="0"/>
-              </a:rPr>
-              <a:t>( "Das Modulhandbuch wird geladen ..." )</a:t>
-            </a:r>
-          </a:p>
-          <a:p>
-            <a:r>
-              <a:rPr lang="de-DE" sz="1400" b="1" dirty="0">
-                <a:latin typeface="Courier New" panose="02070309020205020404" pitchFamily="49" charset="0"/>
-                <a:cs typeface="Courier New" panose="02070309020205020404" pitchFamily="49" charset="0"/>
-              </a:rPr>
-              <a:t>    .type("</a:t>
-            </a:r>
-            <a:r>
-              <a:rPr lang="de-DE" sz="1400" b="1" dirty="0" err="1">
-                <a:latin typeface="Courier New" panose="02070309020205020404" pitchFamily="49" charset="0"/>
-                <a:cs typeface="Courier New" panose="02070309020205020404" pitchFamily="49" charset="0"/>
-              </a:rPr>
-              <a:t>tree_map</a:t>
-            </a:r>
-            <a:r>
-              <a:rPr lang="de-DE" sz="1400" b="1" dirty="0">
-                <a:latin typeface="Courier New" panose="02070309020205020404" pitchFamily="49" charset="0"/>
-                <a:cs typeface="Courier New" panose="02070309020205020404" pitchFamily="49" charset="0"/>
-              </a:rPr>
-              <a:t>")</a:t>
-            </a:r>
-          </a:p>
-          <a:p>
-            <a:r>
-              <a:rPr lang="de-DE" sz="1400" b="1" dirty="0">
-                <a:latin typeface="Courier New" panose="02070309020205020404" pitchFamily="49" charset="0"/>
-                <a:cs typeface="Courier New" panose="02070309020205020404" pitchFamily="49" charset="0"/>
-              </a:rPr>
-              <a:t>    .</a:t>
-            </a:r>
-            <a:r>
-              <a:rPr lang="de-DE" sz="1400" b="1" dirty="0" err="1">
-                <a:latin typeface="Courier New" panose="02070309020205020404" pitchFamily="49" charset="0"/>
-                <a:cs typeface="Courier New" panose="02070309020205020404" pitchFamily="49" charset="0"/>
-              </a:rPr>
-              <a:t>id</a:t>
-            </a:r>
-            <a:r>
-              <a:rPr lang="de-DE" sz="1400" b="1" dirty="0">
-                <a:latin typeface="Courier New" panose="02070309020205020404" pitchFamily="49" charset="0"/>
-                <a:cs typeface="Courier New" panose="02070309020205020404" pitchFamily="49" charset="0"/>
-              </a:rPr>
-              <a:t>(["Studiengang","Vorlesung","</a:t>
-            </a:r>
-            <a:r>
-              <a:rPr lang="de-DE" sz="1400" b="1" dirty="0" err="1">
-                <a:latin typeface="Courier New" panose="02070309020205020404" pitchFamily="49" charset="0"/>
-                <a:cs typeface="Courier New" panose="02070309020205020404" pitchFamily="49" charset="0"/>
-              </a:rPr>
-              <a:t>gid</a:t>
-            </a:r>
-            <a:r>
-              <a:rPr lang="de-DE" sz="1400" b="1" dirty="0">
-                <a:latin typeface="Courier New" panose="02070309020205020404" pitchFamily="49" charset="0"/>
-                <a:cs typeface="Courier New" panose="02070309020205020404" pitchFamily="49" charset="0"/>
-              </a:rPr>
-              <a:t>"])</a:t>
-            </a:r>
-          </a:p>
-          <a:p>
-            <a:r>
-              <a:rPr lang="de-DE" sz="1400" b="1" dirty="0">
-                <a:latin typeface="Courier New" panose="02070309020205020404" pitchFamily="49" charset="0"/>
-                <a:cs typeface="Courier New" panose="02070309020205020404" pitchFamily="49" charset="0"/>
-              </a:rPr>
-              <a:t>    .</a:t>
-            </a:r>
-            <a:r>
-              <a:rPr lang="de-DE" sz="1400" b="1" dirty="0" err="1">
-                <a:latin typeface="Courier New" panose="02070309020205020404" pitchFamily="49" charset="0"/>
-                <a:cs typeface="Courier New" panose="02070309020205020404" pitchFamily="49" charset="0"/>
-              </a:rPr>
-              <a:t>size</a:t>
-            </a:r>
-            <a:r>
-              <a:rPr lang="de-DE" sz="1400" b="1" dirty="0">
-                <a:latin typeface="Courier New" panose="02070309020205020404" pitchFamily="49" charset="0"/>
-                <a:cs typeface="Courier New" panose="02070309020205020404" pitchFamily="49" charset="0"/>
-              </a:rPr>
-              <a:t>("</a:t>
-            </a:r>
-            <a:r>
-              <a:rPr lang="de-DE" sz="1400" b="1" dirty="0" err="1">
-                <a:latin typeface="Courier New" panose="02070309020205020404" pitchFamily="49" charset="0"/>
-                <a:cs typeface="Courier New" panose="02070309020205020404" pitchFamily="49" charset="0"/>
-              </a:rPr>
-              <a:t>value</a:t>
-            </a:r>
-            <a:r>
-              <a:rPr lang="de-DE" sz="1400" b="1" dirty="0">
-                <a:latin typeface="Courier New" panose="02070309020205020404" pitchFamily="49" charset="0"/>
-                <a:cs typeface="Courier New" panose="02070309020205020404" pitchFamily="49" charset="0"/>
-              </a:rPr>
-              <a:t>")</a:t>
-            </a:r>
-          </a:p>
-          <a:p>
-            <a:r>
-              <a:rPr lang="de-DE" sz="1400" b="1" dirty="0">
-                <a:latin typeface="Courier New" panose="02070309020205020404" pitchFamily="49" charset="0"/>
-                <a:cs typeface="Courier New" panose="02070309020205020404" pitchFamily="49" charset="0"/>
-              </a:rPr>
-              <a:t>    .</a:t>
-            </a:r>
-            <a:r>
-              <a:rPr lang="de-DE" sz="1400" b="1" dirty="0" err="1">
-                <a:latin typeface="Courier New" panose="02070309020205020404" pitchFamily="49" charset="0"/>
-                <a:cs typeface="Courier New" panose="02070309020205020404" pitchFamily="49" charset="0"/>
-              </a:rPr>
-              <a:t>color</a:t>
-            </a:r>
-            <a:r>
-              <a:rPr lang="de-DE" sz="1400" b="1" dirty="0">
-                <a:latin typeface="Courier New" panose="02070309020205020404" pitchFamily="49" charset="0"/>
-                <a:cs typeface="Courier New" panose="02070309020205020404" pitchFamily="49" charset="0"/>
-              </a:rPr>
-              <a:t>("</a:t>
-            </a:r>
-            <a:r>
-              <a:rPr lang="de-DE" sz="1400" b="1" dirty="0" err="1">
-                <a:latin typeface="Courier New" panose="02070309020205020404" pitchFamily="49" charset="0"/>
-                <a:cs typeface="Courier New" panose="02070309020205020404" pitchFamily="49" charset="0"/>
-              </a:rPr>
-              <a:t>colorful</a:t>
-            </a:r>
-            <a:r>
-              <a:rPr lang="de-DE" sz="1400" b="1" dirty="0">
-                <a:latin typeface="Courier New" panose="02070309020205020404" pitchFamily="49" charset="0"/>
-                <a:cs typeface="Courier New" panose="02070309020205020404" pitchFamily="49" charset="0"/>
-              </a:rPr>
-              <a:t>")</a:t>
-            </a:r>
-          </a:p>
-          <a:p>
-            <a:r>
-              <a:rPr lang="de-DE" sz="1400" b="1" dirty="0">
-                <a:latin typeface="Courier New" panose="02070309020205020404" pitchFamily="49" charset="0"/>
-                <a:cs typeface="Courier New" panose="02070309020205020404" pitchFamily="49" charset="0"/>
-              </a:rPr>
-              <a:t>    .style({"</a:t>
-            </a:r>
-            <a:r>
-              <a:rPr lang="de-DE" sz="1400" b="1" dirty="0" err="1">
-                <a:latin typeface="Courier New" panose="02070309020205020404" pitchFamily="49" charset="0"/>
-                <a:cs typeface="Courier New" panose="02070309020205020404" pitchFamily="49" charset="0"/>
-              </a:rPr>
-              <a:t>labels</a:t>
-            </a:r>
-            <a:r>
-              <a:rPr lang="de-DE" sz="1400" b="1" dirty="0">
-                <a:latin typeface="Courier New" panose="02070309020205020404" pitchFamily="49" charset="0"/>
-                <a:cs typeface="Courier New" panose="02070309020205020404" pitchFamily="49" charset="0"/>
-              </a:rPr>
-              <a:t>": {"</a:t>
-            </a:r>
-            <a:r>
-              <a:rPr lang="de-DE" sz="1400" b="1" dirty="0" err="1">
-                <a:latin typeface="Courier New" panose="02070309020205020404" pitchFamily="49" charset="0"/>
-                <a:cs typeface="Courier New" panose="02070309020205020404" pitchFamily="49" charset="0"/>
-              </a:rPr>
-              <a:t>align</a:t>
-            </a:r>
-            <a:r>
-              <a:rPr lang="de-DE" sz="1400" b="1" dirty="0">
-                <a:latin typeface="Courier New" panose="02070309020205020404" pitchFamily="49" charset="0"/>
-                <a:cs typeface="Courier New" panose="02070309020205020404" pitchFamily="49" charset="0"/>
-              </a:rPr>
-              <a:t>": "top"}})</a:t>
-            </a:r>
-          </a:p>
-          <a:p>
-            <a:r>
-              <a:rPr lang="de-DE" sz="1400" b="1" dirty="0">
-                <a:latin typeface="Courier New" panose="02070309020205020404" pitchFamily="49" charset="0"/>
-                <a:cs typeface="Courier New" panose="02070309020205020404" pitchFamily="49" charset="0"/>
-              </a:rPr>
-              <a:t>    .</a:t>
-            </a:r>
-            <a:r>
-              <a:rPr lang="de-DE" sz="1400" b="1" dirty="0" err="1">
-                <a:latin typeface="Courier New" panose="02070309020205020404" pitchFamily="49" charset="0"/>
-                <a:cs typeface="Courier New" panose="02070309020205020404" pitchFamily="49" charset="0"/>
-              </a:rPr>
-              <a:t>font</a:t>
-            </a:r>
-            <a:r>
-              <a:rPr lang="de-DE" sz="1400" b="1" dirty="0">
-                <a:latin typeface="Courier New" panose="02070309020205020404" pitchFamily="49" charset="0"/>
-                <a:cs typeface="Courier New" panose="02070309020205020404" pitchFamily="49" charset="0"/>
-              </a:rPr>
-              <a:t>({ "</a:t>
-            </a:r>
-            <a:r>
-              <a:rPr lang="de-DE" sz="1400" b="1" dirty="0" err="1">
-                <a:latin typeface="Courier New" panose="02070309020205020404" pitchFamily="49" charset="0"/>
-                <a:cs typeface="Courier New" panose="02070309020205020404" pitchFamily="49" charset="0"/>
-              </a:rPr>
-              <a:t>family</a:t>
-            </a:r>
-            <a:r>
-              <a:rPr lang="de-DE" sz="1400" b="1" dirty="0">
-                <a:latin typeface="Courier New" panose="02070309020205020404" pitchFamily="49" charset="0"/>
-                <a:cs typeface="Courier New" panose="02070309020205020404" pitchFamily="49" charset="0"/>
-              </a:rPr>
-              <a:t>": "Times" })</a:t>
-            </a:r>
-          </a:p>
-          <a:p>
-            <a:r>
-              <a:rPr lang="de-DE" sz="1400" b="1" dirty="0">
-                <a:latin typeface="Courier New" panose="02070309020205020404" pitchFamily="49" charset="0"/>
-                <a:cs typeface="Courier New" panose="02070309020205020404" pitchFamily="49" charset="0"/>
-              </a:rPr>
-              <a:t>    .title("Modulhandbuch der Hochschule Worms")</a:t>
-            </a:r>
-          </a:p>
-          <a:p>
-            <a:r>
-              <a:rPr lang="de-DE" sz="1400" b="1" dirty="0">
-                <a:latin typeface="Courier New" panose="02070309020205020404" pitchFamily="49" charset="0"/>
-                <a:cs typeface="Courier New" panose="02070309020205020404" pitchFamily="49" charset="0"/>
-              </a:rPr>
-              <a:t>    .</a:t>
-            </a:r>
-            <a:r>
-              <a:rPr lang="de-DE" sz="1400" b="1" dirty="0" err="1">
-                <a:latin typeface="Courier New" panose="02070309020205020404" pitchFamily="49" charset="0"/>
-                <a:cs typeface="Courier New" panose="02070309020205020404" pitchFamily="49" charset="0"/>
-              </a:rPr>
-              <a:t>depth</a:t>
-            </a:r>
-            <a:r>
-              <a:rPr lang="de-DE" sz="1400" b="1" dirty="0">
-                <a:latin typeface="Courier New" panose="02070309020205020404" pitchFamily="49" charset="0"/>
-                <a:cs typeface="Courier New" panose="02070309020205020404" pitchFamily="49" charset="0"/>
-              </a:rPr>
-              <a:t>(0)</a:t>
-            </a:r>
-          </a:p>
-          <a:p>
-            <a:r>
-              <a:rPr lang="de-DE" sz="1400" b="1" dirty="0">
-                <a:latin typeface="Courier New" panose="02070309020205020404" pitchFamily="49" charset="0"/>
-                <a:cs typeface="Courier New" panose="02070309020205020404" pitchFamily="49" charset="0"/>
-              </a:rPr>
-              <a:t>    .</a:t>
-            </a:r>
-            <a:r>
-              <a:rPr lang="de-DE" sz="1400" b="1" dirty="0" err="1">
-                <a:latin typeface="Courier New" panose="02070309020205020404" pitchFamily="49" charset="0"/>
-                <a:cs typeface="Courier New" panose="02070309020205020404" pitchFamily="49" charset="0"/>
-              </a:rPr>
-              <a:t>draw</a:t>
-            </a:r>
-            <a:r>
-              <a:rPr lang="de-DE" sz="1400" b="1" dirty="0" smtClean="0">
-                <a:latin typeface="Courier New" panose="02070309020205020404" pitchFamily="49" charset="0"/>
-                <a:cs typeface="Courier New" panose="02070309020205020404" pitchFamily="49" charset="0"/>
-              </a:rPr>
-              <a:t>()</a:t>
-            </a:r>
-            <a:endParaRPr lang="de-DE" sz="1400" b="1" dirty="0">
-              <a:latin typeface="Courier New" panose="02070309020205020404" pitchFamily="49" charset="0"/>
-              <a:cs typeface="Courier New" panose="02070309020205020404" pitchFamily="49" charset="0"/>
-            </a:endParaRPr>
-          </a:p>
-          <a:p>
-            <a:r>
-              <a:rPr lang="de-DE" sz="1400" b="1" dirty="0">
-                <a:latin typeface="Courier New" panose="02070309020205020404" pitchFamily="49" charset="0"/>
-                <a:cs typeface="Courier New" panose="02070309020205020404" pitchFamily="49" charset="0"/>
-              </a:rPr>
-              <a:t>&lt;/</a:t>
-            </a:r>
-            <a:r>
-              <a:rPr lang="de-DE" sz="1400" b="1" dirty="0" err="1">
-                <a:latin typeface="Courier New" panose="02070309020205020404" pitchFamily="49" charset="0"/>
-                <a:cs typeface="Courier New" panose="02070309020205020404" pitchFamily="49" charset="0"/>
-              </a:rPr>
-              <a:t>script</a:t>
-            </a:r>
-            <a:r>
-              <a:rPr lang="de-DE" sz="1400" b="1" dirty="0">
-                <a:latin typeface="Courier New" panose="02070309020205020404" pitchFamily="49" charset="0"/>
-                <a:cs typeface="Courier New" panose="02070309020205020404" pitchFamily="49" charset="0"/>
-              </a:rPr>
-              <a:t>&gt;</a:t>
-            </a:r>
-          </a:p>
-        </p:txBody>
-      </p:sp>
-      <p:sp>
-        <p:nvSpPr>
-          <p:cNvPr id="2" name="Titel 1"/>
-          <p:cNvSpPr>
-            <a:spLocks noGrp="1"/>
-          </p:cNvSpPr>
-          <p:nvPr>
-            <p:ph type="title"/>
-          </p:nvPr>
-        </p:nvSpPr>
-        <p:spPr/>
-        <p:txBody>
-          <a:bodyPr/>
-          <a:lstStyle/>
-          <a:p>
+          <a:p>
+            <a:pPr marL="0" indent="0">
+              <a:buNone/>
+            </a:pPr>
             <a:r>
               <a:rPr lang="de-DE" dirty="0" smtClean="0"/>
-              <a:t>Prototyp „d3plus (2)“ – Code-Auszug</a:t>
+              <a:t>Kontra:</a:t>
+            </a:r>
+          </a:p>
+          <a:p>
+            <a:r>
+              <a:rPr lang="de-DE" dirty="0" smtClean="0"/>
+              <a:t>Gruppierung erschwert Unterebenen</a:t>
+            </a:r>
+          </a:p>
+          <a:p>
+            <a:r>
+              <a:rPr lang="de-DE" dirty="0"/>
+              <a:t>Keine </a:t>
+            </a:r>
+            <a:r>
+              <a:rPr lang="de-DE" dirty="0" smtClean="0"/>
+              <a:t>Visualisierung des Ablaufs</a:t>
+            </a:r>
+            <a:endParaRPr lang="de-DE" dirty="0"/>
+          </a:p>
+          <a:p>
+            <a:r>
+              <a:rPr lang="de-DE" dirty="0" smtClean="0"/>
+              <a:t>Keine Links zum Modulhandbuch</a:t>
             </a:r>
             <a:endParaRPr lang="de-DE" dirty="0"/>
           </a:p>
@@ -6094,1090 +5247,6 @@
               <a:rPr lang="de-DE" smtClean="0"/>
               <a:pPr/>
               <a:t>10</a:t>
-            </a:fld>
-            <a:endParaRPr lang="de-DE"/>
-          </a:p>
-        </p:txBody>
-      </p:sp>
-      <p:sp>
-        <p:nvSpPr>
-          <p:cNvPr id="5" name="Fußzeilenplatzhalter 4"/>
-          <p:cNvSpPr>
-            <a:spLocks noGrp="1"/>
-          </p:cNvSpPr>
-          <p:nvPr>
-            <p:ph type="ftr" sz="quarter" idx="3"/>
-          </p:nvPr>
-        </p:nvSpPr>
-        <p:spPr/>
-        <p:txBody>
-          <a:bodyPr/>
-          <a:lstStyle/>
-          <a:p>
-            <a:r>
-              <a:rPr lang="it-IT" smtClean="0"/>
-              <a:t>Mobile Web | Projekt: Modulhandbuch</a:t>
-            </a:r>
-            <a:endParaRPr lang="de-DE" dirty="0"/>
-          </a:p>
-        </p:txBody>
-      </p:sp>
-    </p:spTree>
-    <p:extLst>
-      <p:ext uri="{BB962C8B-B14F-4D97-AF65-F5344CB8AC3E}">
-        <p14:creationId xmlns:p14="http://schemas.microsoft.com/office/powerpoint/2010/main" val="404689394"/>
-      </p:ext>
-    </p:extLst>
-  </p:cSld>
-  <p:clrMapOvr>
-    <a:masterClrMapping/>
-  </p:clrMapOvr>
-  <p:timing>
-    <p:tnLst>
-      <p:par>
-        <p:cTn xmlns:p14="http://schemas.microsoft.com/office/powerpoint/2010/main" id="1" dur="indefinite" restart="never" nodeType="tmRoot">
-          <p:childTnLst>
-            <p:seq concurrent="1" nextAc="seek">
-              <p:cTn id="2" dur="indefinite" nodeType="mainSeq">
-                <p:childTnLst>
-                  <p:par>
-                    <p:cTn id="3" fill="hold">
-                      <p:stCondLst>
-                        <p:cond delay="indefinite"/>
-                      </p:stCondLst>
-                      <p:childTnLst>
-                        <p:par>
-                          <p:cTn id="4" fill="hold">
-                            <p:stCondLst>
-                              <p:cond delay="0"/>
-                            </p:stCondLst>
-                            <p:childTnLst>
-                              <p:par>
-                                <p:cTn id="5" presetID="1" presetClass="entr" presetSubtype="0" fill="hold" grpId="0" nodeType="clickEffect">
-                                  <p:stCondLst>
-                                    <p:cond delay="0"/>
-                                  </p:stCondLst>
-                                  <p:childTnLst>
-                                    <p:set>
-                                      <p:cBhvr>
-                                        <p:cTn id="6" dur="1" fill="hold">
-                                          <p:stCondLst>
-                                            <p:cond delay="0"/>
-                                          </p:stCondLst>
-                                        </p:cTn>
-                                        <p:tgtEl>
-                                          <p:spTgt spid="19"/>
-                                        </p:tgtEl>
-                                        <p:attrNameLst>
-                                          <p:attrName>style.visibility</p:attrName>
-                                        </p:attrNameLst>
-                                      </p:cBhvr>
-                                      <p:to>
-                                        <p:strVal val="visible"/>
-                                      </p:to>
-                                    </p:set>
-                                  </p:childTnLst>
-                                </p:cTn>
-                              </p:par>
-                              <p:par>
-                                <p:cTn id="7" presetID="1" presetClass="entr" presetSubtype="0" fill="hold" grpId="0" nodeType="withEffect">
-                                  <p:stCondLst>
-                                    <p:cond delay="0"/>
-                                  </p:stCondLst>
-                                  <p:childTnLst>
-                                    <p:set>
-                                      <p:cBhvr>
-                                        <p:cTn id="8" dur="1" fill="hold">
-                                          <p:stCondLst>
-                                            <p:cond delay="0"/>
-                                          </p:stCondLst>
-                                        </p:cTn>
-                                        <p:tgtEl>
-                                          <p:spTgt spid="20"/>
-                                        </p:tgtEl>
-                                        <p:attrNameLst>
-                                          <p:attrName>style.visibility</p:attrName>
-                                        </p:attrNameLst>
-                                      </p:cBhvr>
-                                      <p:to>
-                                        <p:strVal val="visible"/>
-                                      </p:to>
-                                    </p:set>
-                                  </p:childTnLst>
-                                </p:cTn>
-                              </p:par>
-                            </p:childTnLst>
-                          </p:cTn>
-                        </p:par>
-                      </p:childTnLst>
-                    </p:cTn>
-                  </p:par>
-                  <p:par>
-                    <p:cTn id="9" fill="hold">
-                      <p:stCondLst>
-                        <p:cond delay="indefinite"/>
-                      </p:stCondLst>
-                      <p:childTnLst>
-                        <p:par>
-                          <p:cTn id="10" fill="hold">
-                            <p:stCondLst>
-                              <p:cond delay="0"/>
-                            </p:stCondLst>
-                            <p:childTnLst>
-                              <p:par>
-                                <p:cTn id="11" presetID="1" presetClass="entr" presetSubtype="0" fill="hold" grpId="0" nodeType="clickEffect">
-                                  <p:stCondLst>
-                                    <p:cond delay="0"/>
-                                  </p:stCondLst>
-                                  <p:childTnLst>
-                                    <p:set>
-                                      <p:cBhvr>
-                                        <p:cTn id="12" dur="1" fill="hold">
-                                          <p:stCondLst>
-                                            <p:cond delay="0"/>
-                                          </p:stCondLst>
-                                        </p:cTn>
-                                        <p:tgtEl>
-                                          <p:spTgt spid="21"/>
-                                        </p:tgtEl>
-                                        <p:attrNameLst>
-                                          <p:attrName>style.visibility</p:attrName>
-                                        </p:attrNameLst>
-                                      </p:cBhvr>
-                                      <p:to>
-                                        <p:strVal val="visible"/>
-                                      </p:to>
-                                    </p:set>
-                                  </p:childTnLst>
-                                </p:cTn>
-                              </p:par>
-                            </p:childTnLst>
-                          </p:cTn>
-                        </p:par>
-                      </p:childTnLst>
-                    </p:cTn>
-                  </p:par>
-                </p:childTnLst>
-              </p:cTn>
-              <p:prevCondLst>
-                <p:cond evt="onPrev" delay="0">
-                  <p:tgtEl>
-                    <p:sldTgt/>
-                  </p:tgtEl>
-                </p:cond>
-              </p:prevCondLst>
-              <p:nextCondLst>
-                <p:cond evt="onNext" delay="0">
-                  <p:tgtEl>
-                    <p:sldTgt/>
-                  </p:tgtEl>
-                </p:cond>
-              </p:nextCondLst>
-            </p:seq>
-          </p:childTnLst>
-        </p:cTn>
-      </p:par>
-    </p:tnLst>
-    <p:bldLst>
-      <p:bldP spid="19" grpId="0" animBg="1"/>
-      <p:bldP spid="20" grpId="0" animBg="1"/>
-      <p:bldP spid="21" grpId="0" animBg="1"/>
-    </p:bldLst>
-  </p:timing>
-</p:sld>
-</file>
-
-<file path=ppt/slides/slide11.xml><?xml version="1.0" encoding="utf-8"?>
-<p:sld xmlns:a="http://schemas.openxmlformats.org/drawingml/2006/main" xmlns:r="http://schemas.openxmlformats.org/officeDocument/2006/relationships" xmlns:p="http://schemas.openxmlformats.org/presentationml/2006/main">
-  <p:cSld>
-    <p:spTree>
-      <p:nvGrpSpPr>
-        <p:cNvPr id="1" name=""/>
-        <p:cNvGrpSpPr/>
-        <p:nvPr/>
-      </p:nvGrpSpPr>
-      <p:grpSpPr>
-        <a:xfrm>
-          <a:off x="0" y="0"/>
-          <a:ext cx="0" cy="0"/>
-          <a:chOff x="0" y="0"/>
-          <a:chExt cx="0" cy="0"/>
-        </a:xfrm>
-      </p:grpSpPr>
-      <p:sp>
-        <p:nvSpPr>
-          <p:cNvPr id="3" name="Inhaltsplatzhalter 2"/>
-          <p:cNvSpPr>
-            <a:spLocks noGrp="1"/>
-          </p:cNvSpPr>
-          <p:nvPr>
-            <p:ph idx="1"/>
-          </p:nvPr>
-        </p:nvSpPr>
-        <p:spPr/>
-        <p:txBody>
-          <a:bodyPr/>
-          <a:lstStyle/>
-          <a:p>
-            <a:pPr marL="0" indent="0">
-              <a:buNone/>
-            </a:pPr>
-            <a:r>
-              <a:rPr lang="de-DE" dirty="0"/>
-              <a:t>Auszug „Datenbasis</a:t>
-            </a:r>
-            <a:r>
-              <a:rPr lang="de-DE" dirty="0" smtClean="0"/>
-              <a:t>“</a:t>
-            </a:r>
-          </a:p>
-          <a:p>
-            <a:r>
-              <a:rPr lang="de-DE" dirty="0" smtClean="0"/>
-              <a:t>Hierarchie durch Parameter (statt Verschachtelung)</a:t>
-            </a:r>
-          </a:p>
-          <a:p>
-            <a:r>
-              <a:rPr lang="de-DE" dirty="0" smtClean="0"/>
-              <a:t>Ausschließlich notwendige Parameter</a:t>
-            </a:r>
-            <a:endParaRPr lang="de-DE" dirty="0"/>
-          </a:p>
-          <a:p>
-            <a:pPr marL="0" indent="0">
-              <a:buNone/>
-            </a:pPr>
-            <a:endParaRPr lang="de-DE" dirty="0"/>
-          </a:p>
-        </p:txBody>
-      </p:sp>
-      <p:sp>
-        <p:nvSpPr>
-          <p:cNvPr id="7" name="Rechteck 6"/>
-          <p:cNvSpPr/>
-          <p:nvPr/>
-        </p:nvSpPr>
-        <p:spPr>
-          <a:xfrm>
-            <a:off x="467544" y="2481858"/>
-            <a:ext cx="7401385" cy="3754874"/>
-          </a:xfrm>
-          <a:prstGeom prst="rect">
-            <a:avLst/>
-          </a:prstGeom>
-          <a:solidFill>
-            <a:schemeClr val="bg1">
-              <a:lumMod val="95000"/>
-            </a:schemeClr>
-          </a:solidFill>
-          <a:ln>
-            <a:solidFill>
-              <a:schemeClr val="bg1">
-                <a:lumMod val="50000"/>
-              </a:schemeClr>
-            </a:solidFill>
-          </a:ln>
-        </p:spPr>
-        <p:style>
-          <a:lnRef idx="2">
-            <a:schemeClr val="accent1">
-              <a:shade val="50000"/>
-            </a:schemeClr>
-          </a:lnRef>
-          <a:fillRef idx="1">
-            <a:schemeClr val="accent1"/>
-          </a:fillRef>
-          <a:effectRef idx="0">
-            <a:schemeClr val="accent1"/>
-          </a:effectRef>
-          <a:fontRef idx="minor">
-            <a:schemeClr val="lt1"/>
-          </a:fontRef>
-        </p:style>
-        <p:txBody>
-          <a:bodyPr rtlCol="0" anchor="ctr"/>
-          <a:lstStyle/>
-          <a:p>
-            <a:pPr algn="ctr"/>
-            <a:endParaRPr lang="de-DE"/>
-          </a:p>
-        </p:txBody>
-      </p:sp>
-      <p:grpSp>
-        <p:nvGrpSpPr>
-          <p:cNvPr id="12" name="Gruppieren 11"/>
-          <p:cNvGrpSpPr/>
-          <p:nvPr/>
-        </p:nvGrpSpPr>
-        <p:grpSpPr>
-          <a:xfrm>
-            <a:off x="755576" y="2746740"/>
-            <a:ext cx="6984776" cy="3210944"/>
-            <a:chOff x="755576" y="3045810"/>
-            <a:chExt cx="6984776" cy="3210944"/>
-          </a:xfrm>
-        </p:grpSpPr>
-        <p:sp>
-          <p:nvSpPr>
-            <p:cNvPr id="8" name="Rechteck 7"/>
-            <p:cNvSpPr/>
-            <p:nvPr/>
-          </p:nvSpPr>
-          <p:spPr>
-            <a:xfrm>
-              <a:off x="755576" y="3045810"/>
-              <a:ext cx="3816424" cy="640098"/>
-            </a:xfrm>
-            <a:prstGeom prst="rect">
-              <a:avLst/>
-            </a:prstGeom>
-            <a:solidFill>
-              <a:schemeClr val="bg1">
-                <a:lumMod val="85000"/>
-              </a:schemeClr>
-            </a:solidFill>
-            <a:ln>
-              <a:solidFill>
-                <a:schemeClr val="bg1">
-                  <a:lumMod val="50000"/>
-                </a:schemeClr>
-              </a:solidFill>
-            </a:ln>
-          </p:spPr>
-          <p:style>
-            <a:lnRef idx="2">
-              <a:schemeClr val="accent1">
-                <a:shade val="50000"/>
-              </a:schemeClr>
-            </a:lnRef>
-            <a:fillRef idx="1">
-              <a:schemeClr val="accent1"/>
-            </a:fillRef>
-            <a:effectRef idx="0">
-              <a:schemeClr val="accent1"/>
-            </a:effectRef>
-            <a:fontRef idx="minor">
-              <a:schemeClr val="lt1"/>
-            </a:fontRef>
-          </p:style>
-          <p:txBody>
-            <a:bodyPr rtlCol="0" anchor="ctr"/>
-            <a:lstStyle/>
-            <a:p>
-              <a:pPr algn="ctr"/>
-              <a:endParaRPr lang="de-DE"/>
-            </a:p>
-          </p:txBody>
-        </p:sp>
-        <p:sp>
-          <p:nvSpPr>
-            <p:cNvPr id="9" name="Rechteck 8"/>
-            <p:cNvSpPr/>
-            <p:nvPr/>
-          </p:nvSpPr>
-          <p:spPr>
-            <a:xfrm>
-              <a:off x="971600" y="3685908"/>
-              <a:ext cx="3888432" cy="1039236"/>
-            </a:xfrm>
-            <a:prstGeom prst="rect">
-              <a:avLst/>
-            </a:prstGeom>
-            <a:solidFill>
-              <a:schemeClr val="bg1">
-                <a:lumMod val="85000"/>
-              </a:schemeClr>
-            </a:solidFill>
-            <a:ln>
-              <a:solidFill>
-                <a:schemeClr val="bg1">
-                  <a:lumMod val="50000"/>
-                </a:schemeClr>
-              </a:solidFill>
-            </a:ln>
-          </p:spPr>
-          <p:style>
-            <a:lnRef idx="2">
-              <a:schemeClr val="accent1">
-                <a:shade val="50000"/>
-              </a:schemeClr>
-            </a:lnRef>
-            <a:fillRef idx="1">
-              <a:schemeClr val="accent1"/>
-            </a:fillRef>
-            <a:effectRef idx="0">
-              <a:schemeClr val="accent1"/>
-            </a:effectRef>
-            <a:fontRef idx="minor">
-              <a:schemeClr val="lt1"/>
-            </a:fontRef>
-          </p:style>
-          <p:txBody>
-            <a:bodyPr rtlCol="0" anchor="ctr"/>
-            <a:lstStyle/>
-            <a:p>
-              <a:pPr algn="ctr"/>
-              <a:endParaRPr lang="de-DE"/>
-            </a:p>
-          </p:txBody>
-        </p:sp>
-        <p:sp>
-          <p:nvSpPr>
-            <p:cNvPr id="10" name="Rechteck 9"/>
-            <p:cNvSpPr/>
-            <p:nvPr/>
-          </p:nvSpPr>
-          <p:spPr>
-            <a:xfrm>
-              <a:off x="2362902" y="4725144"/>
-              <a:ext cx="5377450" cy="1531610"/>
-            </a:xfrm>
-            <a:prstGeom prst="rect">
-              <a:avLst/>
-            </a:prstGeom>
-            <a:solidFill>
-              <a:schemeClr val="bg1">
-                <a:lumMod val="85000"/>
-              </a:schemeClr>
-            </a:solidFill>
-            <a:ln>
-              <a:solidFill>
-                <a:schemeClr val="bg1">
-                  <a:lumMod val="50000"/>
-                </a:schemeClr>
-              </a:solidFill>
-            </a:ln>
-          </p:spPr>
-          <p:style>
-            <a:lnRef idx="2">
-              <a:schemeClr val="accent1">
-                <a:shade val="50000"/>
-              </a:schemeClr>
-            </a:lnRef>
-            <a:fillRef idx="1">
-              <a:schemeClr val="accent1"/>
-            </a:fillRef>
-            <a:effectRef idx="0">
-              <a:schemeClr val="accent1"/>
-            </a:effectRef>
-            <a:fontRef idx="minor">
-              <a:schemeClr val="lt1"/>
-            </a:fontRef>
-          </p:style>
-          <p:txBody>
-            <a:bodyPr rtlCol="0" anchor="ctr"/>
-            <a:lstStyle/>
-            <a:p>
-              <a:pPr algn="ctr"/>
-              <a:endParaRPr lang="de-DE"/>
-            </a:p>
-          </p:txBody>
-        </p:sp>
-      </p:grpSp>
-      <p:sp>
-        <p:nvSpPr>
-          <p:cNvPr id="2" name="Titel 1"/>
-          <p:cNvSpPr>
-            <a:spLocks noGrp="1"/>
-          </p:cNvSpPr>
-          <p:nvPr>
-            <p:ph type="title"/>
-          </p:nvPr>
-        </p:nvSpPr>
-        <p:spPr/>
-        <p:txBody>
-          <a:bodyPr/>
-          <a:lstStyle/>
-          <a:p>
-            <a:r>
-              <a:rPr lang="de-DE" dirty="0" smtClean="0"/>
-              <a:t>Prototyp „d3plus (2)“ – Code-Auszug</a:t>
-            </a:r>
-            <a:endParaRPr lang="de-DE" dirty="0"/>
-          </a:p>
-        </p:txBody>
-      </p:sp>
-      <p:sp>
-        <p:nvSpPr>
-          <p:cNvPr id="4" name="Foliennummernplatzhalter 3"/>
-          <p:cNvSpPr>
-            <a:spLocks noGrp="1"/>
-          </p:cNvSpPr>
-          <p:nvPr>
-            <p:ph type="sldNum" sz="quarter" idx="10"/>
-          </p:nvPr>
-        </p:nvSpPr>
-        <p:spPr/>
-        <p:txBody>
-          <a:bodyPr/>
-          <a:lstStyle/>
-          <a:p>
-            <a:fld id="{4A87D5D0-4391-4EB2-AF2F-8F39F08E3898}" type="slidenum">
-              <a:rPr lang="de-DE" smtClean="0"/>
-              <a:pPr/>
-              <a:t>11</a:t>
-            </a:fld>
-            <a:endParaRPr lang="de-DE"/>
-          </a:p>
-        </p:txBody>
-      </p:sp>
-      <p:sp>
-        <p:nvSpPr>
-          <p:cNvPr id="5" name="Fußzeilenplatzhalter 4"/>
-          <p:cNvSpPr>
-            <a:spLocks noGrp="1"/>
-          </p:cNvSpPr>
-          <p:nvPr>
-            <p:ph type="ftr" sz="quarter" idx="3"/>
-          </p:nvPr>
-        </p:nvSpPr>
-        <p:spPr/>
-        <p:txBody>
-          <a:bodyPr/>
-          <a:lstStyle/>
-          <a:p>
-            <a:r>
-              <a:rPr lang="it-IT" smtClean="0"/>
-              <a:t>Mobile Web | Projekt: Modulhandbuch</a:t>
-            </a:r>
-            <a:endParaRPr lang="de-DE" dirty="0"/>
-          </a:p>
-        </p:txBody>
-      </p:sp>
-      <p:sp>
-        <p:nvSpPr>
-          <p:cNvPr id="6" name="Textfeld 5"/>
-          <p:cNvSpPr txBox="1"/>
-          <p:nvPr/>
-        </p:nvSpPr>
-        <p:spPr>
-          <a:xfrm>
-            <a:off x="467544" y="2481858"/>
-            <a:ext cx="7401385" cy="3754874"/>
-          </a:xfrm>
-          <a:prstGeom prst="rect">
-            <a:avLst/>
-          </a:prstGeom>
-          <a:noFill/>
-        </p:spPr>
-        <p:txBody>
-          <a:bodyPr wrap="none" rtlCol="0">
-            <a:spAutoFit/>
-          </a:bodyPr>
-          <a:lstStyle/>
-          <a:p>
-            <a:r>
-              <a:rPr lang="de-DE" sz="1400" b="1" dirty="0">
-                <a:latin typeface="Courier New" panose="02070309020205020404" pitchFamily="49" charset="0"/>
-                <a:cs typeface="Courier New" panose="02070309020205020404" pitchFamily="49" charset="0"/>
-              </a:rPr>
-              <a:t>[</a:t>
-            </a:r>
-          </a:p>
-          <a:p>
-            <a:r>
-              <a:rPr lang="de-DE" sz="1400" b="1" dirty="0">
-                <a:latin typeface="Courier New" panose="02070309020205020404" pitchFamily="49" charset="0"/>
-                <a:cs typeface="Courier New" panose="02070309020205020404" pitchFamily="49" charset="0"/>
-              </a:rPr>
-              <a:t>  {</a:t>
-            </a:r>
-          </a:p>
-          <a:p>
-            <a:r>
-              <a:rPr lang="de-DE" sz="1400" b="1" dirty="0">
-                <a:latin typeface="Courier New" panose="02070309020205020404" pitchFamily="49" charset="0"/>
-                <a:cs typeface="Courier New" panose="02070309020205020404" pitchFamily="49" charset="0"/>
-              </a:rPr>
-              <a:t>    "Studiengang": "Mobile Computing"</a:t>
-            </a:r>
-          </a:p>
-          <a:p>
-            <a:r>
-              <a:rPr lang="de-DE" sz="1400" b="1" dirty="0">
-                <a:latin typeface="Courier New" panose="02070309020205020404" pitchFamily="49" charset="0"/>
-                <a:cs typeface="Courier New" panose="02070309020205020404" pitchFamily="49" charset="0"/>
-              </a:rPr>
-              <a:t>    },</a:t>
-            </a:r>
-          </a:p>
-          <a:p>
-            <a:r>
-              <a:rPr lang="de-DE" sz="1400" b="1" dirty="0">
-                <a:latin typeface="Courier New" panose="02070309020205020404" pitchFamily="49" charset="0"/>
-                <a:cs typeface="Courier New" panose="02070309020205020404" pitchFamily="49" charset="0"/>
-              </a:rPr>
-              <a:t>    {</a:t>
-            </a:r>
-          </a:p>
-          <a:p>
-            <a:r>
-              <a:rPr lang="de-DE" sz="1400" b="1" dirty="0">
-                <a:latin typeface="Courier New" panose="02070309020205020404" pitchFamily="49" charset="0"/>
-                <a:cs typeface="Courier New" panose="02070309020205020404" pitchFamily="49" charset="0"/>
-              </a:rPr>
-              <a:t>      "Studiengang": "Mobile Computing",</a:t>
-            </a:r>
-          </a:p>
-          <a:p>
-            <a:r>
-              <a:rPr lang="de-DE" sz="1400" b="1" dirty="0">
-                <a:latin typeface="Courier New" panose="02070309020205020404" pitchFamily="49" charset="0"/>
-                <a:cs typeface="Courier New" panose="02070309020205020404" pitchFamily="49" charset="0"/>
-              </a:rPr>
-              <a:t>      "Vorlesung": "Mobile Web",</a:t>
-            </a:r>
-          </a:p>
-          <a:p>
-            <a:r>
-              <a:rPr lang="de-DE" sz="1400" b="1" dirty="0">
-                <a:latin typeface="Courier New" panose="02070309020205020404" pitchFamily="49" charset="0"/>
-                <a:cs typeface="Courier New" panose="02070309020205020404" pitchFamily="49" charset="0"/>
-              </a:rPr>
-              <a:t> </a:t>
-            </a:r>
-            <a:r>
-              <a:rPr lang="de-DE" sz="1400" b="1" dirty="0" smtClean="0">
-                <a:latin typeface="Courier New" panose="02070309020205020404" pitchFamily="49" charset="0"/>
-                <a:cs typeface="Courier New" panose="02070309020205020404" pitchFamily="49" charset="0"/>
-              </a:rPr>
-              <a:t>     "</a:t>
-            </a:r>
-            <a:r>
-              <a:rPr lang="de-DE" sz="1400" b="1" dirty="0" err="1">
-                <a:latin typeface="Courier New" panose="02070309020205020404" pitchFamily="49" charset="0"/>
-                <a:cs typeface="Courier New" panose="02070309020205020404" pitchFamily="49" charset="0"/>
-              </a:rPr>
-              <a:t>colorful</a:t>
-            </a:r>
-            <a:r>
-              <a:rPr lang="de-DE" sz="1400" b="1" dirty="0">
-                <a:latin typeface="Courier New" panose="02070309020205020404" pitchFamily="49" charset="0"/>
-                <a:cs typeface="Courier New" panose="02070309020205020404" pitchFamily="49" charset="0"/>
-              </a:rPr>
-              <a:t>": "#3B5C7F"</a:t>
-            </a:r>
-          </a:p>
-          <a:p>
-            <a:r>
-              <a:rPr lang="de-DE" sz="1400" b="1" dirty="0">
-                <a:latin typeface="Courier New" panose="02070309020205020404" pitchFamily="49" charset="0"/>
-                <a:cs typeface="Courier New" panose="02070309020205020404" pitchFamily="49" charset="0"/>
-              </a:rPr>
-              <a:t>    },</a:t>
-            </a:r>
-          </a:p>
-          <a:p>
-            <a:r>
-              <a:rPr lang="de-DE" sz="1400" b="1" dirty="0">
-                <a:latin typeface="Courier New" panose="02070309020205020404" pitchFamily="49" charset="0"/>
-                <a:cs typeface="Courier New" panose="02070309020205020404" pitchFamily="49" charset="0"/>
-              </a:rPr>
-              <a:t>		{</a:t>
-            </a:r>
-          </a:p>
-          <a:p>
-            <a:r>
-              <a:rPr lang="de-DE" sz="1400" b="1" dirty="0">
-                <a:latin typeface="Courier New" panose="02070309020205020404" pitchFamily="49" charset="0"/>
-                <a:cs typeface="Courier New" panose="02070309020205020404" pitchFamily="49" charset="0"/>
-              </a:rPr>
-              <a:t>		  "Studiengang": "Mobile Computing",</a:t>
-            </a:r>
-          </a:p>
-          <a:p>
-            <a:r>
-              <a:rPr lang="de-DE" sz="1400" b="1" dirty="0">
-                <a:latin typeface="Courier New" panose="02070309020205020404" pitchFamily="49" charset="0"/>
-                <a:cs typeface="Courier New" panose="02070309020205020404" pitchFamily="49" charset="0"/>
-              </a:rPr>
-              <a:t>		  "Vorlesung": "Mobile Web",</a:t>
-            </a:r>
-          </a:p>
-          <a:p>
-            <a:r>
-              <a:rPr lang="de-DE" sz="1400" b="1" dirty="0">
-                <a:latin typeface="Courier New" panose="02070309020205020404" pitchFamily="49" charset="0"/>
-                <a:cs typeface="Courier New" panose="02070309020205020404" pitchFamily="49" charset="0"/>
-              </a:rPr>
-              <a:t>		  "</a:t>
-            </a:r>
-            <a:r>
-              <a:rPr lang="de-DE" sz="1400" b="1" dirty="0" err="1">
-                <a:latin typeface="Courier New" panose="02070309020205020404" pitchFamily="49" charset="0"/>
-                <a:cs typeface="Courier New" panose="02070309020205020404" pitchFamily="49" charset="0"/>
-              </a:rPr>
-              <a:t>gid</a:t>
-            </a:r>
-            <a:r>
-              <a:rPr lang="de-DE" sz="1400" b="1" dirty="0">
-                <a:latin typeface="Courier New" panose="02070309020205020404" pitchFamily="49" charset="0"/>
-                <a:cs typeface="Courier New" panose="02070309020205020404" pitchFamily="49" charset="0"/>
-              </a:rPr>
-              <a:t>": "Mobile Web: Die Studierenden </a:t>
-            </a:r>
-            <a:r>
-              <a:rPr lang="de-DE" sz="1400" b="1" dirty="0" smtClean="0">
-                <a:latin typeface="Courier New" panose="02070309020205020404" pitchFamily="49" charset="0"/>
-                <a:cs typeface="Courier New" panose="02070309020205020404" pitchFamily="49" charset="0"/>
-              </a:rPr>
-              <a:t>werden...",</a:t>
-            </a:r>
-            <a:endParaRPr lang="de-DE" sz="1400" b="1" dirty="0">
-              <a:latin typeface="Courier New" panose="02070309020205020404" pitchFamily="49" charset="0"/>
-              <a:cs typeface="Courier New" panose="02070309020205020404" pitchFamily="49" charset="0"/>
-            </a:endParaRPr>
-          </a:p>
-          <a:p>
-            <a:r>
-              <a:rPr lang="de-DE" sz="1400" b="1" dirty="0">
-                <a:latin typeface="Courier New" panose="02070309020205020404" pitchFamily="49" charset="0"/>
-                <a:cs typeface="Courier New" panose="02070309020205020404" pitchFamily="49" charset="0"/>
-              </a:rPr>
-              <a:t>		  "</a:t>
-            </a:r>
-            <a:r>
-              <a:rPr lang="de-DE" sz="1400" b="1" dirty="0" err="1">
-                <a:latin typeface="Courier New" panose="02070309020205020404" pitchFamily="49" charset="0"/>
-                <a:cs typeface="Courier New" panose="02070309020205020404" pitchFamily="49" charset="0"/>
-              </a:rPr>
-              <a:t>value</a:t>
-            </a:r>
-            <a:r>
-              <a:rPr lang="de-DE" sz="1400" b="1" dirty="0">
-                <a:latin typeface="Courier New" panose="02070309020205020404" pitchFamily="49" charset="0"/>
-                <a:cs typeface="Courier New" panose="02070309020205020404" pitchFamily="49" charset="0"/>
-              </a:rPr>
-              <a:t>": 40,</a:t>
-            </a:r>
-          </a:p>
-          <a:p>
-            <a:r>
-              <a:rPr lang="de-DE" sz="1400" b="1" dirty="0">
-                <a:latin typeface="Courier New" panose="02070309020205020404" pitchFamily="49" charset="0"/>
-                <a:cs typeface="Courier New" panose="02070309020205020404" pitchFamily="49" charset="0"/>
-              </a:rPr>
-              <a:t>		  "</a:t>
-            </a:r>
-            <a:r>
-              <a:rPr lang="de-DE" sz="1400" b="1" dirty="0" err="1">
-                <a:latin typeface="Courier New" panose="02070309020205020404" pitchFamily="49" charset="0"/>
-                <a:cs typeface="Courier New" panose="02070309020205020404" pitchFamily="49" charset="0"/>
-              </a:rPr>
-              <a:t>colorful</a:t>
-            </a:r>
-            <a:r>
-              <a:rPr lang="de-DE" sz="1400" b="1" dirty="0">
-                <a:latin typeface="Courier New" panose="02070309020205020404" pitchFamily="49" charset="0"/>
-                <a:cs typeface="Courier New" panose="02070309020205020404" pitchFamily="49" charset="0"/>
-              </a:rPr>
-              <a:t>": "#3B5C7F"</a:t>
-            </a:r>
-          </a:p>
-          <a:p>
-            <a:r>
-              <a:rPr lang="de-DE" sz="1400" b="1" dirty="0">
-                <a:latin typeface="Courier New" panose="02070309020205020404" pitchFamily="49" charset="0"/>
-                <a:cs typeface="Courier New" panose="02070309020205020404" pitchFamily="49" charset="0"/>
-              </a:rPr>
-              <a:t>		</a:t>
-            </a:r>
-            <a:r>
-              <a:rPr lang="de-DE" sz="1400" b="1" dirty="0" smtClean="0">
-                <a:latin typeface="Courier New" panose="02070309020205020404" pitchFamily="49" charset="0"/>
-                <a:cs typeface="Courier New" panose="02070309020205020404" pitchFamily="49" charset="0"/>
-              </a:rPr>
-              <a:t>},</a:t>
-            </a:r>
-          </a:p>
-          <a:p>
-            <a:r>
-              <a:rPr lang="de-DE" sz="1400" b="1" dirty="0" smtClean="0">
-                <a:latin typeface="Courier New" panose="02070309020205020404" pitchFamily="49" charset="0"/>
-                <a:cs typeface="Courier New" panose="02070309020205020404" pitchFamily="49" charset="0"/>
-              </a:rPr>
-              <a:t>...]</a:t>
-            </a:r>
-            <a:endParaRPr lang="de-DE" sz="1400" b="1" dirty="0">
-              <a:latin typeface="Courier New" panose="02070309020205020404" pitchFamily="49" charset="0"/>
-              <a:cs typeface="Courier New" panose="02070309020205020404" pitchFamily="49" charset="0"/>
-            </a:endParaRPr>
-          </a:p>
-        </p:txBody>
-      </p:sp>
-    </p:spTree>
-    <p:extLst>
-      <p:ext uri="{BB962C8B-B14F-4D97-AF65-F5344CB8AC3E}">
-        <p14:creationId xmlns:p14="http://schemas.microsoft.com/office/powerpoint/2010/main" val="330470474"/>
-      </p:ext>
-    </p:extLst>
-  </p:cSld>
-  <p:clrMapOvr>
-    <a:masterClrMapping/>
-  </p:clrMapOvr>
-  <p:timing>
-    <p:tnLst>
-      <p:par>
-        <p:cTn xmlns:p14="http://schemas.microsoft.com/office/powerpoint/2010/main" id="1" dur="indefinite" restart="never" nodeType="tmRoot">
-          <p:childTnLst>
-            <p:seq concurrent="1" nextAc="seek">
-              <p:cTn id="2" dur="indefinite" nodeType="mainSeq">
-                <p:childTnLst>
-                  <p:par>
-                    <p:cTn id="3" fill="hold">
-                      <p:stCondLst>
-                        <p:cond delay="indefinite"/>
-                      </p:stCondLst>
-                      <p:childTnLst>
-                        <p:par>
-                          <p:cTn id="4" fill="hold">
-                            <p:stCondLst>
-                              <p:cond delay="0"/>
-                            </p:stCondLst>
-                            <p:childTnLst>
-                              <p:par>
-                                <p:cTn id="5" presetID="1" presetClass="entr" presetSubtype="0" fill="hold" nodeType="clickEffect">
-                                  <p:stCondLst>
-                                    <p:cond delay="0"/>
-                                  </p:stCondLst>
-                                  <p:childTnLst>
-                                    <p:set>
-                                      <p:cBhvr>
-                                        <p:cTn id="6" dur="1" fill="hold">
-                                          <p:stCondLst>
-                                            <p:cond delay="0"/>
-                                          </p:stCondLst>
-                                        </p:cTn>
-                                        <p:tgtEl>
-                                          <p:spTgt spid="12"/>
-                                        </p:tgtEl>
-                                        <p:attrNameLst>
-                                          <p:attrName>style.visibility</p:attrName>
-                                        </p:attrNameLst>
-                                      </p:cBhvr>
-                                      <p:to>
-                                        <p:strVal val="visible"/>
-                                      </p:to>
-                                    </p:set>
-                                  </p:childTnLst>
-                                </p:cTn>
-                              </p:par>
-                            </p:childTnLst>
-                          </p:cTn>
-                        </p:par>
-                      </p:childTnLst>
-                    </p:cTn>
-                  </p:par>
-                </p:childTnLst>
-              </p:cTn>
-              <p:prevCondLst>
-                <p:cond evt="onPrev" delay="0">
-                  <p:tgtEl>
-                    <p:sldTgt/>
-                  </p:tgtEl>
-                </p:cond>
-              </p:prevCondLst>
-              <p:nextCondLst>
-                <p:cond evt="onNext" delay="0">
-                  <p:tgtEl>
-                    <p:sldTgt/>
-                  </p:tgtEl>
-                </p:cond>
-              </p:nextCondLst>
-            </p:seq>
-          </p:childTnLst>
-        </p:cTn>
-      </p:par>
-    </p:tnLst>
-  </p:timing>
-</p:sld>
-</file>
-
-<file path=ppt/slides/slide12.xml><?xml version="1.0" encoding="utf-8"?>
-<p:sld xmlns:a="http://schemas.openxmlformats.org/drawingml/2006/main" xmlns:r="http://schemas.openxmlformats.org/officeDocument/2006/relationships" xmlns:p="http://schemas.openxmlformats.org/presentationml/2006/main">
-  <p:cSld>
-    <p:spTree>
-      <p:nvGrpSpPr>
-        <p:cNvPr id="1" name=""/>
-        <p:cNvGrpSpPr/>
-        <p:nvPr/>
-      </p:nvGrpSpPr>
-      <p:grpSpPr>
-        <a:xfrm>
-          <a:off x="0" y="0"/>
-          <a:ext cx="0" cy="0"/>
-          <a:chOff x="0" y="0"/>
-          <a:chExt cx="0" cy="0"/>
-        </a:xfrm>
-      </p:grpSpPr>
-      <p:sp>
-        <p:nvSpPr>
-          <p:cNvPr id="2" name="Titel 1"/>
-          <p:cNvSpPr>
-            <a:spLocks noGrp="1"/>
-          </p:cNvSpPr>
-          <p:nvPr>
-            <p:ph type="title"/>
-          </p:nvPr>
-        </p:nvSpPr>
-        <p:spPr/>
-        <p:txBody>
-          <a:bodyPr/>
-          <a:lstStyle/>
-          <a:p>
-            <a:r>
-              <a:rPr lang="de-DE" dirty="0"/>
-              <a:t>Prototyp „</a:t>
-            </a:r>
-            <a:r>
-              <a:rPr lang="de-DE" dirty="0" smtClean="0"/>
-              <a:t>d3plus (2)“ </a:t>
-            </a:r>
-            <a:r>
-              <a:rPr lang="de-DE" dirty="0"/>
-              <a:t>– </a:t>
-            </a:r>
-            <a:r>
-              <a:rPr lang="de-DE" dirty="0" smtClean="0"/>
-              <a:t>Fazit</a:t>
-            </a:r>
-            <a:endParaRPr lang="de-DE" dirty="0"/>
-          </a:p>
-        </p:txBody>
-      </p:sp>
-      <p:sp>
-        <p:nvSpPr>
-          <p:cNvPr id="3" name="Inhaltsplatzhalter 2"/>
-          <p:cNvSpPr>
-            <a:spLocks noGrp="1"/>
-          </p:cNvSpPr>
-          <p:nvPr>
-            <p:ph idx="1"/>
-          </p:nvPr>
-        </p:nvSpPr>
-        <p:spPr/>
-        <p:txBody>
-          <a:bodyPr/>
-          <a:lstStyle/>
-          <a:p>
-            <a:pPr marL="0" indent="0">
-              <a:buNone/>
-            </a:pPr>
-            <a:r>
-              <a:rPr lang="de-DE" dirty="0"/>
-              <a:t>Pro:</a:t>
-            </a:r>
-          </a:p>
-          <a:p>
-            <a:r>
-              <a:rPr lang="de-DE" dirty="0"/>
-              <a:t>Hierarchische Struktur</a:t>
-            </a:r>
-          </a:p>
-          <a:p>
-            <a:r>
-              <a:rPr lang="de-DE" dirty="0"/>
-              <a:t>Animierter Ebenen-Wechsel</a:t>
-            </a:r>
-          </a:p>
-          <a:p>
-            <a:r>
-              <a:rPr lang="de-DE" dirty="0"/>
-              <a:t>Feldgrößen in Anlehnung an ECTS-</a:t>
-            </a:r>
-            <a:r>
-              <a:rPr lang="de-DE" dirty="0" err="1"/>
-              <a:t>Credits</a:t>
-            </a:r>
-            <a:endParaRPr lang="de-DE" dirty="0"/>
-          </a:p>
-          <a:p>
-            <a:r>
-              <a:rPr lang="de-DE" dirty="0"/>
-              <a:t>Navigation verbessert</a:t>
-            </a:r>
-          </a:p>
-          <a:p>
-            <a:r>
-              <a:rPr lang="de-DE" dirty="0" smtClean="0"/>
-              <a:t>„</a:t>
-            </a:r>
-            <a:r>
-              <a:rPr lang="de-DE" dirty="0" err="1" smtClean="0"/>
-              <a:t>Responsive</a:t>
-            </a:r>
-            <a:r>
-              <a:rPr lang="de-DE" dirty="0" smtClean="0"/>
-              <a:t> Design“ vorhanden</a:t>
-            </a:r>
-          </a:p>
-          <a:p>
-            <a:r>
-              <a:rPr lang="de-DE" dirty="0" smtClean="0"/>
-              <a:t>Farbliche Gruppierung von Modulen</a:t>
-            </a:r>
-          </a:p>
-          <a:p>
-            <a:pPr marL="0" indent="0">
-              <a:buNone/>
-            </a:pPr>
-            <a:endParaRPr lang="de-DE" dirty="0"/>
-          </a:p>
-          <a:p>
-            <a:pPr marL="0" indent="0">
-              <a:buNone/>
-            </a:pPr>
-            <a:r>
-              <a:rPr lang="de-DE" dirty="0" smtClean="0"/>
-              <a:t>Kontra:</a:t>
-            </a:r>
-          </a:p>
-          <a:p>
-            <a:r>
-              <a:rPr lang="de-DE" dirty="0" smtClean="0"/>
-              <a:t>Gruppierung erschwert Unterebenen</a:t>
-            </a:r>
-          </a:p>
-          <a:p>
-            <a:r>
-              <a:rPr lang="de-DE" dirty="0"/>
-              <a:t>Keine </a:t>
-            </a:r>
-            <a:r>
-              <a:rPr lang="de-DE" dirty="0" smtClean="0"/>
-              <a:t>Visualisierung des Ablaufs</a:t>
-            </a:r>
-            <a:endParaRPr lang="de-DE" dirty="0"/>
-          </a:p>
-          <a:p>
-            <a:r>
-              <a:rPr lang="de-DE" dirty="0" smtClean="0"/>
-              <a:t>Keine Links zum Modulhandbuch</a:t>
-            </a:r>
-            <a:endParaRPr lang="de-DE" dirty="0"/>
-          </a:p>
-        </p:txBody>
-      </p:sp>
-      <p:sp>
-        <p:nvSpPr>
-          <p:cNvPr id="4" name="Foliennummernplatzhalter 3"/>
-          <p:cNvSpPr>
-            <a:spLocks noGrp="1"/>
-          </p:cNvSpPr>
-          <p:nvPr>
-            <p:ph type="sldNum" sz="quarter" idx="10"/>
-          </p:nvPr>
-        </p:nvSpPr>
-        <p:spPr/>
-        <p:txBody>
-          <a:bodyPr/>
-          <a:lstStyle/>
-          <a:p>
-            <a:fld id="{4A87D5D0-4391-4EB2-AF2F-8F39F08E3898}" type="slidenum">
-              <a:rPr lang="de-DE" smtClean="0"/>
-              <a:pPr/>
-              <a:t>12</a:t>
             </a:fld>
             <a:endParaRPr lang="de-DE"/>
           </a:p>
@@ -7241,14 +5310,14 @@
           </a:ln>
           <a:effectLst/>
           <a:extLst>
-            <a:ext uri="{909E8E84-426E-40dd-AFC4-6F175D3DCCD1}">
+            <a:ext uri="{909E8E84-426E-40DD-AFC4-6F175D3DCCD1}">
               <a14:hiddenFill xmlns:a14="http://schemas.microsoft.com/office/drawing/2010/main">
                 <a:solidFill>
                   <a:schemeClr val="accent1"/>
                 </a:solidFill>
               </a14:hiddenFill>
             </a:ext>
-            <a:ext uri="{91240B29-F687-4f45-9708-019B960494DF}">
+            <a:ext uri="{91240B29-F687-4F45-9708-019B960494DF}">
               <a14:hiddenLine xmlns:a14="http://schemas.microsoft.com/office/drawing/2010/main" w="9525">
                 <a:solidFill>
                   <a:schemeClr val="tx1"/>
@@ -7258,7 +5327,7 @@
                 <a:tailEnd/>
               </a14:hiddenLine>
             </a:ext>
-            <a:ext uri="{AF507438-7753-43e0-B8FC-AC1667EBCBE1}">
+            <a:ext uri="{AF507438-7753-43E0-B8FC-AC1667EBCBE1}">
               <a14:hiddenEffects xmlns:a14="http://schemas.microsoft.com/office/drawing/2010/main">
                 <a:effectLst>
                   <a:outerShdw dist="35921" dir="2700000" algn="ctr" rotWithShape="0">
@@ -7283,7 +5352,7 @@
   <p:timing>
     <p:tnLst>
       <p:par>
-        <p:cTn xmlns:p14="http://schemas.microsoft.com/office/powerpoint/2010/main" id="1" dur="indefinite" restart="never" nodeType="tmRoot">
+        <p:cTn id="1" dur="indefinite" restart="never" nodeType="tmRoot">
           <p:childTnLst>
             <p:seq concurrent="1" nextAc="seek">
               <p:cTn id="2" dur="indefinite" nodeType="mainSeq">
@@ -7455,7 +5524,7 @@
 </p:sld>
 </file>
 
-<file path=ppt/slides/slide13.xml><?xml version="1.0" encoding="utf-8"?>
+<file path=ppt/slides/slide11.xml><?xml version="1.0" encoding="utf-8"?>
 <p:sld xmlns:a="http://schemas.openxmlformats.org/drawingml/2006/main" xmlns:r="http://schemas.openxmlformats.org/officeDocument/2006/relationships" xmlns:p="http://schemas.openxmlformats.org/presentationml/2006/main">
   <p:cSld>
     <p:spTree>
@@ -7517,7 +5586,7 @@
             <a:fld id="{4A87D5D0-4391-4EB2-AF2F-8F39F08E3898}" type="slidenum">
               <a:rPr lang="de-DE" smtClean="0"/>
               <a:pPr/>
-              <a:t>13</a:t>
+              <a:t>11</a:t>
             </a:fld>
             <a:endParaRPr lang="de-DE" dirty="0"/>
           </a:p>
@@ -7581,14 +5650,14 @@
           </a:ln>
           <a:effectLst/>
           <a:extLst>
-            <a:ext uri="{909E8E84-426E-40dd-AFC4-6F175D3DCCD1}">
+            <a:ext uri="{909E8E84-426E-40DD-AFC4-6F175D3DCCD1}">
               <a14:hiddenFill xmlns:a14="http://schemas.microsoft.com/office/drawing/2010/main">
                 <a:solidFill>
                   <a:schemeClr val="accent1"/>
                 </a:solidFill>
               </a14:hiddenFill>
             </a:ext>
-            <a:ext uri="{91240B29-F687-4f45-9708-019B960494DF}">
+            <a:ext uri="{91240B29-F687-4F45-9708-019B960494DF}">
               <a14:hiddenLine xmlns:a14="http://schemas.microsoft.com/office/drawing/2010/main" w="9525">
                 <a:solidFill>
                   <a:schemeClr val="tx1"/>
@@ -7598,7 +5667,7 @@
                 <a:tailEnd/>
               </a14:hiddenLine>
             </a:ext>
-            <a:ext uri="{AF507438-7753-43e0-B8FC-AC1667EBCBE1}">
+            <a:ext uri="{AF507438-7753-43E0-B8FC-AC1667EBCBE1}">
               <a14:hiddenEffects xmlns:a14="http://schemas.microsoft.com/office/drawing/2010/main">
                 <a:effectLst>
                   <a:outerShdw dist="35921" dir="2700000" algn="ctr" rotWithShape="0">
@@ -7645,14 +5714,14 @@
           </a:ln>
           <a:effectLst/>
           <a:extLst>
-            <a:ext uri="{909E8E84-426E-40dd-AFC4-6F175D3DCCD1}">
+            <a:ext uri="{909E8E84-426E-40DD-AFC4-6F175D3DCCD1}">
               <a14:hiddenFill xmlns:a14="http://schemas.microsoft.com/office/drawing/2010/main">
                 <a:solidFill>
                   <a:schemeClr val="accent1"/>
                 </a:solidFill>
               </a14:hiddenFill>
             </a:ext>
-            <a:ext uri="{91240B29-F687-4f45-9708-019B960494DF}">
+            <a:ext uri="{91240B29-F687-4F45-9708-019B960494DF}">
               <a14:hiddenLine xmlns:a14="http://schemas.microsoft.com/office/drawing/2010/main" w="9525">
                 <a:solidFill>
                   <a:schemeClr val="tx1"/>
@@ -7662,7 +5731,7 @@
                 <a:tailEnd/>
               </a14:hiddenLine>
             </a:ext>
-            <a:ext uri="{AF507438-7753-43e0-B8FC-AC1667EBCBE1}">
+            <a:ext uri="{AF507438-7753-43E0-B8FC-AC1667EBCBE1}">
               <a14:hiddenEffects xmlns:a14="http://schemas.microsoft.com/office/drawing/2010/main">
                 <a:effectLst>
                   <a:outerShdw dist="35921" dir="2700000" algn="ctr" rotWithShape="0">
@@ -7712,14 +5781,14 @@
           </a:ln>
           <a:effectLst/>
           <a:extLst>
-            <a:ext uri="{909E8E84-426E-40dd-AFC4-6F175D3DCCD1}">
+            <a:ext uri="{909E8E84-426E-40DD-AFC4-6F175D3DCCD1}">
               <a14:hiddenFill xmlns:a14="http://schemas.microsoft.com/office/drawing/2010/main">
                 <a:solidFill>
                   <a:schemeClr val="accent1"/>
                 </a:solidFill>
               </a14:hiddenFill>
             </a:ext>
-            <a:ext uri="{AF507438-7753-43e0-B8FC-AC1667EBCBE1}">
+            <a:ext uri="{AF507438-7753-43E0-B8FC-AC1667EBCBE1}">
               <a14:hiddenEffects xmlns:a14="http://schemas.microsoft.com/office/drawing/2010/main">
                 <a:effectLst>
                   <a:outerShdw dist="35921" dir="2700000" algn="ctr" rotWithShape="0">
@@ -7762,7 +5831,7 @@
           </a:prstGeom>
           <a:noFill/>
           <a:extLst>
-            <a:ext uri="{909E8E84-426E-40dd-AFC4-6F175D3DCCD1}">
+            <a:ext uri="{909E8E84-426E-40DD-AFC4-6F175D3DCCD1}">
               <a14:hiddenFill xmlns:a14="http://schemas.microsoft.com/office/drawing/2010/main">
                 <a:solidFill>
                   <a:srgbClr val="FFFFFF"/>
@@ -7785,7 +5854,7 @@
   <p:timing>
     <p:tnLst>
       <p:par>
-        <p:cTn xmlns:p14="http://schemas.microsoft.com/office/powerpoint/2010/main" id="1" dur="indefinite" restart="never" nodeType="tmRoot">
+        <p:cTn id="1" dur="indefinite" restart="never" nodeType="tmRoot">
           <p:childTnLst>
             <p:seq concurrent="1" nextAc="seek">
               <p:cTn id="2" dur="indefinite" nodeType="mainSeq">
@@ -7977,7 +6046,7 @@
 </p:sld>
 </file>
 
-<file path=ppt/slides/slide14.xml><?xml version="1.0" encoding="utf-8"?>
+<file path=ppt/slides/slide12.xml><?xml version="1.0" encoding="utf-8"?>
 <p:sld xmlns:a="http://schemas.openxmlformats.org/drawingml/2006/main" xmlns:r="http://schemas.openxmlformats.org/officeDocument/2006/relationships" xmlns:p="http://schemas.openxmlformats.org/presentationml/2006/main">
   <p:cSld>
     <p:spTree>
@@ -8029,14 +6098,14 @@
           </a:ln>
           <a:effectLst/>
           <a:extLst>
-            <a:ext uri="{909E8E84-426E-40dd-AFC4-6F175D3DCCD1}">
+            <a:ext uri="{909E8E84-426E-40DD-AFC4-6F175D3DCCD1}">
               <a14:hiddenFill xmlns:a14="http://schemas.microsoft.com/office/drawing/2010/main">
                 <a:solidFill>
                   <a:schemeClr val="accent1"/>
                 </a:solidFill>
               </a14:hiddenFill>
             </a:ext>
-            <a:ext uri="{91240B29-F687-4f45-9708-019B960494DF}">
+            <a:ext uri="{91240B29-F687-4F45-9708-019B960494DF}">
               <a14:hiddenLine xmlns:a14="http://schemas.microsoft.com/office/drawing/2010/main" w="9525">
                 <a:solidFill>
                   <a:schemeClr val="tx1"/>
@@ -8046,7 +6115,7 @@
                 <a:tailEnd/>
               </a14:hiddenLine>
             </a:ext>
-            <a:ext uri="{AF507438-7753-43e0-B8FC-AC1667EBCBE1}">
+            <a:ext uri="{AF507438-7753-43E0-B8FC-AC1667EBCBE1}">
               <a14:hiddenEffects xmlns:a14="http://schemas.microsoft.com/office/drawing/2010/main">
                 <a:effectLst>
                   <a:outerShdw dist="35921" dir="2700000" algn="ctr" rotWithShape="0">
@@ -8142,27 +6211,32 @@
           <a:p>
             <a:r>
               <a:rPr lang="de-DE" dirty="0" smtClean="0"/>
+              <a:t>Navigation verbessert</a:t>
+            </a:r>
+            <a:endParaRPr lang="de-DE" dirty="0" smtClean="0"/>
+          </a:p>
+          <a:p>
+            <a:r>
+              <a:rPr lang="de-DE" dirty="0"/>
               <a:t>„</a:t>
             </a:r>
             <a:r>
-              <a:rPr lang="de-DE" dirty="0" err="1" smtClean="0"/>
+              <a:rPr lang="de-DE" dirty="0" err="1"/>
               <a:t>Responsive</a:t>
             </a:r>
             <a:r>
+              <a:rPr lang="de-DE" dirty="0"/>
+              <a:t> Design“ vorhanden</a:t>
+            </a:r>
+          </a:p>
+          <a:p>
+            <a:r>
               <a:rPr lang="de-DE" dirty="0" smtClean="0"/>
-              <a:t> Design“ vorhanden</a:t>
-            </a:r>
-          </a:p>
-          <a:p>
+              <a:t>Farbliche </a:t>
+            </a:r>
             <a:r>
               <a:rPr lang="de-DE" dirty="0" smtClean="0"/>
-              <a:t>Navigation verbessert (Zurück-Button verfügbar)</a:t>
-            </a:r>
-          </a:p>
-          <a:p>
-            <a:r>
-              <a:rPr lang="de-DE" dirty="0" smtClean="0"/>
-              <a:t>Farbliche Gruppierung von Modulen</a:t>
+              <a:t>Gruppierung von Modulen</a:t>
             </a:r>
           </a:p>
           <a:p>
@@ -8219,7 +6293,7 @@
             <a:fld id="{4A87D5D0-4391-4EB2-AF2F-8F39F08E3898}" type="slidenum">
               <a:rPr lang="de-DE" smtClean="0"/>
               <a:pPr/>
-              <a:t>14</a:t>
+              <a:t>12</a:t>
             </a:fld>
             <a:endParaRPr lang="de-DE"/>
           </a:p>
@@ -8256,7 +6330,7 @@
         </p:nvSpPr>
         <p:spPr>
           <a:xfrm>
-            <a:off x="467544" y="1268760"/>
+            <a:off x="395536" y="1268760"/>
             <a:ext cx="5976664" cy="2736304"/>
           </a:xfrm>
           <a:prstGeom prst="rect">
@@ -8380,14 +6454,14 @@
   <p:timing>
     <p:tnLst>
       <p:par>
-        <p:cTn xmlns:p14="http://schemas.microsoft.com/office/powerpoint/2010/main" id="1" dur="indefinite" restart="never" nodeType="tmRoot"/>
+        <p:cTn id="1" dur="indefinite" restart="never" nodeType="tmRoot"/>
       </p:par>
     </p:tnLst>
   </p:timing>
 </p:sld>
 </file>
 
-<file path=ppt/slides/slide15.xml><?xml version="1.0" encoding="utf-8"?>
+<file path=ppt/slides/slide13.xml><?xml version="1.0" encoding="utf-8"?>
 <p:sld xmlns:a="http://schemas.openxmlformats.org/drawingml/2006/main" xmlns:r="http://schemas.openxmlformats.org/officeDocument/2006/relationships" xmlns:p="http://schemas.openxmlformats.org/presentationml/2006/main">
   <p:cSld>
     <p:spTree>
@@ -8445,7 +6519,7 @@
             <a:tailEnd/>
           </a:ln>
           <a:extLst>
-            <a:ext uri="{909E8E84-426E-40dd-AFC4-6F175D3DCCD1}">
+            <a:ext uri="{909E8E84-426E-40DD-AFC4-6F175D3DCCD1}">
               <a14:hiddenFill xmlns:a14="http://schemas.microsoft.com/office/drawing/2010/main">
                 <a:solidFill>
                   <a:schemeClr val="accent1"/>
@@ -8496,7 +6570,7 @@
             <a:fld id="{4A87D5D0-4391-4EB2-AF2F-8F39F08E3898}" type="slidenum">
               <a:rPr lang="de-DE" smtClean="0"/>
               <a:pPr/>
-              <a:t>15</a:t>
+              <a:t>13</a:t>
             </a:fld>
             <a:endParaRPr lang="de-DE"/>
           </a:p>
@@ -8560,14 +6634,14 @@
           </a:ln>
           <a:effectLst/>
           <a:extLst>
-            <a:ext uri="{909E8E84-426E-40dd-AFC4-6F175D3DCCD1}">
+            <a:ext uri="{909E8E84-426E-40DD-AFC4-6F175D3DCCD1}">
               <a14:hiddenFill xmlns:a14="http://schemas.microsoft.com/office/drawing/2010/main">
                 <a:solidFill>
                   <a:schemeClr val="accent1"/>
                 </a:solidFill>
               </a14:hiddenFill>
             </a:ext>
-            <a:ext uri="{91240B29-F687-4f45-9708-019B960494DF}">
+            <a:ext uri="{91240B29-F687-4F45-9708-019B960494DF}">
               <a14:hiddenLine xmlns:a14="http://schemas.microsoft.com/office/drawing/2010/main" w="9525">
                 <a:solidFill>
                   <a:schemeClr val="tx1"/>
@@ -8577,7 +6651,7 @@
                 <a:tailEnd/>
               </a14:hiddenLine>
             </a:ext>
-            <a:ext uri="{AF507438-7753-43e0-B8FC-AC1667EBCBE1}">
+            <a:ext uri="{AF507438-7753-43E0-B8FC-AC1667EBCBE1}">
               <a14:hiddenEffects xmlns:a14="http://schemas.microsoft.com/office/drawing/2010/main">
                 <a:effectLst>
                   <a:outerShdw dist="35921" dir="2700000" algn="ctr" rotWithShape="0">
@@ -8620,7 +6694,7 @@
           </a:prstGeom>
           <a:noFill/>
           <a:extLst>
-            <a:ext uri="{909E8E84-426E-40dd-AFC4-6F175D3DCCD1}">
+            <a:ext uri="{909E8E84-426E-40DD-AFC4-6F175D3DCCD1}">
               <a14:hiddenFill xmlns:a14="http://schemas.microsoft.com/office/drawing/2010/main">
                 <a:solidFill>
                   <a:srgbClr val="FFFFFF"/>
@@ -8661,7 +6735,7 @@
           </a:prstGeom>
           <a:noFill/>
           <a:extLst>
-            <a:ext uri="{909E8E84-426E-40dd-AFC4-6F175D3DCCD1}">
+            <a:ext uri="{909E8E84-426E-40DD-AFC4-6F175D3DCCD1}">
               <a14:hiddenFill xmlns:a14="http://schemas.microsoft.com/office/drawing/2010/main">
                 <a:solidFill>
                   <a:srgbClr val="FFFFFF"/>
@@ -8702,7 +6776,7 @@
           </a:prstGeom>
           <a:noFill/>
           <a:extLst>
-            <a:ext uri="{909E8E84-426E-40dd-AFC4-6F175D3DCCD1}">
+            <a:ext uri="{909E8E84-426E-40DD-AFC4-6F175D3DCCD1}">
               <a14:hiddenFill xmlns:a14="http://schemas.microsoft.com/office/drawing/2010/main">
                 <a:solidFill>
                   <a:srgbClr val="FFFFFF"/>
@@ -8725,7 +6799,7 @@
   <p:timing>
     <p:tnLst>
       <p:par>
-        <p:cTn xmlns:p14="http://schemas.microsoft.com/office/powerpoint/2010/main" id="1" dur="indefinite" restart="never" nodeType="tmRoot">
+        <p:cTn id="1" dur="indefinite" restart="never" nodeType="tmRoot">
           <p:childTnLst>
             <p:seq concurrent="1" nextAc="seek">
               <p:cTn id="2" dur="indefinite" nodeType="mainSeq">
@@ -8881,7 +6955,7 @@
 </p:sld>
 </file>
 
-<file path=ppt/slides/slide16.xml><?xml version="1.0" encoding="utf-8"?>
+<file path=ppt/slides/slide14.xml><?xml version="1.0" encoding="utf-8"?>
 <p:sld xmlns:a="http://schemas.openxmlformats.org/drawingml/2006/main" xmlns:r="http://schemas.openxmlformats.org/officeDocument/2006/relationships" xmlns:p="http://schemas.openxmlformats.org/presentationml/2006/main">
   <p:cSld>
     <p:spTree>
@@ -8978,7 +7052,7 @@
       </p:sp>
       <p:pic>
         <p:nvPicPr>
-          <p:cNvPr id="9" name="Picture 2"/>
+          <p:cNvPr id="11" name="Picture 3"/>
           <p:cNvPicPr>
             <a:picLocks noChangeAspect="1" noChangeArrowheads="1"/>
           </p:cNvPicPr>
@@ -8999,8 +7073,8 @@
         </p:blipFill>
         <p:spPr bwMode="auto">
           <a:xfrm>
-            <a:off x="1435943" y="1597259"/>
-            <a:ext cx="3650670" cy="2035951"/>
+            <a:off x="899592" y="1537065"/>
+            <a:ext cx="4539945" cy="2323983"/>
           </a:xfrm>
           <a:prstGeom prst="rect">
             <a:avLst/>
@@ -9017,7 +7091,7 @@
             <a:tailEnd/>
           </a:ln>
           <a:extLst>
-            <a:ext uri="{909E8E84-426E-40dd-AFC4-6F175D3DCCD1}">
+            <a:ext uri="{909E8E84-426E-40DD-AFC4-6F175D3DCCD1}">
               <a14:hiddenFill xmlns:a14="http://schemas.microsoft.com/office/drawing/2010/main">
                 <a:solidFill>
                   <a:schemeClr val="accent1"/>
@@ -9068,7 +7142,7 @@
             <a:fld id="{4A87D5D0-4391-4EB2-AF2F-8F39F08E3898}" type="slidenum">
               <a:rPr lang="de-DE" smtClean="0"/>
               <a:pPr/>
-              <a:t>16</a:t>
+              <a:t>14</a:t>
             </a:fld>
             <a:endParaRPr lang="de-DE"/>
           </a:p>
@@ -9120,7 +7194,7 @@
         </p:blipFill>
         <p:spPr bwMode="auto">
           <a:xfrm>
-            <a:off x="5436096" y="1297414"/>
+            <a:off x="5508104" y="1317764"/>
             <a:ext cx="1844617" cy="2635642"/>
           </a:xfrm>
           <a:prstGeom prst="rect">
@@ -9128,7 +7202,7 @@
           </a:prstGeom>
           <a:noFill/>
           <a:extLst>
-            <a:ext uri="{909E8E84-426E-40dd-AFC4-6F175D3DCCD1}">
+            <a:ext uri="{909E8E84-426E-40DD-AFC4-6F175D3DCCD1}">
               <a14:hiddenFill xmlns:a14="http://schemas.microsoft.com/office/drawing/2010/main">
                 <a:solidFill>
                   <a:srgbClr val="FFFFFF"/>
@@ -9161,7 +7235,7 @@
         </p:blipFill>
         <p:spPr bwMode="auto">
           <a:xfrm>
-            <a:off x="1763688" y="2332544"/>
+            <a:off x="1763688" y="2906688"/>
             <a:ext cx="1296144" cy="666328"/>
           </a:xfrm>
           <a:prstGeom prst="rect">
@@ -9172,14 +7246,14 @@
             <a:noFill/>
           </a:ln>
           <a:extLst>
-            <a:ext uri="{909E8E84-426E-40dd-AFC4-6F175D3DCCD1}">
+            <a:ext uri="{909E8E84-426E-40DD-AFC4-6F175D3DCCD1}">
               <a14:hiddenFill xmlns:a14="http://schemas.microsoft.com/office/drawing/2010/main">
                 <a:solidFill>
                   <a:schemeClr val="accent1"/>
                 </a:solidFill>
               </a14:hiddenFill>
             </a:ext>
-            <a:ext uri="{91240B29-F687-4f45-9708-019B960494DF}">
+            <a:ext uri="{91240B29-F687-4F45-9708-019B960494DF}">
               <a14:hiddenLine xmlns:a14="http://schemas.microsoft.com/office/drawing/2010/main" w="9525">
                 <a:solidFill>
                   <a:schemeClr val="tx1"/>
@@ -9215,7 +7289,7 @@
         </p:blipFill>
         <p:spPr bwMode="auto">
           <a:xfrm>
-            <a:off x="3588158" y="2852936"/>
+            <a:off x="3563888" y="2924944"/>
             <a:ext cx="1204185" cy="648813"/>
           </a:xfrm>
           <a:prstGeom prst="rect">
@@ -9226,14 +7300,14 @@
             <a:noFill/>
           </a:ln>
           <a:extLst>
-            <a:ext uri="{909E8E84-426E-40dd-AFC4-6F175D3DCCD1}">
+            <a:ext uri="{909E8E84-426E-40DD-AFC4-6F175D3DCCD1}">
               <a14:hiddenFill xmlns:a14="http://schemas.microsoft.com/office/drawing/2010/main">
                 <a:solidFill>
                   <a:schemeClr val="accent1"/>
                 </a:solidFill>
               </a14:hiddenFill>
             </a:ext>
-            <a:ext uri="{91240B29-F687-4f45-9708-019B960494DF}">
+            <a:ext uri="{91240B29-F687-4F45-9708-019B960494DF}">
               <a14:hiddenLine xmlns:a14="http://schemas.microsoft.com/office/drawing/2010/main" w="9525">
                 <a:solidFill>
                   <a:schemeClr val="tx1"/>
@@ -9254,7 +7328,7 @@
         </p:nvSpPr>
         <p:spPr>
           <a:xfrm>
-            <a:off x="3079460" y="2564904"/>
+            <a:off x="3079460" y="2937138"/>
             <a:ext cx="484428" cy="707886"/>
           </a:xfrm>
           <a:prstGeom prst="rect">
@@ -9289,263 +7363,7 @@
   <p:timing>
     <p:tnLst>
       <p:par>
-        <p:cTn xmlns:p14="http://schemas.microsoft.com/office/powerpoint/2010/main" id="1" dur="indefinite" restart="never" nodeType="tmRoot"/>
-      </p:par>
-    </p:tnLst>
-  </p:timing>
-</p:sld>
-</file>
-
-<file path=ppt/slides/slide17.xml><?xml version="1.0" encoding="utf-8"?>
-<p:sld xmlns:a="http://schemas.openxmlformats.org/drawingml/2006/main" xmlns:r="http://schemas.openxmlformats.org/officeDocument/2006/relationships" xmlns:p="http://schemas.openxmlformats.org/presentationml/2006/main">
-  <p:cSld>
-    <p:spTree>
-      <p:nvGrpSpPr>
-        <p:cNvPr id="1" name=""/>
-        <p:cNvGrpSpPr/>
-        <p:nvPr/>
-      </p:nvGrpSpPr>
-      <p:grpSpPr>
-        <a:xfrm>
-          <a:off x="0" y="0"/>
-          <a:ext cx="0" cy="0"/>
-          <a:chOff x="0" y="0"/>
-          <a:chExt cx="0" cy="0"/>
-        </a:xfrm>
-      </p:grpSpPr>
-      <p:sp>
-        <p:nvSpPr>
-          <p:cNvPr id="2" name="Titel 1"/>
-          <p:cNvSpPr>
-            <a:spLocks noGrp="1"/>
-          </p:cNvSpPr>
-          <p:nvPr>
-            <p:ph type="title"/>
-          </p:nvPr>
-        </p:nvSpPr>
-        <p:spPr/>
-        <p:txBody>
-          <a:bodyPr/>
-          <a:lstStyle/>
-          <a:p>
-            <a:r>
-              <a:rPr lang="de-DE" dirty="0" smtClean="0"/>
-              <a:t>Prototyp „d3plus (2)“ – Ergebnis</a:t>
-            </a:r>
-            <a:endParaRPr lang="de-DE" dirty="0"/>
-          </a:p>
-        </p:txBody>
-      </p:sp>
-      <p:sp>
-        <p:nvSpPr>
-          <p:cNvPr id="3" name="Inhaltsplatzhalter 2"/>
-          <p:cNvSpPr>
-            <a:spLocks noGrp="1"/>
-          </p:cNvSpPr>
-          <p:nvPr>
-            <p:ph idx="1"/>
-          </p:nvPr>
-        </p:nvSpPr>
-        <p:spPr/>
-        <p:txBody>
-          <a:bodyPr/>
-          <a:lstStyle/>
-          <a:p>
-            <a:pPr marL="0" indent="0" algn="ctr">
-              <a:buNone/>
-            </a:pPr>
-            <a:endParaRPr lang="de-DE" sz="4800" dirty="0" smtClean="0"/>
-          </a:p>
-          <a:p>
-            <a:pPr marL="0" indent="0" algn="ctr">
-              <a:buNone/>
-            </a:pPr>
-            <a:endParaRPr lang="de-DE" sz="4800" dirty="0"/>
-          </a:p>
-          <a:p>
-            <a:pPr marL="0" indent="0">
-              <a:buNone/>
-            </a:pPr>
-            <a:r>
-              <a:rPr lang="de-DE" sz="4800" dirty="0" smtClean="0"/>
-              <a:t>Live Demo</a:t>
-            </a:r>
-            <a:endParaRPr lang="de-DE" sz="4800" dirty="0"/>
-          </a:p>
-        </p:txBody>
-      </p:sp>
-      <p:sp>
-        <p:nvSpPr>
-          <p:cNvPr id="4" name="Foliennummernplatzhalter 3"/>
-          <p:cNvSpPr>
-            <a:spLocks noGrp="1"/>
-          </p:cNvSpPr>
-          <p:nvPr>
-            <p:ph type="sldNum" sz="quarter" idx="10"/>
-          </p:nvPr>
-        </p:nvSpPr>
-        <p:spPr/>
-        <p:txBody>
-          <a:bodyPr/>
-          <a:lstStyle/>
-          <a:p>
-            <a:fld id="{4A87D5D0-4391-4EB2-AF2F-8F39F08E3898}" type="slidenum">
-              <a:rPr lang="de-DE" smtClean="0"/>
-              <a:pPr/>
-              <a:t>17</a:t>
-            </a:fld>
-            <a:endParaRPr lang="de-DE"/>
-          </a:p>
-        </p:txBody>
-      </p:sp>
-      <p:sp>
-        <p:nvSpPr>
-          <p:cNvPr id="5" name="Fußzeilenplatzhalter 4"/>
-          <p:cNvSpPr>
-            <a:spLocks noGrp="1"/>
-          </p:cNvSpPr>
-          <p:nvPr>
-            <p:ph type="ftr" sz="quarter" idx="3"/>
-          </p:nvPr>
-        </p:nvSpPr>
-        <p:spPr/>
-        <p:txBody>
-          <a:bodyPr/>
-          <a:lstStyle/>
-          <a:p>
-            <a:r>
-              <a:rPr lang="it-IT" smtClean="0"/>
-              <a:t>Mobile Web | Projekt: Modulhandbuch</a:t>
-            </a:r>
-            <a:endParaRPr lang="de-DE" dirty="0"/>
-          </a:p>
-        </p:txBody>
-      </p:sp>
-      <p:pic>
-        <p:nvPicPr>
-          <p:cNvPr id="3074" name="Picture 2"/>
-          <p:cNvPicPr>
-            <a:picLocks noChangeAspect="1" noChangeArrowheads="1"/>
-          </p:cNvPicPr>
-          <p:nvPr/>
-        </p:nvPicPr>
-        <p:blipFill>
-          <a:blip r:embed="rId3">
-            <a:extLst>
-              <a:ext uri="{28A0092B-C50C-407E-A947-70E740481C1C}">
-                <a14:useLocalDpi xmlns:a14="http://schemas.microsoft.com/office/drawing/2010/main" val="0"/>
-              </a:ext>
-            </a:extLst>
-          </a:blip>
-          <a:srcRect/>
-          <a:stretch>
-            <a:fillRect/>
-          </a:stretch>
-        </p:blipFill>
-        <p:spPr bwMode="auto">
-          <a:xfrm>
-            <a:off x="4572000" y="1340768"/>
-            <a:ext cx="3701083" cy="4949721"/>
-          </a:xfrm>
-          <a:prstGeom prst="rect">
-            <a:avLst/>
-          </a:prstGeom>
-          <a:noFill/>
-          <a:ln>
-            <a:noFill/>
-          </a:ln>
-          <a:effectLst/>
-          <a:extLst>
-            <a:ext uri="{909E8E84-426E-40dd-AFC4-6F175D3DCCD1}">
-              <a14:hiddenFill xmlns:a14="http://schemas.microsoft.com/office/drawing/2010/main">
-                <a:solidFill>
-                  <a:schemeClr val="accent1"/>
-                </a:solidFill>
-              </a14:hiddenFill>
-            </a:ext>
-            <a:ext uri="{91240B29-F687-4f45-9708-019B960494DF}">
-              <a14:hiddenLine xmlns:a14="http://schemas.microsoft.com/office/drawing/2010/main" w="9525">
-                <a:solidFill>
-                  <a:schemeClr val="tx1"/>
-                </a:solidFill>
-                <a:miter lim="800000"/>
-                <a:headEnd/>
-                <a:tailEnd/>
-              </a14:hiddenLine>
-            </a:ext>
-            <a:ext uri="{AF507438-7753-43e0-B8FC-AC1667EBCBE1}">
-              <a14:hiddenEffects xmlns:a14="http://schemas.microsoft.com/office/drawing/2010/main">
-                <a:effectLst>
-                  <a:outerShdw dist="35921" dir="2700000" algn="ctr" rotWithShape="0">
-                    <a:schemeClr val="bg2"/>
-                  </a:outerShdw>
-                </a:effectLst>
-              </a14:hiddenEffects>
-            </a:ext>
-          </a:extLst>
-        </p:spPr>
-      </p:pic>
-      <p:pic>
-        <p:nvPicPr>
-          <p:cNvPr id="9" name="Picture 2"/>
-          <p:cNvPicPr>
-            <a:picLocks noChangeAspect="1" noChangeArrowheads="1"/>
-          </p:cNvPicPr>
-          <p:nvPr/>
-        </p:nvPicPr>
-        <p:blipFill>
-          <a:blip r:embed="rId4" cstate="print">
-            <a:extLst>
-              <a:ext uri="{28A0092B-C50C-407E-A947-70E740481C1C}">
-                <a14:useLocalDpi xmlns:a14="http://schemas.microsoft.com/office/drawing/2010/main" val="0"/>
-              </a:ext>
-            </a:extLst>
-          </a:blip>
-          <a:srcRect/>
-          <a:stretch>
-            <a:fillRect/>
-          </a:stretch>
-        </p:blipFill>
-        <p:spPr bwMode="auto">
-          <a:xfrm>
-            <a:off x="5254797" y="3259276"/>
-            <a:ext cx="2304256" cy="1209860"/>
-          </a:xfrm>
-          <a:prstGeom prst="rect">
-            <a:avLst/>
-          </a:prstGeom>
-          <a:noFill/>
-          <a:ln w="9525">
-            <a:noFill/>
-            <a:miter lim="800000"/>
-            <a:headEnd/>
-            <a:tailEnd/>
-          </a:ln>
-          <a:extLst>
-            <a:ext uri="{909E8E84-426E-40dd-AFC4-6F175D3DCCD1}">
-              <a14:hiddenFill xmlns:a14="http://schemas.microsoft.com/office/drawing/2010/main">
-                <a:solidFill>
-                  <a:schemeClr val="accent1"/>
-                </a:solidFill>
-              </a14:hiddenFill>
-            </a:ext>
-          </a:extLst>
-        </p:spPr>
-      </p:pic>
-    </p:spTree>
-    <p:extLst>
-      <p:ext uri="{BB962C8B-B14F-4D97-AF65-F5344CB8AC3E}">
-        <p14:creationId xmlns:p14="http://schemas.microsoft.com/office/powerpoint/2010/main" val="500778106"/>
-      </p:ext>
-    </p:extLst>
-  </p:cSld>
-  <p:clrMapOvr>
-    <a:masterClrMapping/>
-  </p:clrMapOvr>
-  <p:timing>
-    <p:tnLst>
-      <p:par>
-        <p:cTn xmlns:p14="http://schemas.microsoft.com/office/powerpoint/2010/main" id="1" dur="indefinite" restart="never" nodeType="tmRoot"/>
+        <p:cTn id="1" dur="indefinite" restart="never" nodeType="tmRoot"/>
       </p:par>
     </p:tnLst>
   </p:timing>
@@ -9730,7 +7548,7 @@
             </a:solidFill>
           </a:ln>
           <a:extLst>
-            <a:ext uri="{909E8E84-426E-40dd-AFC4-6F175D3DCCD1}">
+            <a:ext uri="{909E8E84-426E-40DD-AFC4-6F175D3DCCD1}">
               <a14:hiddenFill xmlns:a14="http://schemas.microsoft.com/office/drawing/2010/main">
                 <a:solidFill>
                   <a:srgbClr val="FFFFFF"/>
@@ -9781,7 +7599,7 @@
             <a:tailEnd/>
           </a:ln>
           <a:extLst>
-            <a:ext uri="{909E8E84-426E-40dd-AFC4-6F175D3DCCD1}">
+            <a:ext uri="{909E8E84-426E-40DD-AFC4-6F175D3DCCD1}">
               <a14:hiddenFill xmlns:a14="http://schemas.microsoft.com/office/drawing/2010/main">
                 <a:solidFill>
                   <a:schemeClr val="accent1"/>
@@ -9832,7 +7650,7 @@
             <a:tailEnd/>
           </a:ln>
           <a:extLst>
-            <a:ext uri="{909E8E84-426E-40dd-AFC4-6F175D3DCCD1}">
+            <a:ext uri="{909E8E84-426E-40DD-AFC4-6F175D3DCCD1}">
               <a14:hiddenFill xmlns:a14="http://schemas.microsoft.com/office/drawing/2010/main">
                 <a:solidFill>
                   <a:schemeClr val="accent1"/>
@@ -9873,7 +7691,7 @@
           </a:prstGeom>
           <a:noFill/>
           <a:extLst>
-            <a:ext uri="{909E8E84-426E-40dd-AFC4-6F175D3DCCD1}">
+            <a:ext uri="{909E8E84-426E-40DD-AFC4-6F175D3DCCD1}">
               <a14:hiddenFill xmlns:a14="http://schemas.microsoft.com/office/drawing/2010/main">
                 <a:solidFill>
                   <a:srgbClr val="FFFFFF"/>
@@ -9921,7 +7739,7 @@
             </a:solidFill>
           </a:ln>
           <a:extLst>
-            <a:ext uri="{909E8E84-426E-40dd-AFC4-6F175D3DCCD1}">
+            <a:ext uri="{909E8E84-426E-40DD-AFC4-6F175D3DCCD1}">
               <a14:hiddenFill xmlns:a14="http://schemas.microsoft.com/office/drawing/2010/main">
                 <a:solidFill>
                   <a:srgbClr val="FFFFFF"/>
@@ -9944,7 +7762,7 @@
   <p:timing>
     <p:tnLst>
       <p:par>
-        <p:cTn xmlns:p14="http://schemas.microsoft.com/office/powerpoint/2010/main" id="1" dur="indefinite" restart="never" nodeType="tmRoot">
+        <p:cTn id="1" dur="indefinite" restart="never" nodeType="tmRoot">
           <p:childTnLst>
             <p:seq concurrent="1" nextAc="seek">
               <p:cTn id="2" dur="indefinite" nodeType="mainSeq">
@@ -10323,15 +8141,7 @@
             </a:pPr>
             <a:r>
               <a:rPr lang="de-DE" dirty="0" smtClean="0"/>
-              <a:t>Brainstorming </a:t>
-            </a:r>
-            <a:r>
-              <a:rPr lang="de-DE" dirty="0" smtClean="0"/>
-              <a:t>zur </a:t>
-            </a:r>
-            <a:r>
-              <a:rPr lang="de-DE" dirty="0" smtClean="0"/>
-              <a:t>Gestaltung</a:t>
+              <a:t>Brainstorming zur Gestaltung</a:t>
             </a:r>
             <a:endParaRPr lang="de-DE" dirty="0"/>
           </a:p>
@@ -10356,13 +8166,8 @@
             </a:pPr>
             <a:r>
               <a:rPr lang="de-DE" dirty="0" smtClean="0"/>
-              <a:t>Bewährte Struktur + Gute Visualisierung + </a:t>
-            </a:r>
-            <a:r>
-              <a:rPr lang="de-DE" dirty="0" smtClean="0"/>
-              <a:t>Informationen</a:t>
-            </a:r>
-            <a:endParaRPr lang="de-DE" dirty="0" smtClean="0"/>
+              <a:t>Bewährte Struktur + Gute Visualisierung + Informationen</a:t>
+            </a:r>
           </a:p>
         </p:txBody>
       </p:sp>
@@ -10442,7 +8247,7 @@
           </a:prstGeom>
           <a:noFill/>
           <a:extLst>
-            <a:ext uri="{909E8E84-426E-40dd-AFC4-6F175D3DCCD1}">
+            <a:ext uri="{909E8E84-426E-40DD-AFC4-6F175D3DCCD1}">
               <a14:hiddenFill xmlns:a14="http://schemas.microsoft.com/office/drawing/2010/main">
                 <a:solidFill>
                   <a:srgbClr val="FFFFFF"/>
@@ -10576,7 +8381,7 @@
   <p:timing>
     <p:tnLst>
       <p:par>
-        <p:cTn xmlns:p14="http://schemas.microsoft.com/office/powerpoint/2010/main" id="1" dur="indefinite" restart="never" nodeType="tmRoot">
+        <p:cTn id="1" dur="indefinite" restart="never" nodeType="tmRoot">
           <p:childTnLst>
             <p:seq concurrent="1" nextAc="seek">
               <p:cTn id="2" dur="indefinite" nodeType="mainSeq">
@@ -11096,7 +8901,7 @@
             <a:tailEnd/>
           </a:ln>
           <a:extLst>
-            <a:ext uri="{909E8E84-426E-40dd-AFC4-6F175D3DCCD1}">
+            <a:ext uri="{909E8E84-426E-40DD-AFC4-6F175D3DCCD1}">
               <a14:hiddenFill xmlns:a14="http://schemas.microsoft.com/office/drawing/2010/main">
                 <a:solidFill>
                   <a:schemeClr val="accent1"/>
@@ -11155,7 +8960,7 @@
   <p:timing>
     <p:tnLst>
       <p:par>
-        <p:cTn xmlns:p14="http://schemas.microsoft.com/office/powerpoint/2010/main" id="1" dur="indefinite" restart="never" nodeType="tmRoot"/>
+        <p:cTn id="1" dur="indefinite" restart="never" nodeType="tmRoot"/>
       </p:par>
     </p:tnLst>
   </p:timing>
@@ -11326,7 +9131,7 @@
             <a:tailEnd/>
           </a:ln>
           <a:extLst>
-            <a:ext uri="{909E8E84-426E-40dd-AFC4-6F175D3DCCD1}">
+            <a:ext uri="{909E8E84-426E-40DD-AFC4-6F175D3DCCD1}">
               <a14:hiddenFill xmlns:a14="http://schemas.microsoft.com/office/drawing/2010/main">
                 <a:solidFill>
                   <a:schemeClr val="accent1"/>
@@ -11415,7 +9220,7 @@
   <p:timing>
     <p:tnLst>
       <p:par>
-        <p:cTn xmlns:p14="http://schemas.microsoft.com/office/powerpoint/2010/main" id="1" dur="indefinite" restart="never" nodeType="tmRoot"/>
+        <p:cTn id="1" dur="indefinite" restart="never" nodeType="tmRoot"/>
       </p:par>
     </p:tnLst>
   </p:timing>
@@ -11547,7 +9352,7 @@
             </a:solidFill>
           </a:ln>
           <a:extLst>
-            <a:ext uri="{909E8E84-426E-40dd-AFC4-6F175D3DCCD1}">
+            <a:ext uri="{909E8E84-426E-40DD-AFC4-6F175D3DCCD1}">
               <a14:hiddenFill xmlns:a14="http://schemas.microsoft.com/office/drawing/2010/main">
                 <a:solidFill>
                   <a:srgbClr val="FFFFFF"/>
@@ -11595,7 +9400,7 @@
             </a:solidFill>
           </a:ln>
           <a:extLst>
-            <a:ext uri="{909E8E84-426E-40dd-AFC4-6F175D3DCCD1}">
+            <a:ext uri="{909E8E84-426E-40DD-AFC4-6F175D3DCCD1}">
               <a14:hiddenFill xmlns:a14="http://schemas.microsoft.com/office/drawing/2010/main">
                 <a:solidFill>
                   <a:srgbClr val="FFFFFF"/>
@@ -11643,7 +9448,7 @@
             </a:solidFill>
           </a:ln>
           <a:extLst>
-            <a:ext uri="{909E8E84-426E-40dd-AFC4-6F175D3DCCD1}">
+            <a:ext uri="{909E8E84-426E-40DD-AFC4-6F175D3DCCD1}">
               <a14:hiddenFill xmlns:a14="http://schemas.microsoft.com/office/drawing/2010/main">
                 <a:solidFill>
                   <a:srgbClr val="FFFFFF"/>
@@ -11666,7 +9471,7 @@
   <p:timing>
     <p:tnLst>
       <p:par>
-        <p:cTn xmlns:p14="http://schemas.microsoft.com/office/powerpoint/2010/main" id="1" dur="indefinite" restart="never" nodeType="tmRoot">
+        <p:cTn id="1" dur="indefinite" restart="never" nodeType="tmRoot">
           <p:childTnLst>
             <p:seq concurrent="1" nextAc="seek">
               <p:cTn id="2" dur="indefinite" nodeType="mainSeq">
@@ -11834,7 +9639,7 @@
           </a:prstGeom>
           <a:noFill/>
           <a:extLst>
-            <a:ext uri="{909E8E84-426E-40dd-AFC4-6F175D3DCCD1}">
+            <a:ext uri="{909E8E84-426E-40DD-AFC4-6F175D3DCCD1}">
               <a14:hiddenFill xmlns:a14="http://schemas.microsoft.com/office/drawing/2010/main">
                 <a:solidFill>
                   <a:srgbClr val="FFFFFF"/>
@@ -12032,7 +9837,7 @@
   <p:timing>
     <p:tnLst>
       <p:par>
-        <p:cTn xmlns:p14="http://schemas.microsoft.com/office/powerpoint/2010/main" id="1" dur="indefinite" restart="never" nodeType="tmRoot">
+        <p:cTn id="1" dur="indefinite" restart="never" nodeType="tmRoot">
           <p:childTnLst>
             <p:seq concurrent="1" nextAc="seek">
               <p:cTn id="2" dur="indefinite" nodeType="mainSeq">
@@ -12394,7 +10199,7 @@
             <a:tailEnd/>
           </a:ln>
           <a:extLst>
-            <a:ext uri="{909E8E84-426E-40dd-AFC4-6F175D3DCCD1}">
+            <a:ext uri="{909E8E84-426E-40DD-AFC4-6F175D3DCCD1}">
               <a14:hiddenFill xmlns:a14="http://schemas.microsoft.com/office/drawing/2010/main">
                 <a:solidFill>
                   <a:schemeClr val="accent1"/>
@@ -12445,7 +10250,7 @@
             <a:tailEnd/>
           </a:ln>
           <a:extLst>
-            <a:ext uri="{909E8E84-426E-40dd-AFC4-6F175D3DCCD1}">
+            <a:ext uri="{909E8E84-426E-40DD-AFC4-6F175D3DCCD1}">
               <a14:hiddenFill xmlns:a14="http://schemas.microsoft.com/office/drawing/2010/main">
                 <a:solidFill>
                   <a:schemeClr val="accent1"/>
@@ -12493,7 +10298,7 @@
             </a:solidFill>
           </a:ln>
           <a:extLst>
-            <a:ext uri="{909E8E84-426E-40dd-AFC4-6F175D3DCCD1}">
+            <a:ext uri="{909E8E84-426E-40DD-AFC4-6F175D3DCCD1}">
               <a14:hiddenFill xmlns:a14="http://schemas.microsoft.com/office/drawing/2010/main">
                 <a:solidFill>
                   <a:srgbClr val="FFFFFF"/>
@@ -12516,7 +10321,7 @@
   <p:timing>
     <p:tnLst>
       <p:par>
-        <p:cTn xmlns:p14="http://schemas.microsoft.com/office/powerpoint/2010/main" id="1" dur="indefinite" restart="never" nodeType="tmRoot">
+        <p:cTn id="1" dur="indefinite" restart="never" nodeType="tmRoot">
           <p:childTnLst>
             <p:seq concurrent="1" nextAc="seek">
               <p:cTn id="2" dur="indefinite" nodeType="mainSeq">
@@ -12764,7 +10569,7 @@
             <a:tailEnd/>
           </a:ln>
           <a:extLst>
-            <a:ext uri="{909E8E84-426E-40dd-AFC4-6F175D3DCCD1}">
+            <a:ext uri="{909E8E84-426E-40DD-AFC4-6F175D3DCCD1}">
               <a14:hiddenFill xmlns:a14="http://schemas.microsoft.com/office/drawing/2010/main">
                 <a:solidFill>
                   <a:schemeClr val="accent1"/>
@@ -12815,7 +10620,7 @@
             <a:tailEnd/>
           </a:ln>
           <a:extLst>
-            <a:ext uri="{909E8E84-426E-40dd-AFC4-6F175D3DCCD1}">
+            <a:ext uri="{909E8E84-426E-40DD-AFC4-6F175D3DCCD1}">
               <a14:hiddenFill xmlns:a14="http://schemas.microsoft.com/office/drawing/2010/main">
                 <a:solidFill>
                   <a:schemeClr val="accent1"/>
@@ -12863,7 +10668,7 @@
             </a:solidFill>
           </a:ln>
           <a:extLst>
-            <a:ext uri="{909E8E84-426E-40dd-AFC4-6F175D3DCCD1}">
+            <a:ext uri="{909E8E84-426E-40DD-AFC4-6F175D3DCCD1}">
               <a14:hiddenFill xmlns:a14="http://schemas.microsoft.com/office/drawing/2010/main">
                 <a:solidFill>
                   <a:srgbClr val="FFFFFF"/>
@@ -12911,7 +10716,7 @@
             </a:solidFill>
           </a:ln>
           <a:extLst>
-            <a:ext uri="{909E8E84-426E-40dd-AFC4-6F175D3DCCD1}">
+            <a:ext uri="{909E8E84-426E-40DD-AFC4-6F175D3DCCD1}">
               <a14:hiddenFill xmlns:a14="http://schemas.microsoft.com/office/drawing/2010/main">
                 <a:solidFill>
                   <a:srgbClr val="FFFFFF"/>
@@ -12934,7 +10739,7 @@
   <p:timing>
     <p:tnLst>
       <p:par>
-        <p:cTn xmlns:p14="http://schemas.microsoft.com/office/powerpoint/2010/main" id="1" dur="indefinite" restart="never" nodeType="tmRoot">
+        <p:cTn id="1" dur="indefinite" restart="never" nodeType="tmRoot">
           <p:childTnLst>
             <p:seq concurrent="1" nextAc="seek">
               <p:cTn id="2" dur="indefinite" nodeType="mainSeq">

</xml_diff>

<commit_message>
Corrections + Presentation Images
</commit_message>
<xml_diff>
--- a/presentation/2015-07-09_Mobile-Web_Gruppe-Modulhandbuch.pptx
+++ b/presentation/2015-07-09_Mobile-Web_Gruppe-Modulhandbuch.pptx
@@ -155,7 +155,7 @@
   </p:defaultTextStyle>
   <p:extLst>
     <p:ext uri="{EFAFB233-063F-42B5-8137-9DF3F51BA10A}">
-      <p15:sldGuideLst xmlns:p15="http://schemas.microsoft.com/office/powerpoint/2012/main" xmlns="">
+      <p15:sldGuideLst xmlns="" xmlns:p15="http://schemas.microsoft.com/office/powerpoint/2012/main">
         <p15:guide id="1" orient="horz" pos="2160">
           <p15:clr>
             <a:srgbClr val="A4A3A4"/>
@@ -214,7 +214,7 @@
       </p15:sldGuideLst>
     </p:ext>
     <p:ext uri="{2D200454-40CA-4A62-9FC3-DE9A4176ACB9}">
-      <p15:notesGuideLst xmlns:p15="http://schemas.microsoft.com/office/powerpoint/2012/main" xmlns=""/>
+      <p15:notesGuideLst xmlns="" xmlns:p15="http://schemas.microsoft.com/office/powerpoint/2012/main"/>
     </p:ext>
   </p:extLst>
 </p:presentation>
@@ -302,7 +302,7 @@
           <a:p>
             <a:fld id="{9937624A-19D6-4B53-87FF-7EC9970FE6DF}" type="datetimeFigureOut">
               <a:rPr lang="de-DE" smtClean="0"/>
-              <a:t>07.07.2015</a:t>
+              <a:t>08.07.2015</a:t>
             </a:fld>
             <a:endParaRPr lang="de-DE"/>
           </a:p>
@@ -467,7 +467,7 @@
           <a:p>
             <a:fld id="{880E0E77-1EBE-4DCA-941B-CCC4F080B8D0}" type="datetimeFigureOut">
               <a:rPr lang="de-DE" smtClean="0"/>
-              <a:t>07.07.2015</a:t>
+              <a:t>08.07.2015</a:t>
             </a:fld>
             <a:endParaRPr lang="de-DE"/>
           </a:p>
@@ -1156,7 +1156,7 @@
           <a:p>
             <a:fld id="{BE52FED1-3B53-4AFD-A771-C7BE27550915}" type="datetime1">
               <a:rPr lang="de-DE" smtClean="0"/>
-              <a:t>07.07.2015</a:t>
+              <a:t>08.07.2015</a:t>
             </a:fld>
             <a:endParaRPr lang="de-DE" dirty="0"/>
           </a:p>
@@ -1467,7 +1467,7 @@
           <a:p>
             <a:fld id="{36514D55-B040-4CBD-B6B9-F1964C8C5D0D}" type="datetime1">
               <a:rPr lang="de-DE" smtClean="0"/>
-              <a:t>07.07.2015</a:t>
+              <a:t>08.07.2015</a:t>
             </a:fld>
             <a:endParaRPr lang="de-DE"/>
           </a:p>
@@ -1726,7 +1726,7 @@
           <a:p>
             <a:fld id="{193105AA-858E-4C99-9190-244091FB0E4C}" type="datetime1">
               <a:rPr lang="de-DE" smtClean="0"/>
-              <a:t>07.07.2015</a:t>
+              <a:t>08.07.2015</a:t>
             </a:fld>
             <a:endParaRPr lang="de-DE"/>
           </a:p>
@@ -2085,7 +2085,7 @@
           <a:p>
             <a:fld id="{95DCA378-4D19-49BB-8AAE-45C7E41C1D83}" type="datetime1">
               <a:rPr lang="de-DE" smtClean="0"/>
-              <a:t>07.07.2015</a:t>
+              <a:t>08.07.2015</a:t>
             </a:fld>
             <a:endParaRPr lang="de-DE"/>
           </a:p>
@@ -2547,7 +2547,7 @@
           <a:p>
             <a:fld id="{D32B10BE-596A-4E88-9BC8-49B1B53D3333}" type="datetime1">
               <a:rPr lang="de-DE" smtClean="0"/>
-              <a:t>07.07.2015</a:t>
+              <a:t>08.07.2015</a:t>
             </a:fld>
             <a:endParaRPr lang="de-DE"/>
           </a:p>
@@ -2764,7 +2764,7 @@
           <a:p>
             <a:fld id="{33003E35-6098-4B69-A0CA-FD39498AB0F4}" type="datetime1">
               <a:rPr lang="de-DE" smtClean="0"/>
-              <a:t>07.07.2015</a:t>
+              <a:t>08.07.2015</a:t>
             </a:fld>
             <a:endParaRPr lang="de-DE"/>
           </a:p>
@@ -2926,7 +2926,7 @@
           <a:p>
             <a:fld id="{FFE014C6-8B34-4748-BFFD-43343B8201C8}" type="datetime1">
               <a:rPr lang="de-DE" smtClean="0"/>
-              <a:t>07.07.2015</a:t>
+              <a:t>08.07.2015</a:t>
             </a:fld>
             <a:endParaRPr lang="de-DE"/>
           </a:p>
@@ -3270,7 +3270,7 @@
           <a:p>
             <a:fld id="{3721457A-8B30-4567-9F44-DF3C2DA4804D}" type="datetime1">
               <a:rPr lang="de-DE" smtClean="0"/>
-              <a:t>07.07.2015</a:t>
+              <a:t>08.07.2015</a:t>
             </a:fld>
             <a:endParaRPr lang="de-DE"/>
           </a:p>
@@ -3594,7 +3594,7 @@
           <a:p>
             <a:fld id="{47982ECF-30EC-40E0-B102-478A97B403CD}" type="datetime1">
               <a:rPr lang="de-DE" smtClean="0"/>
-              <a:t>07.07.2015</a:t>
+              <a:t>08.07.2015</a:t>
             </a:fld>
             <a:endParaRPr lang="de-DE"/>
           </a:p>
@@ -4028,7 +4028,7 @@
           <a:p>
             <a:fld id="{598F92F8-949A-4A70-9DDB-CBDAE3E0A114}" type="datetime1">
               <a:rPr lang="de-DE" smtClean="0"/>
-              <a:t>07.07.2015</a:t>
+              <a:t>08.07.2015</a:t>
             </a:fld>
             <a:endParaRPr lang="de-DE" dirty="0"/>
           </a:p>
@@ -5541,83 +5541,9 @@
           <a:chExt cx="0" cy="0"/>
         </a:xfrm>
       </p:grpSpPr>
-      <p:sp>
-        <p:nvSpPr>
-          <p:cNvPr id="2" name="Titel 1"/>
-          <p:cNvSpPr>
-            <a:spLocks noGrp="1"/>
-          </p:cNvSpPr>
-          <p:nvPr>
-            <p:ph type="title"/>
-          </p:nvPr>
-        </p:nvSpPr>
-        <p:spPr/>
-        <p:txBody>
-          <a:bodyPr/>
-          <a:lstStyle/>
-          <a:p>
-            <a:r>
-              <a:rPr lang="de-DE" dirty="0"/>
-              <a:t>Prototyp „d3plus (2)“ – </a:t>
-            </a:r>
-            <a:r>
-              <a:rPr lang="de-DE" dirty="0" smtClean="0"/>
-              <a:t>Timeline</a:t>
-            </a:r>
-            <a:endParaRPr lang="de-DE" dirty="0"/>
-          </a:p>
-        </p:txBody>
-      </p:sp>
-      <p:sp>
-        <p:nvSpPr>
-          <p:cNvPr id="4" name="Foliennummernplatzhalter 3"/>
-          <p:cNvSpPr>
-            <a:spLocks noGrp="1"/>
-          </p:cNvSpPr>
-          <p:nvPr>
-            <p:ph type="sldNum" sz="quarter" idx="10"/>
-          </p:nvPr>
-        </p:nvSpPr>
-        <p:spPr/>
-        <p:txBody>
-          <a:bodyPr/>
-          <a:lstStyle/>
-          <a:p>
-            <a:fld id="{4A87D5D0-4391-4EB2-AF2F-8F39F08E3898}" type="slidenum">
-              <a:rPr lang="de-DE" smtClean="0"/>
-              <a:pPr/>
-              <a:t>11</a:t>
-            </a:fld>
-            <a:endParaRPr lang="de-DE" dirty="0"/>
-          </a:p>
-        </p:txBody>
-      </p:sp>
-      <p:sp>
-        <p:nvSpPr>
-          <p:cNvPr id="5" name="Fußzeilenplatzhalter 4"/>
-          <p:cNvSpPr>
-            <a:spLocks noGrp="1"/>
-          </p:cNvSpPr>
-          <p:nvPr>
-            <p:ph type="ftr" sz="quarter" idx="3"/>
-          </p:nvPr>
-        </p:nvSpPr>
-        <p:spPr/>
-        <p:txBody>
-          <a:bodyPr/>
-          <a:lstStyle/>
-          <a:p>
-            <a:r>
-              <a:rPr lang="it-IT" smtClean="0"/>
-              <a:t>Mobile Web | Projekt: Modulhandbuch</a:t>
-            </a:r>
-            <a:endParaRPr lang="de-DE" dirty="0"/>
-          </a:p>
-        </p:txBody>
-      </p:sp>
       <p:pic>
         <p:nvPicPr>
-          <p:cNvPr id="2053" name="Picture 5"/>
+          <p:cNvPr id="8" name="Picture 2" descr="http://static.flickr.com/134/326234991_429619a02b_o.jpg"/>
           <p:cNvPicPr>
             <a:picLocks noChangeAspect="1" noChangeArrowheads="1"/>
           </p:cNvPicPr>
@@ -5638,8 +5564,245 @@
         </p:blipFill>
         <p:spPr bwMode="auto">
           <a:xfrm>
-            <a:off x="437771" y="1512000"/>
-            <a:ext cx="8280000" cy="4422236"/>
+            <a:off x="2483768" y="1556792"/>
+            <a:ext cx="4184387" cy="4289436"/>
+          </a:xfrm>
+          <a:prstGeom prst="rect">
+            <a:avLst/>
+          </a:prstGeom>
+          <a:noFill/>
+          <a:extLst>
+            <a:ext uri="{909E8E84-426E-40DD-AFC4-6F175D3DCCD1}">
+              <a14:hiddenFill xmlns:a14="http://schemas.microsoft.com/office/drawing/2010/main">
+                <a:solidFill>
+                  <a:srgbClr val="FFFFFF"/>
+                </a:solidFill>
+              </a14:hiddenFill>
+            </a:ext>
+          </a:extLst>
+        </p:spPr>
+      </p:pic>
+      <p:sp>
+        <p:nvSpPr>
+          <p:cNvPr id="2" name="Titel 1"/>
+          <p:cNvSpPr>
+            <a:spLocks noGrp="1"/>
+          </p:cNvSpPr>
+          <p:nvPr>
+            <p:ph type="title"/>
+          </p:nvPr>
+        </p:nvSpPr>
+        <p:spPr/>
+        <p:txBody>
+          <a:bodyPr/>
+          <a:lstStyle/>
+          <a:p>
+            <a:r>
+              <a:rPr lang="de-DE" dirty="0"/>
+              <a:t>Prototyp „d3plus (2)“ – </a:t>
+            </a:r>
+            <a:r>
+              <a:rPr lang="de-DE" dirty="0" smtClean="0"/>
+              <a:t>Timeline</a:t>
+            </a:r>
+            <a:endParaRPr lang="de-DE" dirty="0"/>
+          </a:p>
+        </p:txBody>
+      </p:sp>
+      <p:sp>
+        <p:nvSpPr>
+          <p:cNvPr id="4" name="Foliennummernplatzhalter 3"/>
+          <p:cNvSpPr>
+            <a:spLocks noGrp="1"/>
+          </p:cNvSpPr>
+          <p:nvPr>
+            <p:ph type="sldNum" sz="quarter" idx="10"/>
+          </p:nvPr>
+        </p:nvSpPr>
+        <p:spPr/>
+        <p:txBody>
+          <a:bodyPr/>
+          <a:lstStyle/>
+          <a:p>
+            <a:fld id="{4A87D5D0-4391-4EB2-AF2F-8F39F08E3898}" type="slidenum">
+              <a:rPr lang="de-DE" smtClean="0"/>
+              <a:pPr/>
+              <a:t>11</a:t>
+            </a:fld>
+            <a:endParaRPr lang="de-DE" dirty="0"/>
+          </a:p>
+        </p:txBody>
+      </p:sp>
+      <p:sp>
+        <p:nvSpPr>
+          <p:cNvPr id="5" name="Fußzeilenplatzhalter 4"/>
+          <p:cNvSpPr>
+            <a:spLocks noGrp="1"/>
+          </p:cNvSpPr>
+          <p:nvPr>
+            <p:ph type="ftr" sz="quarter" idx="3"/>
+          </p:nvPr>
+        </p:nvSpPr>
+        <p:spPr/>
+        <p:txBody>
+          <a:bodyPr/>
+          <a:lstStyle/>
+          <a:p>
+            <a:r>
+              <a:rPr lang="it-IT" smtClean="0"/>
+              <a:t>Mobile Web | Projekt: Modulhandbuch</a:t>
+            </a:r>
+            <a:endParaRPr lang="de-DE" dirty="0"/>
+          </a:p>
+        </p:txBody>
+      </p:sp>
+      <p:pic>
+        <p:nvPicPr>
+          <p:cNvPr id="1026" name="Picture 2"/>
+          <p:cNvPicPr>
+            <a:picLocks noChangeAspect="1" noChangeArrowheads="1"/>
+          </p:cNvPicPr>
+          <p:nvPr/>
+        </p:nvPicPr>
+        <p:blipFill>
+          <a:blip r:embed="rId3">
+            <a:extLst>
+              <a:ext uri="{28A0092B-C50C-407E-A947-70E740481C1C}">
+                <a14:useLocalDpi xmlns:a14="http://schemas.microsoft.com/office/drawing/2010/main" val="0"/>
+              </a:ext>
+            </a:extLst>
+          </a:blip>
+          <a:srcRect/>
+          <a:stretch>
+            <a:fillRect/>
+          </a:stretch>
+        </p:blipFill>
+        <p:spPr bwMode="auto">
+          <a:xfrm>
+            <a:off x="323528" y="1340768"/>
+            <a:ext cx="6623050" cy="3810000"/>
+          </a:xfrm>
+          <a:prstGeom prst="rect">
+            <a:avLst/>
+          </a:prstGeom>
+          <a:noFill/>
+          <a:ln w="9525">
+            <a:solidFill>
+              <a:schemeClr val="bg1">
+                <a:lumMod val="50000"/>
+              </a:schemeClr>
+            </a:solidFill>
+            <a:miter lim="800000"/>
+            <a:headEnd/>
+            <a:tailEnd/>
+          </a:ln>
+          <a:effectLst/>
+          <a:extLst>
+            <a:ext uri="{909E8E84-426E-40DD-AFC4-6F175D3DCCD1}">
+              <a14:hiddenFill xmlns:a14="http://schemas.microsoft.com/office/drawing/2010/main">
+                <a:solidFill>
+                  <a:schemeClr val="accent1"/>
+                </a:solidFill>
+              </a14:hiddenFill>
+            </a:ext>
+            <a:ext uri="{AF507438-7753-43E0-B8FC-AC1667EBCBE1}">
+              <a14:hiddenEffects xmlns:a14="http://schemas.microsoft.com/office/drawing/2010/main">
+                <a:effectLst>
+                  <a:outerShdw dist="35921" dir="2700000" algn="ctr" rotWithShape="0">
+                    <a:schemeClr val="bg2"/>
+                  </a:outerShdw>
+                </a:effectLst>
+              </a14:hiddenEffects>
+            </a:ext>
+          </a:extLst>
+        </p:spPr>
+      </p:pic>
+      <p:pic>
+        <p:nvPicPr>
+          <p:cNvPr id="1027" name="Picture 3"/>
+          <p:cNvPicPr>
+            <a:picLocks noChangeAspect="1" noChangeArrowheads="1"/>
+          </p:cNvPicPr>
+          <p:nvPr/>
+        </p:nvPicPr>
+        <p:blipFill>
+          <a:blip r:embed="rId4">
+            <a:extLst>
+              <a:ext uri="{28A0092B-C50C-407E-A947-70E740481C1C}">
+                <a14:useLocalDpi xmlns:a14="http://schemas.microsoft.com/office/drawing/2010/main" val="0"/>
+              </a:ext>
+            </a:extLst>
+          </a:blip>
+          <a:srcRect/>
+          <a:stretch>
+            <a:fillRect/>
+          </a:stretch>
+        </p:blipFill>
+        <p:spPr bwMode="auto">
+          <a:xfrm>
+            <a:off x="1333326" y="1923256"/>
+            <a:ext cx="6623050" cy="3810000"/>
+          </a:xfrm>
+          <a:prstGeom prst="rect">
+            <a:avLst/>
+          </a:prstGeom>
+          <a:noFill/>
+          <a:ln w="9525">
+            <a:solidFill>
+              <a:schemeClr val="bg1">
+                <a:lumMod val="50000"/>
+              </a:schemeClr>
+            </a:solidFill>
+            <a:miter lim="800000"/>
+            <a:headEnd/>
+            <a:tailEnd/>
+          </a:ln>
+          <a:effectLst/>
+          <a:extLst>
+            <a:ext uri="{909E8E84-426E-40DD-AFC4-6F175D3DCCD1}">
+              <a14:hiddenFill xmlns:a14="http://schemas.microsoft.com/office/drawing/2010/main">
+                <a:solidFill>
+                  <a:schemeClr val="accent1"/>
+                </a:solidFill>
+              </a14:hiddenFill>
+            </a:ext>
+            <a:ext uri="{AF507438-7753-43E0-B8FC-AC1667EBCBE1}">
+              <a14:hiddenEffects xmlns:a14="http://schemas.microsoft.com/office/drawing/2010/main">
+                <a:effectLst>
+                  <a:outerShdw dist="35921" dir="2700000" algn="ctr" rotWithShape="0">
+                    <a:schemeClr val="bg2"/>
+                  </a:outerShdw>
+                </a:effectLst>
+              </a14:hiddenEffects>
+            </a:ext>
+          </a:extLst>
+        </p:spPr>
+      </p:pic>
+      <p:pic>
+        <p:nvPicPr>
+          <p:cNvPr id="1029" name="Picture 5"/>
+          <p:cNvPicPr>
+            <a:picLocks noChangeAspect="1" noChangeArrowheads="1"/>
+          </p:cNvPicPr>
+          <p:nvPr/>
+        </p:nvPicPr>
+        <p:blipFill>
+          <a:blip r:embed="rId5">
+            <a:extLst>
+              <a:ext uri="{28A0092B-C50C-407E-A947-70E740481C1C}">
+                <a14:useLocalDpi xmlns:a14="http://schemas.microsoft.com/office/drawing/2010/main" val="0"/>
+              </a:ext>
+            </a:extLst>
+          </a:blip>
+          <a:srcRect/>
+          <a:stretch>
+            <a:fillRect/>
+          </a:stretch>
+        </p:blipFill>
+        <p:spPr bwMode="auto">
+          <a:xfrm>
+            <a:off x="3131840" y="3288683"/>
+            <a:ext cx="4764836" cy="2300557"/>
           </a:xfrm>
           <a:prstGeom prst="rect">
             <a:avLst/>
@@ -5675,168 +5838,6 @@
                   </a:outerShdw>
                 </a:effectLst>
               </a14:hiddenEffects>
-            </a:ext>
-          </a:extLst>
-        </p:spPr>
-      </p:pic>
-      <p:pic>
-        <p:nvPicPr>
-          <p:cNvPr id="2055" name="Picture 7"/>
-          <p:cNvPicPr>
-            <a:picLocks noChangeAspect="1" noChangeArrowheads="1"/>
-          </p:cNvPicPr>
-          <p:nvPr/>
-        </p:nvPicPr>
-        <p:blipFill>
-          <a:blip r:embed="rId3">
-            <a:extLst>
-              <a:ext uri="{28A0092B-C50C-407E-A947-70E740481C1C}">
-                <a14:useLocalDpi xmlns:a14="http://schemas.microsoft.com/office/drawing/2010/main" val="0"/>
-              </a:ext>
-            </a:extLst>
-          </a:blip>
-          <a:srcRect/>
-          <a:stretch>
-            <a:fillRect/>
-          </a:stretch>
-        </p:blipFill>
-        <p:spPr bwMode="auto">
-          <a:xfrm>
-            <a:off x="447198" y="1512000"/>
-            <a:ext cx="8280000" cy="4430001"/>
-          </a:xfrm>
-          <a:prstGeom prst="rect">
-            <a:avLst/>
-          </a:prstGeom>
-          <a:noFill/>
-          <a:ln>
-            <a:noFill/>
-          </a:ln>
-          <a:effectLst/>
-          <a:extLst>
-            <a:ext uri="{909E8E84-426E-40DD-AFC4-6F175D3DCCD1}">
-              <a14:hiddenFill xmlns:a14="http://schemas.microsoft.com/office/drawing/2010/main">
-                <a:solidFill>
-                  <a:schemeClr val="accent1"/>
-                </a:solidFill>
-              </a14:hiddenFill>
-            </a:ext>
-            <a:ext uri="{91240B29-F687-4F45-9708-019B960494DF}">
-              <a14:hiddenLine xmlns:a14="http://schemas.microsoft.com/office/drawing/2010/main" w="9525">
-                <a:solidFill>
-                  <a:schemeClr val="tx1"/>
-                </a:solidFill>
-                <a:miter lim="800000"/>
-                <a:headEnd/>
-                <a:tailEnd/>
-              </a14:hiddenLine>
-            </a:ext>
-            <a:ext uri="{AF507438-7753-43E0-B8FC-AC1667EBCBE1}">
-              <a14:hiddenEffects xmlns:a14="http://schemas.microsoft.com/office/drawing/2010/main">
-                <a:effectLst>
-                  <a:outerShdw dist="35921" dir="2700000" algn="ctr" rotWithShape="0">
-                    <a:schemeClr val="bg2"/>
-                  </a:outerShdw>
-                </a:effectLst>
-              </a14:hiddenEffects>
-            </a:ext>
-          </a:extLst>
-        </p:spPr>
-      </p:pic>
-      <p:pic>
-        <p:nvPicPr>
-          <p:cNvPr id="2056" name="Picture 8"/>
-          <p:cNvPicPr>
-            <a:picLocks noChangeAspect="1" noChangeArrowheads="1"/>
-          </p:cNvPicPr>
-          <p:nvPr/>
-        </p:nvPicPr>
-        <p:blipFill>
-          <a:blip r:embed="rId4">
-            <a:extLst>
-              <a:ext uri="{28A0092B-C50C-407E-A947-70E740481C1C}">
-                <a14:useLocalDpi xmlns:a14="http://schemas.microsoft.com/office/drawing/2010/main" val="0"/>
-              </a:ext>
-            </a:extLst>
-          </a:blip>
-          <a:srcRect/>
-          <a:stretch>
-            <a:fillRect/>
-          </a:stretch>
-        </p:blipFill>
-        <p:spPr bwMode="auto">
-          <a:xfrm>
-            <a:off x="446278" y="1474151"/>
-            <a:ext cx="8352000" cy="4447668"/>
-          </a:xfrm>
-          <a:prstGeom prst="rect">
-            <a:avLst/>
-          </a:prstGeom>
-          <a:noFill/>
-          <a:ln w="9525">
-            <a:noFill/>
-            <a:miter lim="800000"/>
-            <a:headEnd/>
-            <a:tailEnd/>
-          </a:ln>
-          <a:effectLst/>
-          <a:extLst>
-            <a:ext uri="{909E8E84-426E-40DD-AFC4-6F175D3DCCD1}">
-              <a14:hiddenFill xmlns:a14="http://schemas.microsoft.com/office/drawing/2010/main">
-                <a:solidFill>
-                  <a:schemeClr val="accent1"/>
-                </a:solidFill>
-              </a14:hiddenFill>
-            </a:ext>
-            <a:ext uri="{AF507438-7753-43E0-B8FC-AC1667EBCBE1}">
-              <a14:hiddenEffects xmlns:a14="http://schemas.microsoft.com/office/drawing/2010/main">
-                <a:effectLst>
-                  <a:outerShdw dist="35921" dir="2700000" algn="ctr" rotWithShape="0">
-                    <a:schemeClr val="bg2"/>
-                  </a:outerShdw>
-                </a:effectLst>
-              </a14:hiddenEffects>
-            </a:ext>
-          </a:extLst>
-        </p:spPr>
-      </p:pic>
-      <p:pic>
-        <p:nvPicPr>
-          <p:cNvPr id="8" name="Picture 2" descr="http://static.flickr.com/134/326234991_429619a02b_o.jpg"/>
-          <p:cNvPicPr>
-            <a:picLocks noChangeAspect="1" noChangeArrowheads="1"/>
-          </p:cNvPicPr>
-          <p:nvPr/>
-        </p:nvPicPr>
-        <p:blipFill>
-          <a:blip r:embed="rId5">
-            <a:extLst>
-              <a:ext uri="{28A0092B-C50C-407E-A947-70E740481C1C}">
-                <a14:useLocalDpi xmlns:a14="http://schemas.microsoft.com/office/drawing/2010/main" val="0"/>
-              </a:ext>
-            </a:extLst>
-          </a:blip>
-          <a:srcRect/>
-          <a:stretch>
-            <a:fillRect/>
-          </a:stretch>
-        </p:blipFill>
-        <p:spPr bwMode="auto">
-          <a:xfrm>
-            <a:off x="2627784" y="1474151"/>
-            <a:ext cx="4184387" cy="4289436"/>
-          </a:xfrm>
-          <a:prstGeom prst="rect">
-            <a:avLst/>
-          </a:prstGeom>
-          <a:noFill/>
-          <a:extLst>
-            <a:ext uri="{909E8E84-426E-40DD-AFC4-6F175D3DCCD1}">
-              <a14:hiddenFill xmlns:a14="http://schemas.microsoft.com/office/drawing/2010/main">
-                <a:solidFill>
-                  <a:srgbClr val="FFFFFF"/>
-                </a:solidFill>
-              </a14:hiddenFill>
             </a:ext>
           </a:extLst>
         </p:spPr>
@@ -5912,7 +5913,7 @@
                                           </p:stCondLst>
                                         </p:cTn>
                                         <p:tgtEl>
-                                          <p:spTgt spid="2053"/>
+                                          <p:spTgt spid="1026"/>
                                         </p:tgtEl>
                                         <p:attrNameLst>
                                           <p:attrName>style.visibility</p:attrName>
@@ -5957,7 +5958,7 @@
                                           </p:stCondLst>
                                         </p:cTn>
                                         <p:tgtEl>
-                                          <p:spTgt spid="2055"/>
+                                          <p:spTgt spid="1027"/>
                                         </p:tgtEl>
                                         <p:attrNameLst>
                                           <p:attrName>style.visibility</p:attrName>
@@ -6002,7 +6003,7 @@
                                           </p:stCondLst>
                                         </p:cTn>
                                         <p:tgtEl>
-                                          <p:spTgt spid="2056"/>
+                                          <p:spTgt spid="1029"/>
                                         </p:tgtEl>
                                         <p:attrNameLst>
                                           <p:attrName>style.visibility</p:attrName>
@@ -6213,7 +6214,6 @@
               <a:rPr lang="de-DE" dirty="0" smtClean="0"/>
               <a:t>Navigation verbessert</a:t>
             </a:r>
-            <a:endParaRPr lang="de-DE" dirty="0" smtClean="0"/>
           </a:p>
           <a:p>
             <a:r>
@@ -6232,11 +6232,7 @@
           <a:p>
             <a:r>
               <a:rPr lang="de-DE" dirty="0" smtClean="0"/>
-              <a:t>Farbliche </a:t>
-            </a:r>
-            <a:r>
-              <a:rPr lang="de-DE" dirty="0" smtClean="0"/>
-              <a:t>Gruppierung von Modulen</a:t>
+              <a:t>Farbliche Gruppierung von Modulen</a:t>
             </a:r>
           </a:p>
           <a:p>

</xml_diff>